<commit_message>
added complete translated presentation
</commit_message>
<xml_diff>
--- a/web application/Application Spring Boot.pptx
+++ b/web application/Application Spring Boot.pptx
@@ -377,6 +377,29 @@
           <a:bodyPr/>
           <a:lstStyle/>
           <a:p>
+            <a:pPr marL="0" marR="0" lvl="0" indent="0" algn="l" defTabSz="914400" rtl="0" eaLnBrk="1" fontAlgn="auto" latinLnBrk="0" hangingPunct="1">
+              <a:lnSpc>
+                <a:spcPct val="100000"/>
+              </a:lnSpc>
+              <a:spcBef>
+                <a:spcPts val="0"/>
+              </a:spcBef>
+              <a:spcAft>
+                <a:spcPts val="0"/>
+              </a:spcAft>
+              <a:buClrTx/>
+              <a:buSzTx/>
+              <a:buFontTx/>
+              <a:buNone/>
+              <a:tabLst/>
+              <a:defRPr/>
+            </a:pPr>
+            <a:r>
+              <a:rPr lang="ru-RU" dirty="0"/>
+              <a:t>Пример простого приложения для списка задач.</a:t>
+            </a:r>
+          </a:p>
+          <a:p>
             <a:endParaRPr lang="en-US" dirty="0"/>
           </a:p>
         </p:txBody>
@@ -461,6 +484,29 @@
           <a:bodyPr/>
           <a:lstStyle/>
           <a:p>
+            <a:pPr marL="0" marR="0" lvl="0" indent="0" algn="l" defTabSz="914400" rtl="0" eaLnBrk="1" fontAlgn="auto" latinLnBrk="0" hangingPunct="1">
+              <a:lnSpc>
+                <a:spcPct val="100000"/>
+              </a:lnSpc>
+              <a:spcBef>
+                <a:spcPts val="0"/>
+              </a:spcBef>
+              <a:spcAft>
+                <a:spcPts val="0"/>
+              </a:spcAft>
+              <a:buClrTx/>
+              <a:buSzTx/>
+              <a:buFontTx/>
+              <a:buNone/>
+              <a:tabLst/>
+              <a:defRPr/>
+            </a:pPr>
+            <a:r>
+              <a:rPr lang="ru-RU" dirty="0"/>
+              <a:t>Spring Boot удобен, но иногда скрывает детали.</a:t>
+            </a:r>
+          </a:p>
+          <a:p>
             <a:endParaRPr lang="en-US" dirty="0"/>
           </a:p>
         </p:txBody>
@@ -545,6 +591,37 @@
           <a:bodyPr/>
           <a:lstStyle/>
           <a:p>
+            <a:pPr marL="0" marR="0" lvl="0" indent="0" algn="l" defTabSz="914400" rtl="0" eaLnBrk="1" fontAlgn="auto" latinLnBrk="0" hangingPunct="1">
+              <a:lnSpc>
+                <a:spcPct val="100000"/>
+              </a:lnSpc>
+              <a:spcBef>
+                <a:spcPts val="0"/>
+              </a:spcBef>
+              <a:spcAft>
+                <a:spcPts val="0"/>
+              </a:spcAft>
+              <a:buClrTx/>
+              <a:buSzTx/>
+              <a:buFontTx/>
+              <a:buNone/>
+              <a:tabLst/>
+              <a:defRPr/>
+            </a:pPr>
+            <a:r>
+              <a:rPr lang="ru-RU" dirty="0"/>
+              <a:t>Spring Boot используется в банках, онлайн-сервисах и e-</a:t>
+            </a:r>
+            <a:r>
+              <a:rPr lang="ru-RU" dirty="0" err="1"/>
+              <a:t>commerce</a:t>
+            </a:r>
+            <a:r>
+              <a:rPr lang="ru-RU" dirty="0"/>
+              <a:t>.</a:t>
+            </a:r>
+          </a:p>
+          <a:p>
             <a:endParaRPr lang="en-US" dirty="0"/>
           </a:p>
         </p:txBody>
@@ -629,6 +706,29 @@
           <a:bodyPr/>
           <a:lstStyle/>
           <a:p>
+            <a:pPr marL="0" marR="0" lvl="0" indent="0" algn="l" defTabSz="914400" rtl="0" eaLnBrk="1" fontAlgn="auto" latinLnBrk="0" hangingPunct="1">
+              <a:lnSpc>
+                <a:spcPct val="100000"/>
+              </a:lnSpc>
+              <a:spcBef>
+                <a:spcPts val="0"/>
+              </a:spcBef>
+              <a:spcAft>
+                <a:spcPts val="0"/>
+              </a:spcAft>
+              <a:buClrTx/>
+              <a:buSzTx/>
+              <a:buFontTx/>
+              <a:buNone/>
+              <a:tabLst/>
+              <a:defRPr/>
+            </a:pPr>
+            <a:r>
+              <a:rPr lang="ru-RU"/>
+              <a:t>Spring Boot — это экосистема для современных приложений.</a:t>
+            </a:r>
+          </a:p>
+          <a:p>
             <a:endParaRPr lang="en-US" dirty="0"/>
           </a:p>
         </p:txBody>
@@ -1266,6 +1366,29 @@
           <a:bodyPr/>
           <a:lstStyle/>
           <a:p>
+            <a:pPr marL="0" marR="0" lvl="0" indent="0" algn="l" defTabSz="914400" rtl="0" eaLnBrk="1" fontAlgn="auto" latinLnBrk="0" hangingPunct="1">
+              <a:lnSpc>
+                <a:spcPct val="100000"/>
+              </a:lnSpc>
+              <a:spcBef>
+                <a:spcPts val="0"/>
+              </a:spcBef>
+              <a:spcAft>
+                <a:spcPts val="0"/>
+              </a:spcAft>
+              <a:buClrTx/>
+              <a:buSzTx/>
+              <a:buFontTx/>
+              <a:buNone/>
+              <a:tabLst/>
+              <a:defRPr/>
+            </a:pPr>
+            <a:r>
+              <a:rPr lang="ru-RU" dirty="0"/>
+              <a:t>Spring Boot использует много шаблонов проектирования.</a:t>
+            </a:r>
+          </a:p>
+          <a:p>
             <a:endParaRPr lang="en-US" dirty="0"/>
           </a:p>
         </p:txBody>
@@ -1350,6 +1473,37 @@
           <a:bodyPr/>
           <a:lstStyle/>
           <a:p>
+            <a:pPr marL="0" marR="0" lvl="0" indent="0" algn="l" defTabSz="914400" rtl="0" eaLnBrk="1" fontAlgn="auto" latinLnBrk="0" hangingPunct="1">
+              <a:lnSpc>
+                <a:spcPct val="100000"/>
+              </a:lnSpc>
+              <a:spcBef>
+                <a:spcPts val="0"/>
+              </a:spcBef>
+              <a:spcAft>
+                <a:spcPts val="0"/>
+              </a:spcAft>
+              <a:buClrTx/>
+              <a:buSzTx/>
+              <a:buFontTx/>
+              <a:buNone/>
+              <a:tabLst/>
+              <a:defRPr/>
+            </a:pPr>
+            <a:r>
+              <a:rPr lang="ru-RU" dirty="0"/>
+              <a:t>Spring Boot идеально подходит для </a:t>
+            </a:r>
+            <a:r>
+              <a:rPr lang="ru-RU" dirty="0" err="1"/>
+              <a:t>микросервисной</a:t>
+            </a:r>
+            <a:r>
+              <a:rPr lang="ru-RU" dirty="0"/>
+              <a:t> архитектуры.</a:t>
+            </a:r>
+          </a:p>
+          <a:p>
             <a:endParaRPr lang="en-US" dirty="0"/>
           </a:p>
         </p:txBody>
@@ -1433,6 +1587,41 @@
         <p:txBody>
           <a:bodyPr/>
           <a:lstStyle/>
+          <a:p>
+            <a:pPr marL="0" marR="0" lvl="0" indent="0" algn="l" defTabSz="914400" rtl="0" eaLnBrk="1" fontAlgn="auto" latinLnBrk="0" hangingPunct="1">
+              <a:lnSpc>
+                <a:spcPct val="100000"/>
+              </a:lnSpc>
+              <a:spcBef>
+                <a:spcPts val="0"/>
+              </a:spcBef>
+              <a:spcAft>
+                <a:spcPts val="0"/>
+              </a:spcAft>
+              <a:buClrTx/>
+              <a:buSzTx/>
+              <a:buFontTx/>
+              <a:buNone/>
+              <a:tabLst/>
+              <a:defRPr/>
+            </a:pPr>
+            <a:r>
+              <a:rPr lang="ru-RU" dirty="0" err="1"/>
+              <a:t>Eureka</a:t>
+            </a:r>
+            <a:r>
+              <a:rPr lang="ru-RU" dirty="0"/>
+              <a:t> помогает сервисам находить друг друга, а Spring </a:t>
+            </a:r>
+            <a:r>
+              <a:rPr lang="ru-RU" dirty="0" err="1"/>
+              <a:t>Cloud</a:t>
+            </a:r>
+            <a:r>
+              <a:rPr lang="ru-RU" dirty="0"/>
+              <a:t> упрощает маршрутизацию.</a:t>
+            </a:r>
+          </a:p>
           <a:p>
             <a:endParaRPr lang="en-US" dirty="0"/>
           </a:p>
@@ -4135,7 +4324,7 @@
         <p:spPr>
           <a:xfrm>
             <a:off x="1272629" y="5205413"/>
-            <a:ext cx="2552745" cy="152400"/>
+            <a:ext cx="2552745" cy="177421"/>
           </a:xfrm>
           <a:prstGeom prst="rect">
             <a:avLst/>
@@ -4156,7 +4345,7 @@
               <a:buNone/>
             </a:pPr>
             <a:r>
-              <a:rPr lang="en-US" sz="980" dirty="0">
+              <a:rPr lang="ru-RU" sz="980" dirty="0">
                 <a:solidFill>
                   <a:srgbClr val="718096"/>
                 </a:solidFill>
@@ -4164,139 +4353,29 @@
                 <a:ea typeface="ui-monospace" pitchFamily="34" charset="-122"/>
                 <a:cs typeface="ui-monospace" pitchFamily="34" charset="-120"/>
               </a:rPr>
-              <a:t>// ... autres opérations CRUD</a:t>
-            </a:r>
-            <a:endParaRPr lang="en-US" sz="980" dirty="0"/>
-          </a:p>
-        </p:txBody>
-      </p:sp>
-      <p:sp>
-        <p:nvSpPr>
-          <p:cNvPr id="51" name="Text 27"/>
-          <p:cNvSpPr/>
-          <p:nvPr/>
-        </p:nvSpPr>
-        <p:spPr>
-          <a:xfrm>
-            <a:off x="3593306" y="5392043"/>
-            <a:ext cx="88076" cy="152400"/>
-          </a:xfrm>
-          <a:prstGeom prst="rect">
-            <a:avLst/>
-          </a:prstGeom>
-          <a:noFill/>
-          <a:ln/>
-        </p:spPr>
-        <p:txBody>
-          <a:bodyPr wrap="square" lIns="0" tIns="0" rIns="0" bIns="0" rtlCol="0" anchor="t">
-            <a:spAutoFit/>
-          </a:bodyPr>
-          <a:lstStyle/>
-          <a:p>
-            <a:pPr marL="0" indent="0">
-              <a:lnSpc>
-                <a:spcPts val="1470"/>
-              </a:lnSpc>
-              <a:buNone/>
-            </a:pPr>
+              <a:t>// ... другие </a:t>
+            </a:r>
             <a:r>
               <a:rPr lang="en-US" sz="980" dirty="0">
                 <a:solidFill>
-                  <a:srgbClr val="E2E8F0"/>
+                  <a:srgbClr val="718096"/>
                 </a:solidFill>
                 <a:latin typeface="ui-monospace" pitchFamily="34" charset="0"/>
                 <a:ea typeface="ui-monospace" pitchFamily="34" charset="-122"/>
                 <a:cs typeface="ui-monospace" pitchFamily="34" charset="-120"/>
               </a:rPr>
-              <a:t>}</a:t>
-            </a:r>
-            <a:endParaRPr lang="en-US" sz="980" dirty="0"/>
-          </a:p>
-        </p:txBody>
-      </p:sp>
-      <p:sp>
-        <p:nvSpPr>
-          <p:cNvPr id="52" name="Text 28"/>
-          <p:cNvSpPr/>
-          <p:nvPr/>
-        </p:nvSpPr>
-        <p:spPr>
-          <a:xfrm>
-            <a:off x="4895850" y="1676400"/>
-            <a:ext cx="1045458" cy="304800"/>
-          </a:xfrm>
-          <a:prstGeom prst="rect">
-            <a:avLst/>
-          </a:prstGeom>
-          <a:noFill/>
-          <a:ln/>
-        </p:spPr>
-        <p:txBody>
-          <a:bodyPr wrap="square" lIns="0" tIns="0" rIns="0" bIns="0" rtlCol="0" anchor="t">
-            <a:spAutoFit/>
-          </a:bodyPr>
-          <a:lstStyle/>
-          <a:p>
-            <a:pPr marL="0" indent="0">
-              <a:lnSpc>
-                <a:spcPts val="2400"/>
-              </a:lnSpc>
-              <a:buNone/>
-            </a:pPr>
-            <a:r>
-              <a:rPr lang="en-US" sz="1646" b="1" dirty="0">
-                <a:solidFill>
-                  <a:srgbClr val="60A5FA"/>
-                </a:solidFill>
-                <a:latin typeface="ui-sans-serif" pitchFamily="34" charset="0"/>
-                <a:ea typeface="ui-sans-serif" pitchFamily="34" charset="-122"/>
-                <a:cs typeface="ui-sans-serif" pitchFamily="34" charset="-120"/>
-              </a:rPr>
-              <a:t>Service</a:t>
-            </a:r>
-            <a:endParaRPr lang="en-US" sz="1646" dirty="0"/>
-          </a:p>
-        </p:txBody>
-      </p:sp>
-      <p:sp>
-        <p:nvSpPr>
-          <p:cNvPr id="53" name="Text 29"/>
-          <p:cNvSpPr/>
-          <p:nvPr/>
-        </p:nvSpPr>
-        <p:spPr>
-          <a:xfrm>
-            <a:off x="4610100" y="2219325"/>
-            <a:ext cx="704284" cy="152400"/>
-          </a:xfrm>
-          <a:prstGeom prst="rect">
-            <a:avLst/>
-          </a:prstGeom>
-          <a:noFill/>
-          <a:ln/>
-        </p:spPr>
-        <p:txBody>
-          <a:bodyPr wrap="square" lIns="0" tIns="0" rIns="0" bIns="0" rtlCol="0" anchor="t">
-            <a:spAutoFit/>
-          </a:bodyPr>
-          <a:lstStyle/>
-          <a:p>
-            <a:pPr marL="0" indent="0">
-              <a:lnSpc>
-                <a:spcPts val="1470"/>
-              </a:lnSpc>
-              <a:buNone/>
-            </a:pPr>
-            <a:r>
-              <a:rPr lang="en-US" sz="980" dirty="0">
-                <a:solidFill>
-                  <a:srgbClr val="90EE90"/>
+              <a:t>CRUD-</a:t>
+            </a:r>
+            <a:r>
+              <a:rPr lang="ru-RU" sz="980" dirty="0">
+                <a:solidFill>
+                  <a:srgbClr val="718096"/>
                 </a:solidFill>
                 <a:latin typeface="ui-monospace" pitchFamily="34" charset="0"/>
                 <a:ea typeface="ui-monospace" pitchFamily="34" charset="-122"/>
                 <a:cs typeface="ui-monospace" pitchFamily="34" charset="-120"/>
               </a:rPr>
-              <a:t>@Service</a:t>
+              <a:t>операции</a:t>
             </a:r>
             <a:endParaRPr lang="en-US" sz="980" dirty="0"/>
           </a:p>
@@ -4304,14 +4383,14 @@
       </p:sp>
       <p:sp>
         <p:nvSpPr>
-          <p:cNvPr id="54" name="Text 30"/>
-          <p:cNvSpPr/>
-          <p:nvPr/>
-        </p:nvSpPr>
-        <p:spPr>
-          <a:xfrm>
-            <a:off x="4610100" y="2405955"/>
-            <a:ext cx="1056427" cy="152400"/>
+          <p:cNvPr id="51" name="Text 27"/>
+          <p:cNvSpPr/>
+          <p:nvPr/>
+        </p:nvSpPr>
+        <p:spPr>
+          <a:xfrm>
+            <a:off x="3593306" y="5392043"/>
+            <a:ext cx="88076" cy="152400"/>
           </a:xfrm>
           <a:prstGeom prst="rect">
             <a:avLst/>
@@ -4334,13 +4413,13 @@
             <a:r>
               <a:rPr lang="en-US" sz="980" dirty="0">
                 <a:solidFill>
-                  <a:srgbClr val="90EE90"/>
+                  <a:srgbClr val="E2E8F0"/>
                 </a:solidFill>
                 <a:latin typeface="ui-monospace" pitchFamily="34" charset="0"/>
                 <a:ea typeface="ui-monospace" pitchFamily="34" charset="-122"/>
                 <a:cs typeface="ui-monospace" pitchFamily="34" charset="-120"/>
               </a:rPr>
-              <a:t>public class</a:t>
+              <a:t>}</a:t>
             </a:r>
             <a:endParaRPr lang="en-US" sz="980" dirty="0"/>
           </a:p>
@@ -4348,14 +4427,14 @@
       </p:sp>
       <p:sp>
         <p:nvSpPr>
-          <p:cNvPr id="55" name="Text 31"/>
-          <p:cNvSpPr/>
-          <p:nvPr/>
-        </p:nvSpPr>
-        <p:spPr>
-          <a:xfrm>
-            <a:off x="5650557" y="2405955"/>
-            <a:ext cx="968350" cy="152400"/>
+          <p:cNvPr id="52" name="Text 28"/>
+          <p:cNvSpPr/>
+          <p:nvPr/>
+        </p:nvSpPr>
+        <p:spPr>
+          <a:xfrm>
+            <a:off x="4895850" y="1676400"/>
+            <a:ext cx="1045458" cy="304800"/>
           </a:xfrm>
           <a:prstGeom prst="rect">
             <a:avLst/>
@@ -4371,6 +4450,50 @@
           <a:p>
             <a:pPr marL="0" indent="0">
               <a:lnSpc>
+                <a:spcPts val="2400"/>
+              </a:lnSpc>
+              <a:buNone/>
+            </a:pPr>
+            <a:r>
+              <a:rPr lang="en-US" sz="1646" b="1" dirty="0">
+                <a:solidFill>
+                  <a:srgbClr val="60A5FA"/>
+                </a:solidFill>
+                <a:latin typeface="ui-sans-serif" pitchFamily="34" charset="0"/>
+                <a:ea typeface="ui-sans-serif" pitchFamily="34" charset="-122"/>
+                <a:cs typeface="ui-sans-serif" pitchFamily="34" charset="-120"/>
+              </a:rPr>
+              <a:t>Service</a:t>
+            </a:r>
+            <a:endParaRPr lang="en-US" sz="1646" dirty="0"/>
+          </a:p>
+        </p:txBody>
+      </p:sp>
+      <p:sp>
+        <p:nvSpPr>
+          <p:cNvPr id="53" name="Text 29"/>
+          <p:cNvSpPr/>
+          <p:nvPr/>
+        </p:nvSpPr>
+        <p:spPr>
+          <a:xfrm>
+            <a:off x="4610100" y="2219325"/>
+            <a:ext cx="704284" cy="152400"/>
+          </a:xfrm>
+          <a:prstGeom prst="rect">
+            <a:avLst/>
+          </a:prstGeom>
+          <a:noFill/>
+          <a:ln/>
+        </p:spPr>
+        <p:txBody>
+          <a:bodyPr wrap="square" lIns="0" tIns="0" rIns="0" bIns="0" rtlCol="0" anchor="t">
+            <a:spAutoFit/>
+          </a:bodyPr>
+          <a:lstStyle/>
+          <a:p>
+            <a:pPr marL="0" indent="0">
+              <a:lnSpc>
                 <a:spcPts val="1470"/>
               </a:lnSpc>
               <a:buNone/>
@@ -4378,13 +4501,13 @@
             <a:r>
               <a:rPr lang="en-US" sz="980" dirty="0">
                 <a:solidFill>
-                  <a:srgbClr val="FFA500"/>
+                  <a:srgbClr val="90EE90"/>
                 </a:solidFill>
                 <a:latin typeface="ui-monospace" pitchFamily="34" charset="0"/>
                 <a:ea typeface="ui-monospace" pitchFamily="34" charset="-122"/>
                 <a:cs typeface="ui-monospace" pitchFamily="34" charset="-120"/>
               </a:rPr>
-              <a:t>TodoService</a:t>
+              <a:t>@Service</a:t>
             </a:r>
             <a:endParaRPr lang="en-US" sz="980" dirty="0"/>
           </a:p>
@@ -4392,14 +4515,14 @@
       </p:sp>
       <p:sp>
         <p:nvSpPr>
-          <p:cNvPr id="56" name="Text 32"/>
-          <p:cNvSpPr/>
-          <p:nvPr/>
-        </p:nvSpPr>
-        <p:spPr>
-          <a:xfrm>
-            <a:off x="6530876" y="2405955"/>
-            <a:ext cx="2289006" cy="525661"/>
+          <p:cNvPr id="54" name="Text 30"/>
+          <p:cNvSpPr/>
+          <p:nvPr/>
+        </p:nvSpPr>
+        <p:spPr>
+          <a:xfrm>
+            <a:off x="4610100" y="2405955"/>
+            <a:ext cx="1056427" cy="152400"/>
           </a:xfrm>
           <a:prstGeom prst="rect">
             <a:avLst/>
@@ -4422,13 +4545,13 @@
             <a:r>
               <a:rPr lang="en-US" sz="980" dirty="0">
                 <a:solidFill>
-                  <a:srgbClr val="E2E8F0"/>
+                  <a:srgbClr val="90EE90"/>
                 </a:solidFill>
                 <a:latin typeface="ui-monospace" pitchFamily="34" charset="0"/>
                 <a:ea typeface="ui-monospace" pitchFamily="34" charset="-122"/>
                 <a:cs typeface="ui-monospace" pitchFamily="34" charset="-120"/>
               </a:rPr>
-              <a:t>{</a:t>
+              <a:t>public class</a:t>
             </a:r>
             <a:endParaRPr lang="en-US" sz="980" dirty="0"/>
           </a:p>
@@ -4436,14 +4559,14 @@
       </p:sp>
       <p:sp>
         <p:nvSpPr>
-          <p:cNvPr id="57" name="Text 33"/>
-          <p:cNvSpPr/>
-          <p:nvPr/>
-        </p:nvSpPr>
-        <p:spPr>
-          <a:xfrm>
-            <a:off x="4930229" y="2779216"/>
-            <a:ext cx="1144339" cy="152400"/>
+          <p:cNvPr id="55" name="Text 31"/>
+          <p:cNvSpPr/>
+          <p:nvPr/>
+        </p:nvSpPr>
+        <p:spPr>
+          <a:xfrm>
+            <a:off x="5650557" y="2405955"/>
+            <a:ext cx="968350" cy="152400"/>
           </a:xfrm>
           <a:prstGeom prst="rect">
             <a:avLst/>
@@ -4466,13 +4589,13 @@
             <a:r>
               <a:rPr lang="en-US" sz="980" dirty="0">
                 <a:solidFill>
-                  <a:srgbClr val="90EE90"/>
+                  <a:srgbClr val="FFA500"/>
                 </a:solidFill>
                 <a:latin typeface="ui-monospace" pitchFamily="34" charset="0"/>
                 <a:ea typeface="ui-monospace" pitchFamily="34" charset="-122"/>
                 <a:cs typeface="ui-monospace" pitchFamily="34" charset="-120"/>
               </a:rPr>
-              <a:t>private final</a:t>
+              <a:t>TodoService</a:t>
             </a:r>
             <a:endParaRPr lang="en-US" sz="980" dirty="0"/>
           </a:p>
@@ -4480,14 +4603,14 @@
       </p:sp>
       <p:sp>
         <p:nvSpPr>
-          <p:cNvPr id="58" name="Text 34"/>
-          <p:cNvSpPr/>
-          <p:nvPr/>
-        </p:nvSpPr>
-        <p:spPr>
-          <a:xfrm>
-            <a:off x="6050607" y="2779216"/>
-            <a:ext cx="1232416" cy="152400"/>
+          <p:cNvPr id="56" name="Text 32"/>
+          <p:cNvSpPr/>
+          <p:nvPr/>
+        </p:nvSpPr>
+        <p:spPr>
+          <a:xfrm>
+            <a:off x="6530876" y="2405955"/>
+            <a:ext cx="2289006" cy="525661"/>
           </a:xfrm>
           <a:prstGeom prst="rect">
             <a:avLst/>
@@ -4510,13 +4633,13 @@
             <a:r>
               <a:rPr lang="en-US" sz="980" dirty="0">
                 <a:solidFill>
-                  <a:srgbClr val="FFA500"/>
+                  <a:srgbClr val="E2E8F0"/>
                 </a:solidFill>
                 <a:latin typeface="ui-monospace" pitchFamily="34" charset="0"/>
                 <a:ea typeface="ui-monospace" pitchFamily="34" charset="-122"/>
                 <a:cs typeface="ui-monospace" pitchFamily="34" charset="-120"/>
               </a:rPr>
-              <a:t>TodoRepository</a:t>
+              <a:t>{</a:t>
             </a:r>
             <a:endParaRPr lang="en-US" sz="980" dirty="0"/>
           </a:p>
@@ -4524,14 +4647,14 @@
       </p:sp>
       <p:sp>
         <p:nvSpPr>
-          <p:cNvPr id="59" name="Text 35"/>
-          <p:cNvSpPr/>
-          <p:nvPr/>
-        </p:nvSpPr>
-        <p:spPr>
-          <a:xfrm>
-            <a:off x="7170986" y="2779216"/>
-            <a:ext cx="4225379" cy="525661"/>
+          <p:cNvPr id="57" name="Text 33"/>
+          <p:cNvSpPr/>
+          <p:nvPr/>
+        </p:nvSpPr>
+        <p:spPr>
+          <a:xfrm>
+            <a:off x="4930229" y="2779216"/>
+            <a:ext cx="1144339" cy="152400"/>
           </a:xfrm>
           <a:prstGeom prst="rect">
             <a:avLst/>
@@ -4554,13 +4677,13 @@
             <a:r>
               <a:rPr lang="en-US" sz="980" dirty="0">
                 <a:solidFill>
-                  <a:srgbClr val="E2E8F0"/>
+                  <a:srgbClr val="90EE90"/>
                 </a:solidFill>
                 <a:latin typeface="ui-monospace" pitchFamily="34" charset="0"/>
                 <a:ea typeface="ui-monospace" pitchFamily="34" charset="-122"/>
                 <a:cs typeface="ui-monospace" pitchFamily="34" charset="-120"/>
               </a:rPr>
-              <a:t>todoRepository;</a:t>
+              <a:t>private final</a:t>
             </a:r>
             <a:endParaRPr lang="en-US" sz="980" dirty="0"/>
           </a:p>
@@ -4568,14 +4691,14 @@
       </p:sp>
       <p:sp>
         <p:nvSpPr>
-          <p:cNvPr id="60" name="Text 36"/>
-          <p:cNvSpPr/>
-          <p:nvPr/>
-        </p:nvSpPr>
-        <p:spPr>
-          <a:xfrm>
-            <a:off x="4930229" y="3152477"/>
-            <a:ext cx="528295" cy="152400"/>
+          <p:cNvPr id="58" name="Text 34"/>
+          <p:cNvSpPr/>
+          <p:nvPr/>
+        </p:nvSpPr>
+        <p:spPr>
+          <a:xfrm>
+            <a:off x="6050607" y="2779216"/>
+            <a:ext cx="1232416" cy="152400"/>
           </a:xfrm>
           <a:prstGeom prst="rect">
             <a:avLst/>
@@ -4598,13 +4721,13 @@
             <a:r>
               <a:rPr lang="en-US" sz="980" dirty="0">
                 <a:solidFill>
-                  <a:srgbClr val="90EE90"/>
+                  <a:srgbClr val="FFA500"/>
                 </a:solidFill>
                 <a:latin typeface="ui-monospace" pitchFamily="34" charset="0"/>
                 <a:ea typeface="ui-monospace" pitchFamily="34" charset="-122"/>
                 <a:cs typeface="ui-monospace" pitchFamily="34" charset="-120"/>
               </a:rPr>
-              <a:t>public</a:t>
+              <a:t>TodoRepository</a:t>
             </a:r>
             <a:endParaRPr lang="en-US" sz="980" dirty="0"/>
           </a:p>
@@ -4612,14 +4735,14 @@
       </p:sp>
       <p:sp>
         <p:nvSpPr>
-          <p:cNvPr id="61" name="Text 37"/>
-          <p:cNvSpPr/>
-          <p:nvPr/>
-        </p:nvSpPr>
-        <p:spPr>
-          <a:xfrm>
-            <a:off x="5410498" y="3152477"/>
-            <a:ext cx="4841587" cy="339030"/>
+          <p:cNvPr id="59" name="Text 35"/>
+          <p:cNvSpPr/>
+          <p:nvPr/>
+        </p:nvSpPr>
+        <p:spPr>
+          <a:xfrm>
+            <a:off x="7170986" y="2779216"/>
+            <a:ext cx="4225379" cy="525661"/>
           </a:xfrm>
           <a:prstGeom prst="rect">
             <a:avLst/>
@@ -4648,7 +4771,7 @@
                 <a:ea typeface="ui-monospace" pitchFamily="34" charset="-122"/>
                 <a:cs typeface="ui-monospace" pitchFamily="34" charset="-120"/>
               </a:rPr>
-              <a:t>TodoService(TodoRepository todoRepository) {</a:t>
+              <a:t>todoRepository;</a:t>
             </a:r>
             <a:endParaRPr lang="en-US" sz="980" dirty="0"/>
           </a:p>
@@ -4656,14 +4779,14 @@
       </p:sp>
       <p:sp>
         <p:nvSpPr>
-          <p:cNvPr id="62" name="Text 38"/>
-          <p:cNvSpPr/>
-          <p:nvPr/>
-        </p:nvSpPr>
-        <p:spPr>
-          <a:xfrm>
-            <a:off x="5250359" y="3339108"/>
-            <a:ext cx="352142" cy="152400"/>
+          <p:cNvPr id="60" name="Text 36"/>
+          <p:cNvSpPr/>
+          <p:nvPr/>
+        </p:nvSpPr>
+        <p:spPr>
+          <a:xfrm>
+            <a:off x="4930229" y="3152477"/>
+            <a:ext cx="528295" cy="152400"/>
           </a:xfrm>
           <a:prstGeom prst="rect">
             <a:avLst/>
@@ -4692,7 +4815,7 @@
                 <a:ea typeface="ui-monospace" pitchFamily="34" charset="-122"/>
                 <a:cs typeface="ui-monospace" pitchFamily="34" charset="-120"/>
               </a:rPr>
-              <a:t>this</a:t>
+              <a:t>public</a:t>
             </a:r>
             <a:endParaRPr lang="en-US" sz="980" dirty="0"/>
           </a:p>
@@ -4700,14 +4823,14 @@
       </p:sp>
       <p:sp>
         <p:nvSpPr>
-          <p:cNvPr id="63" name="Text 39"/>
-          <p:cNvSpPr/>
-          <p:nvPr/>
-        </p:nvSpPr>
-        <p:spPr>
-          <a:xfrm>
-            <a:off x="5570488" y="3339108"/>
-            <a:ext cx="3601194" cy="712291"/>
+          <p:cNvPr id="61" name="Text 37"/>
+          <p:cNvSpPr/>
+          <p:nvPr/>
+        </p:nvSpPr>
+        <p:spPr>
+          <a:xfrm>
+            <a:off x="5410498" y="3152477"/>
+            <a:ext cx="4841587" cy="339030"/>
           </a:xfrm>
           <a:prstGeom prst="rect">
             <a:avLst/>
@@ -4736,10 +4859,34 @@
                 <a:ea typeface="ui-monospace" pitchFamily="34" charset="-122"/>
                 <a:cs typeface="ui-monospace" pitchFamily="34" charset="-120"/>
               </a:rPr>
-              <a:t>.todoRepository = todoRepository;</a:t>
+              <a:t>TodoService(TodoRepository todoRepository) {</a:t>
             </a:r>
             <a:endParaRPr lang="en-US" sz="980" dirty="0"/>
           </a:p>
+        </p:txBody>
+      </p:sp>
+      <p:sp>
+        <p:nvSpPr>
+          <p:cNvPr id="62" name="Text 38"/>
+          <p:cNvSpPr/>
+          <p:nvPr/>
+        </p:nvSpPr>
+        <p:spPr>
+          <a:xfrm>
+            <a:off x="5250359" y="3339108"/>
+            <a:ext cx="352142" cy="152400"/>
+          </a:xfrm>
+          <a:prstGeom prst="rect">
+            <a:avLst/>
+          </a:prstGeom>
+          <a:noFill/>
+          <a:ln/>
+        </p:spPr>
+        <p:txBody>
+          <a:bodyPr wrap="square" lIns="0" tIns="0" rIns="0" bIns="0" rtlCol="0" anchor="t">
+            <a:spAutoFit/>
+          </a:bodyPr>
+          <a:lstStyle/>
           <a:p>
             <a:pPr marL="0" indent="0">
               <a:lnSpc>
@@ -4750,13 +4897,13 @@
             <a:r>
               <a:rPr lang="en-US" sz="980" dirty="0">
                 <a:solidFill>
-                  <a:srgbClr val="E2E8F0"/>
+                  <a:srgbClr val="90EE90"/>
                 </a:solidFill>
                 <a:latin typeface="ui-monospace" pitchFamily="34" charset="0"/>
                 <a:ea typeface="ui-monospace" pitchFamily="34" charset="-122"/>
                 <a:cs typeface="ui-monospace" pitchFamily="34" charset="-120"/>
               </a:rPr>
-              <a:t>    }</a:t>
+              <a:t>this</a:t>
             </a:r>
             <a:endParaRPr lang="en-US" sz="980" dirty="0"/>
           </a:p>
@@ -4764,14 +4911,14 @@
       </p:sp>
       <p:sp>
         <p:nvSpPr>
-          <p:cNvPr id="64" name="Text 40"/>
-          <p:cNvSpPr/>
-          <p:nvPr/>
-        </p:nvSpPr>
-        <p:spPr>
-          <a:xfrm>
-            <a:off x="4930229" y="3898999"/>
-            <a:ext cx="528295" cy="152400"/>
+          <p:cNvPr id="63" name="Text 39"/>
+          <p:cNvSpPr/>
+          <p:nvPr/>
+        </p:nvSpPr>
+        <p:spPr>
+          <a:xfrm>
+            <a:off x="5570488" y="3339108"/>
+            <a:ext cx="3601194" cy="712291"/>
           </a:xfrm>
           <a:prstGeom prst="rect">
             <a:avLst/>
@@ -4794,40 +4941,16 @@
             <a:r>
               <a:rPr lang="en-US" sz="980" dirty="0">
                 <a:solidFill>
-                  <a:srgbClr val="90EE90"/>
+                  <a:srgbClr val="E2E8F0"/>
                 </a:solidFill>
                 <a:latin typeface="ui-monospace" pitchFamily="34" charset="0"/>
                 <a:ea typeface="ui-monospace" pitchFamily="34" charset="-122"/>
                 <a:cs typeface="ui-monospace" pitchFamily="34" charset="-120"/>
               </a:rPr>
-              <a:t>public</a:t>
+              <a:t>.todoRepository = todoRepository;</a:t>
             </a:r>
             <a:endParaRPr lang="en-US" sz="980" dirty="0"/>
           </a:p>
-        </p:txBody>
-      </p:sp>
-      <p:sp>
-        <p:nvSpPr>
-          <p:cNvPr id="65" name="Text 41"/>
-          <p:cNvSpPr/>
-          <p:nvPr/>
-        </p:nvSpPr>
-        <p:spPr>
-          <a:xfrm>
-            <a:off x="5410498" y="3898999"/>
-            <a:ext cx="2905051" cy="339030"/>
-          </a:xfrm>
-          <a:prstGeom prst="rect">
-            <a:avLst/>
-          </a:prstGeom>
-          <a:noFill/>
-          <a:ln/>
-        </p:spPr>
-        <p:txBody>
-          <a:bodyPr wrap="square" lIns="0" tIns="0" rIns="0" bIns="0" rtlCol="0" anchor="t">
-            <a:spAutoFit/>
-          </a:bodyPr>
-          <a:lstStyle/>
           <a:p>
             <a:pPr marL="0" indent="0">
               <a:lnSpc>
@@ -4844,7 +4967,7 @@
                 <a:ea typeface="ui-monospace" pitchFamily="34" charset="-122"/>
                 <a:cs typeface="ui-monospace" pitchFamily="34" charset="-120"/>
               </a:rPr>
-              <a:t>List&lt;Todo&gt; findAll() {</a:t>
+              <a:t>    }</a:t>
             </a:r>
             <a:endParaRPr lang="en-US" sz="980" dirty="0"/>
           </a:p>
@@ -4852,14 +4975,14 @@
       </p:sp>
       <p:sp>
         <p:nvSpPr>
-          <p:cNvPr id="66" name="Text 42"/>
-          <p:cNvSpPr/>
-          <p:nvPr/>
-        </p:nvSpPr>
-        <p:spPr>
-          <a:xfrm>
-            <a:off x="5250359" y="4085630"/>
-            <a:ext cx="2112690" cy="152400"/>
+          <p:cNvPr id="64" name="Text 40"/>
+          <p:cNvSpPr/>
+          <p:nvPr/>
+        </p:nvSpPr>
+        <p:spPr>
+          <a:xfrm>
+            <a:off x="4930229" y="3898999"/>
+            <a:ext cx="528295" cy="152400"/>
           </a:xfrm>
           <a:prstGeom prst="rect">
             <a:avLst/>
@@ -4882,13 +5005,13 @@
             <a:r>
               <a:rPr lang="en-US" sz="980" dirty="0">
                 <a:solidFill>
-                  <a:srgbClr val="718096"/>
+                  <a:srgbClr val="90EE90"/>
                 </a:solidFill>
                 <a:latin typeface="ui-monospace" pitchFamily="34" charset="0"/>
                 <a:ea typeface="ui-monospace" pitchFamily="34" charset="-122"/>
                 <a:cs typeface="ui-monospace" pitchFamily="34" charset="-120"/>
               </a:rPr>
-              <a:t>// Service -&gt; Repository</a:t>
+              <a:t>public</a:t>
             </a:r>
             <a:endParaRPr lang="en-US" sz="980" dirty="0"/>
           </a:p>
@@ -4896,14 +5019,14 @@
       </p:sp>
       <p:sp>
         <p:nvSpPr>
-          <p:cNvPr id="67" name="Text 43"/>
-          <p:cNvSpPr/>
-          <p:nvPr/>
-        </p:nvSpPr>
-        <p:spPr>
-          <a:xfrm>
-            <a:off x="5250359" y="4272260"/>
-            <a:ext cx="528295" cy="152400"/>
+          <p:cNvPr id="65" name="Text 41"/>
+          <p:cNvSpPr/>
+          <p:nvPr/>
+        </p:nvSpPr>
+        <p:spPr>
+          <a:xfrm>
+            <a:off x="5410498" y="3898999"/>
+            <a:ext cx="2905051" cy="339030"/>
           </a:xfrm>
           <a:prstGeom prst="rect">
             <a:avLst/>
@@ -4926,13 +5049,13 @@
             <a:r>
               <a:rPr lang="en-US" sz="980" dirty="0">
                 <a:solidFill>
-                  <a:srgbClr val="90EE90"/>
+                  <a:srgbClr val="E2E8F0"/>
                 </a:solidFill>
                 <a:latin typeface="ui-monospace" pitchFamily="34" charset="0"/>
                 <a:ea typeface="ui-monospace" pitchFamily="34" charset="-122"/>
                 <a:cs typeface="ui-monospace" pitchFamily="34" charset="-120"/>
               </a:rPr>
-              <a:t>return</a:t>
+              <a:t>List&lt;Todo&gt; findAll() {</a:t>
             </a:r>
             <a:endParaRPr lang="en-US" sz="980" dirty="0"/>
           </a:p>
@@ -4940,14 +5063,14 @@
       </p:sp>
       <p:sp>
         <p:nvSpPr>
-          <p:cNvPr id="68" name="Text 44"/>
-          <p:cNvSpPr/>
-          <p:nvPr/>
-        </p:nvSpPr>
-        <p:spPr>
-          <a:xfrm>
-            <a:off x="5730627" y="4272260"/>
-            <a:ext cx="3201144" cy="712291"/>
+          <p:cNvPr id="66" name="Text 42"/>
+          <p:cNvSpPr/>
+          <p:nvPr/>
+        </p:nvSpPr>
+        <p:spPr>
+          <a:xfrm>
+            <a:off x="5250359" y="4085630"/>
+            <a:ext cx="2112690" cy="152400"/>
           </a:xfrm>
           <a:prstGeom prst="rect">
             <a:avLst/>
@@ -4970,16 +5093,40 @@
             <a:r>
               <a:rPr lang="en-US" sz="980" dirty="0">
                 <a:solidFill>
-                  <a:srgbClr val="E2E8F0"/>
+                  <a:srgbClr val="718096"/>
                 </a:solidFill>
                 <a:latin typeface="ui-monospace" pitchFamily="34" charset="0"/>
                 <a:ea typeface="ui-monospace" pitchFamily="34" charset="-122"/>
                 <a:cs typeface="ui-monospace" pitchFamily="34" charset="-120"/>
               </a:rPr>
-              <a:t>todoRepository.findAll();</a:t>
+              <a:t>// Service -&gt; Repository</a:t>
             </a:r>
             <a:endParaRPr lang="en-US" sz="980" dirty="0"/>
           </a:p>
+        </p:txBody>
+      </p:sp>
+      <p:sp>
+        <p:nvSpPr>
+          <p:cNvPr id="67" name="Text 43"/>
+          <p:cNvSpPr/>
+          <p:nvPr/>
+        </p:nvSpPr>
+        <p:spPr>
+          <a:xfrm>
+            <a:off x="5250359" y="4272260"/>
+            <a:ext cx="528295" cy="152400"/>
+          </a:xfrm>
+          <a:prstGeom prst="rect">
+            <a:avLst/>
+          </a:prstGeom>
+          <a:noFill/>
+          <a:ln/>
+        </p:spPr>
+        <p:txBody>
+          <a:bodyPr wrap="square" lIns="0" tIns="0" rIns="0" bIns="0" rtlCol="0" anchor="t">
+            <a:spAutoFit/>
+          </a:bodyPr>
+          <a:lstStyle/>
           <a:p>
             <a:pPr marL="0" indent="0">
               <a:lnSpc>
@@ -4990,13 +5137,13 @@
             <a:r>
               <a:rPr lang="en-US" sz="980" dirty="0">
                 <a:solidFill>
-                  <a:srgbClr val="E2E8F0"/>
+                  <a:srgbClr val="90EE90"/>
                 </a:solidFill>
                 <a:latin typeface="ui-monospace" pitchFamily="34" charset="0"/>
                 <a:ea typeface="ui-monospace" pitchFamily="34" charset="-122"/>
                 <a:cs typeface="ui-monospace" pitchFamily="34" charset="-120"/>
               </a:rPr>
-              <a:t>    }</a:t>
+              <a:t>return</a:t>
             </a:r>
             <a:endParaRPr lang="en-US" sz="980" dirty="0"/>
           </a:p>
@@ -5004,14 +5151,14 @@
       </p:sp>
       <p:sp>
         <p:nvSpPr>
-          <p:cNvPr id="69" name="Text 45"/>
-          <p:cNvSpPr/>
-          <p:nvPr/>
-        </p:nvSpPr>
-        <p:spPr>
-          <a:xfrm>
-            <a:off x="4930229" y="4832152"/>
-            <a:ext cx="1848624" cy="152400"/>
+          <p:cNvPr id="68" name="Text 44"/>
+          <p:cNvSpPr/>
+          <p:nvPr/>
+        </p:nvSpPr>
+        <p:spPr>
+          <a:xfrm>
+            <a:off x="5730627" y="4272260"/>
+            <a:ext cx="3201144" cy="712291"/>
           </a:xfrm>
           <a:prstGeom prst="rect">
             <a:avLst/>
@@ -5034,40 +5181,16 @@
             <a:r>
               <a:rPr lang="en-US" sz="980" dirty="0">
                 <a:solidFill>
-                  <a:srgbClr val="718096"/>
+                  <a:srgbClr val="E2E8F0"/>
                 </a:solidFill>
                 <a:latin typeface="ui-monospace" pitchFamily="34" charset="0"/>
                 <a:ea typeface="ui-monospace" pitchFamily="34" charset="-122"/>
                 <a:cs typeface="ui-monospace" pitchFamily="34" charset="-120"/>
               </a:rPr>
-              <a:t>// ... logique métier</a:t>
+              <a:t>todoRepository.findAll();</a:t>
             </a:r>
             <a:endParaRPr lang="en-US" sz="980" dirty="0"/>
           </a:p>
-        </p:txBody>
-      </p:sp>
-      <p:sp>
-        <p:nvSpPr>
-          <p:cNvPr id="70" name="Text 46"/>
-          <p:cNvSpPr/>
-          <p:nvPr/>
-        </p:nvSpPr>
-        <p:spPr>
-          <a:xfrm>
-            <a:off x="6610796" y="5018782"/>
-            <a:ext cx="88076" cy="152400"/>
-          </a:xfrm>
-          <a:prstGeom prst="rect">
-            <a:avLst/>
-          </a:prstGeom>
-          <a:noFill/>
-          <a:ln/>
-        </p:spPr>
-        <p:txBody>
-          <a:bodyPr wrap="square" lIns="0" tIns="0" rIns="0" bIns="0" rtlCol="0" anchor="t">
-            <a:spAutoFit/>
-          </a:bodyPr>
-          <a:lstStyle/>
           <a:p>
             <a:pPr marL="0" indent="0">
               <a:lnSpc>
@@ -5084,7 +5207,7 @@
                 <a:ea typeface="ui-monospace" pitchFamily="34" charset="-122"/>
                 <a:cs typeface="ui-monospace" pitchFamily="34" charset="-120"/>
               </a:rPr>
-              <a:t>}</a:t>
+              <a:t>    }</a:t>
             </a:r>
             <a:endParaRPr lang="en-US" sz="980" dirty="0"/>
           </a:p>
@@ -5092,14 +5215,14 @@
       </p:sp>
       <p:sp>
         <p:nvSpPr>
-          <p:cNvPr id="71" name="Text 47"/>
-          <p:cNvSpPr/>
-          <p:nvPr/>
-        </p:nvSpPr>
-        <p:spPr>
-          <a:xfrm>
-            <a:off x="8467725" y="1676400"/>
-            <a:ext cx="1533808" cy="304800"/>
+          <p:cNvPr id="69" name="Text 45"/>
+          <p:cNvSpPr/>
+          <p:nvPr/>
+        </p:nvSpPr>
+        <p:spPr>
+          <a:xfrm>
+            <a:off x="4930229" y="4832152"/>
+            <a:ext cx="1848624" cy="177421"/>
           </a:xfrm>
           <a:prstGeom prst="rect">
             <a:avLst/>
@@ -5115,64 +5238,20 @@
           <a:p>
             <a:pPr marL="0" indent="0">
               <a:lnSpc>
-                <a:spcPts val="2400"/>
-              </a:lnSpc>
-              <a:buNone/>
-            </a:pPr>
-            <a:r>
-              <a:rPr lang="en-US" sz="1646" b="1" dirty="0">
-                <a:solidFill>
-                  <a:srgbClr val="C084FC"/>
-                </a:solidFill>
-                <a:latin typeface="ui-sans-serif" pitchFamily="34" charset="0"/>
-                <a:ea typeface="ui-sans-serif" pitchFamily="34" charset="-122"/>
-                <a:cs typeface="ui-sans-serif" pitchFamily="34" charset="-120"/>
-              </a:rPr>
-              <a:t>Repository</a:t>
-            </a:r>
-            <a:endParaRPr lang="en-US" sz="1646" dirty="0"/>
-          </a:p>
-        </p:txBody>
-      </p:sp>
-      <p:sp>
-        <p:nvSpPr>
-          <p:cNvPr id="72" name="Text 48"/>
-          <p:cNvSpPr/>
-          <p:nvPr/>
-        </p:nvSpPr>
-        <p:spPr>
-          <a:xfrm>
-            <a:off x="8267700" y="2219325"/>
-            <a:ext cx="968350" cy="152400"/>
-          </a:xfrm>
-          <a:prstGeom prst="rect">
-            <a:avLst/>
-          </a:prstGeom>
-          <a:noFill/>
-          <a:ln/>
-        </p:spPr>
-        <p:txBody>
-          <a:bodyPr wrap="square" lIns="0" tIns="0" rIns="0" bIns="0" rtlCol="0" anchor="t">
-            <a:spAutoFit/>
-          </a:bodyPr>
-          <a:lstStyle/>
-          <a:p>
-            <a:pPr marL="0" indent="0">
-              <a:lnSpc>
                 <a:spcPts val="1470"/>
               </a:lnSpc>
               <a:buNone/>
             </a:pPr>
             <a:r>
-              <a:rPr lang="en-US" sz="980" dirty="0">
-                <a:solidFill>
-                  <a:srgbClr val="90EE90"/>
+              <a:rPr lang="ru-RU" sz="980" dirty="0">
+                <a:solidFill>
+                  <a:srgbClr val="718096"/>
                 </a:solidFill>
                 <a:latin typeface="ui-monospace" pitchFamily="34" charset="0"/>
                 <a:ea typeface="ui-monospace" pitchFamily="34" charset="-122"/>
                 <a:cs typeface="ui-monospace" pitchFamily="34" charset="-120"/>
               </a:rPr>
-              <a:t>@Repository</a:t>
+              <a:t>// ... бизнес-логика</a:t>
             </a:r>
             <a:endParaRPr lang="en-US" sz="980" dirty="0"/>
           </a:p>
@@ -5180,14 +5259,14 @@
       </p:sp>
       <p:sp>
         <p:nvSpPr>
-          <p:cNvPr id="73" name="Text 49"/>
-          <p:cNvSpPr/>
-          <p:nvPr/>
-        </p:nvSpPr>
-        <p:spPr>
-          <a:xfrm>
-            <a:off x="8267700" y="2405955"/>
-            <a:ext cx="1408405" cy="152400"/>
+          <p:cNvPr id="70" name="Text 46"/>
+          <p:cNvSpPr/>
+          <p:nvPr/>
+        </p:nvSpPr>
+        <p:spPr>
+          <a:xfrm>
+            <a:off x="6610796" y="5018782"/>
+            <a:ext cx="88076" cy="152400"/>
           </a:xfrm>
           <a:prstGeom prst="rect">
             <a:avLst/>
@@ -5210,13 +5289,13 @@
             <a:r>
               <a:rPr lang="en-US" sz="980" dirty="0">
                 <a:solidFill>
-                  <a:srgbClr val="90EE90"/>
+                  <a:srgbClr val="E2E8F0"/>
                 </a:solidFill>
                 <a:latin typeface="ui-monospace" pitchFamily="34" charset="0"/>
                 <a:ea typeface="ui-monospace" pitchFamily="34" charset="-122"/>
                 <a:cs typeface="ui-monospace" pitchFamily="34" charset="-120"/>
               </a:rPr>
-              <a:t>public interface</a:t>
+              <a:t>}</a:t>
             </a:r>
             <a:endParaRPr lang="en-US" sz="980" dirty="0"/>
           </a:p>
@@ -5224,14 +5303,14 @@
       </p:sp>
       <p:sp>
         <p:nvSpPr>
-          <p:cNvPr id="74" name="Text 50"/>
-          <p:cNvSpPr/>
-          <p:nvPr/>
-        </p:nvSpPr>
-        <p:spPr>
-          <a:xfrm>
-            <a:off x="9628138" y="2405955"/>
-            <a:ext cx="1232416" cy="152400"/>
+          <p:cNvPr id="71" name="Text 47"/>
+          <p:cNvSpPr/>
+          <p:nvPr/>
+        </p:nvSpPr>
+        <p:spPr>
+          <a:xfrm>
+            <a:off x="8467725" y="1676400"/>
+            <a:ext cx="1533808" cy="304800"/>
           </a:xfrm>
           <a:prstGeom prst="rect">
             <a:avLst/>
@@ -5247,6 +5326,50 @@
           <a:p>
             <a:pPr marL="0" indent="0">
               <a:lnSpc>
+                <a:spcPts val="2400"/>
+              </a:lnSpc>
+              <a:buNone/>
+            </a:pPr>
+            <a:r>
+              <a:rPr lang="en-US" sz="1646" b="1" dirty="0">
+                <a:solidFill>
+                  <a:srgbClr val="C084FC"/>
+                </a:solidFill>
+                <a:latin typeface="ui-sans-serif" pitchFamily="34" charset="0"/>
+                <a:ea typeface="ui-sans-serif" pitchFamily="34" charset="-122"/>
+                <a:cs typeface="ui-sans-serif" pitchFamily="34" charset="-120"/>
+              </a:rPr>
+              <a:t>Repository</a:t>
+            </a:r>
+            <a:endParaRPr lang="en-US" sz="1646" dirty="0"/>
+          </a:p>
+        </p:txBody>
+      </p:sp>
+      <p:sp>
+        <p:nvSpPr>
+          <p:cNvPr id="72" name="Text 48"/>
+          <p:cNvSpPr/>
+          <p:nvPr/>
+        </p:nvSpPr>
+        <p:spPr>
+          <a:xfrm>
+            <a:off x="8267700" y="2219325"/>
+            <a:ext cx="968350" cy="152400"/>
+          </a:xfrm>
+          <a:prstGeom prst="rect">
+            <a:avLst/>
+          </a:prstGeom>
+          <a:noFill/>
+          <a:ln/>
+        </p:spPr>
+        <p:txBody>
+          <a:bodyPr wrap="square" lIns="0" tIns="0" rIns="0" bIns="0" rtlCol="0" anchor="t">
+            <a:spAutoFit/>
+          </a:bodyPr>
+          <a:lstStyle/>
+          <a:p>
+            <a:pPr marL="0" indent="0">
+              <a:lnSpc>
                 <a:spcPts val="1470"/>
               </a:lnSpc>
               <a:buNone/>
@@ -5254,13 +5377,13 @@
             <a:r>
               <a:rPr lang="en-US" sz="980" dirty="0">
                 <a:solidFill>
-                  <a:srgbClr val="FFA500"/>
+                  <a:srgbClr val="90EE90"/>
                 </a:solidFill>
                 <a:latin typeface="ui-monospace" pitchFamily="34" charset="0"/>
                 <a:ea typeface="ui-monospace" pitchFamily="34" charset="-122"/>
                 <a:cs typeface="ui-monospace" pitchFamily="34" charset="-120"/>
               </a:rPr>
-              <a:t>TodoRepository</a:t>
+              <a:t>@Repository</a:t>
             </a:r>
             <a:endParaRPr lang="en-US" sz="980" dirty="0"/>
           </a:p>
@@ -5268,14 +5391,14 @@
       </p:sp>
       <p:sp>
         <p:nvSpPr>
-          <p:cNvPr id="75" name="Text 51"/>
-          <p:cNvSpPr/>
-          <p:nvPr/>
-        </p:nvSpPr>
-        <p:spPr>
-          <a:xfrm>
-            <a:off x="10828586" y="2405955"/>
-            <a:ext cx="616208" cy="152400"/>
+          <p:cNvPr id="73" name="Text 49"/>
+          <p:cNvSpPr/>
+          <p:nvPr/>
+        </p:nvSpPr>
+        <p:spPr>
+          <a:xfrm>
+            <a:off x="8267700" y="2405955"/>
+            <a:ext cx="1408405" cy="152400"/>
           </a:xfrm>
           <a:prstGeom prst="rect">
             <a:avLst/>
@@ -5304,7 +5427,7 @@
                 <a:ea typeface="ui-monospace" pitchFamily="34" charset="-122"/>
                 <a:cs typeface="ui-monospace" pitchFamily="34" charset="-120"/>
               </a:rPr>
-              <a:t>extends</a:t>
+              <a:t>public interface</a:t>
             </a:r>
             <a:endParaRPr lang="en-US" sz="980" dirty="0"/>
           </a:p>
@@ -5312,14 +5435,14 @@
       </p:sp>
       <p:sp>
         <p:nvSpPr>
-          <p:cNvPr id="76" name="Text 52"/>
-          <p:cNvSpPr/>
-          <p:nvPr/>
-        </p:nvSpPr>
-        <p:spPr>
-          <a:xfrm>
-            <a:off x="11388775" y="2405955"/>
-            <a:ext cx="5898014" cy="339030"/>
+          <p:cNvPr id="74" name="Text 50"/>
+          <p:cNvSpPr/>
+          <p:nvPr/>
+        </p:nvSpPr>
+        <p:spPr>
+          <a:xfrm>
+            <a:off x="9628138" y="2405955"/>
+            <a:ext cx="1232416" cy="152400"/>
           </a:xfrm>
           <a:prstGeom prst="rect">
             <a:avLst/>
@@ -5342,13 +5465,13 @@
             <a:r>
               <a:rPr lang="en-US" sz="980" dirty="0">
                 <a:solidFill>
-                  <a:srgbClr val="E2E8F0"/>
+                  <a:srgbClr val="FFA500"/>
                 </a:solidFill>
                 <a:latin typeface="ui-monospace" pitchFamily="34" charset="0"/>
                 <a:ea typeface="ui-monospace" pitchFamily="34" charset="-122"/>
                 <a:cs typeface="ui-monospace" pitchFamily="34" charset="-120"/>
               </a:rPr>
-              <a:t>JpaRepository&lt;Todo, Long&gt; {</a:t>
+              <a:t>TodoRepository</a:t>
             </a:r>
             <a:endParaRPr lang="en-US" sz="980" dirty="0"/>
           </a:p>
@@ -5356,14 +5479,14 @@
       </p:sp>
       <p:sp>
         <p:nvSpPr>
-          <p:cNvPr id="77" name="Text 53"/>
-          <p:cNvSpPr/>
-          <p:nvPr/>
-        </p:nvSpPr>
-        <p:spPr>
-          <a:xfrm>
-            <a:off x="8587829" y="2592586"/>
-            <a:ext cx="5281642" cy="152400"/>
+          <p:cNvPr id="75" name="Text 51"/>
+          <p:cNvSpPr/>
+          <p:nvPr/>
+        </p:nvSpPr>
+        <p:spPr>
+          <a:xfrm>
+            <a:off x="10828586" y="2405955"/>
+            <a:ext cx="616208" cy="152400"/>
           </a:xfrm>
           <a:prstGeom prst="rect">
             <a:avLst/>
@@ -5386,13 +5509,13 @@
             <a:r>
               <a:rPr lang="en-US" sz="980" dirty="0">
                 <a:solidFill>
-                  <a:srgbClr val="718096"/>
+                  <a:srgbClr val="90EE90"/>
                 </a:solidFill>
                 <a:latin typeface="ui-monospace" pitchFamily="34" charset="0"/>
                 <a:ea typeface="ui-monospace" pitchFamily="34" charset="-122"/>
                 <a:cs typeface="ui-monospace" pitchFamily="34" charset="-120"/>
               </a:rPr>
-              <a:t>// Spring Data JPA fournit automatiquement des méthodes CRUD</a:t>
+              <a:t>extends</a:t>
             </a:r>
             <a:endParaRPr lang="en-US" sz="980" dirty="0"/>
           </a:p>
@@ -5400,14 +5523,14 @@
       </p:sp>
       <p:sp>
         <p:nvSpPr>
-          <p:cNvPr id="78" name="Text 54"/>
-          <p:cNvSpPr/>
-          <p:nvPr/>
-        </p:nvSpPr>
-        <p:spPr>
-          <a:xfrm>
-            <a:off x="8587829" y="2779216"/>
-            <a:ext cx="3609171" cy="152400"/>
+          <p:cNvPr id="76" name="Text 52"/>
+          <p:cNvSpPr/>
+          <p:nvPr/>
+        </p:nvSpPr>
+        <p:spPr>
+          <a:xfrm>
+            <a:off x="11388775" y="2405955"/>
+            <a:ext cx="5898014" cy="339030"/>
           </a:xfrm>
           <a:prstGeom prst="rect">
             <a:avLst/>
@@ -5430,13 +5553,13 @@
             <a:r>
               <a:rPr lang="en-US" sz="980" dirty="0">
                 <a:solidFill>
-                  <a:srgbClr val="718096"/>
+                  <a:srgbClr val="E2E8F0"/>
                 </a:solidFill>
                 <a:latin typeface="ui-monospace" pitchFamily="34" charset="0"/>
                 <a:ea typeface="ui-monospace" pitchFamily="34" charset="-122"/>
                 <a:cs typeface="ui-monospace" pitchFamily="34" charset="-120"/>
               </a:rPr>
-              <a:t>// todoRepository.findAll() -&gt; Repository</a:t>
+              <a:t>JpaRepository&lt;Todo, Long&gt; {</a:t>
             </a:r>
             <a:endParaRPr lang="en-US" sz="980" dirty="0"/>
           </a:p>
@@ -5444,14 +5567,14 @@
       </p:sp>
       <p:sp>
         <p:nvSpPr>
-          <p:cNvPr id="79" name="Text 55"/>
-          <p:cNvSpPr/>
-          <p:nvPr/>
-        </p:nvSpPr>
-        <p:spPr>
-          <a:xfrm>
-            <a:off x="8587829" y="2965847"/>
-            <a:ext cx="3345106" cy="152400"/>
+          <p:cNvPr id="77" name="Text 53"/>
+          <p:cNvSpPr/>
+          <p:nvPr/>
+        </p:nvSpPr>
+        <p:spPr>
+          <a:xfrm>
+            <a:off x="8587829" y="2592586"/>
+            <a:ext cx="5281642" cy="152400"/>
           </a:xfrm>
           <a:prstGeom prst="rect">
             <a:avLst/>
@@ -5480,7 +5603,7 @@
                 <a:ea typeface="ui-monospace" pitchFamily="34" charset="-122"/>
                 <a:cs typeface="ui-monospace" pitchFamily="34" charset="-120"/>
               </a:rPr>
-              <a:t>// Interaction avec la base de données</a:t>
+              <a:t>// Spring Data JPA fournit automatiquement des méthodes CRUD</a:t>
             </a:r>
             <a:endParaRPr lang="en-US" sz="980" dirty="0"/>
           </a:p>
@@ -5488,14 +5611,14 @@
       </p:sp>
       <p:sp>
         <p:nvSpPr>
-          <p:cNvPr id="80" name="Text 56"/>
-          <p:cNvSpPr/>
-          <p:nvPr/>
-        </p:nvSpPr>
-        <p:spPr>
-          <a:xfrm>
-            <a:off x="11628834" y="3152477"/>
-            <a:ext cx="88076" cy="152400"/>
+          <p:cNvPr id="78" name="Text 54"/>
+          <p:cNvSpPr/>
+          <p:nvPr/>
+        </p:nvSpPr>
+        <p:spPr>
+          <a:xfrm>
+            <a:off x="8587829" y="2779216"/>
+            <a:ext cx="3609171" cy="152400"/>
           </a:xfrm>
           <a:prstGeom prst="rect">
             <a:avLst/>
@@ -5518,12 +5641,100 @@
             <a:r>
               <a:rPr lang="en-US" sz="980" dirty="0">
                 <a:solidFill>
-                  <a:srgbClr val="E2E8F0"/>
+                  <a:srgbClr val="718096"/>
                 </a:solidFill>
                 <a:latin typeface="ui-monospace" pitchFamily="34" charset="0"/>
                 <a:ea typeface="ui-monospace" pitchFamily="34" charset="-122"/>
                 <a:cs typeface="ui-monospace" pitchFamily="34" charset="-120"/>
               </a:rPr>
+              <a:t>// todoRepository.findAll() -&gt; Repository</a:t>
+            </a:r>
+            <a:endParaRPr lang="en-US" sz="980" dirty="0"/>
+          </a:p>
+        </p:txBody>
+      </p:sp>
+      <p:sp>
+        <p:nvSpPr>
+          <p:cNvPr id="79" name="Text 55"/>
+          <p:cNvSpPr/>
+          <p:nvPr/>
+        </p:nvSpPr>
+        <p:spPr>
+          <a:xfrm>
+            <a:off x="8587829" y="2965847"/>
+            <a:ext cx="3345106" cy="177421"/>
+          </a:xfrm>
+          <a:prstGeom prst="rect">
+            <a:avLst/>
+          </a:prstGeom>
+          <a:noFill/>
+          <a:ln/>
+        </p:spPr>
+        <p:txBody>
+          <a:bodyPr wrap="square" lIns="0" tIns="0" rIns="0" bIns="0" rtlCol="0" anchor="t">
+            <a:spAutoFit/>
+          </a:bodyPr>
+          <a:lstStyle/>
+          <a:p>
+            <a:pPr marL="0" indent="0">
+              <a:lnSpc>
+                <a:spcPts val="1470"/>
+              </a:lnSpc>
+              <a:buNone/>
+            </a:pPr>
+            <a:r>
+              <a:rPr lang="ru-RU" sz="980" dirty="0">
+                <a:solidFill>
+                  <a:srgbClr val="718096"/>
+                </a:solidFill>
+                <a:latin typeface="ui-monospace" pitchFamily="34" charset="0"/>
+                <a:ea typeface="ui-monospace" pitchFamily="34" charset="-122"/>
+                <a:cs typeface="ui-monospace" pitchFamily="34" charset="-120"/>
+              </a:rPr>
+              <a:t>// Взаимодействие с базой данных</a:t>
+            </a:r>
+            <a:endParaRPr lang="en-US" sz="980" dirty="0"/>
+          </a:p>
+        </p:txBody>
+      </p:sp>
+      <p:sp>
+        <p:nvSpPr>
+          <p:cNvPr id="80" name="Text 56"/>
+          <p:cNvSpPr/>
+          <p:nvPr/>
+        </p:nvSpPr>
+        <p:spPr>
+          <a:xfrm>
+            <a:off x="11628834" y="3152477"/>
+            <a:ext cx="88076" cy="152400"/>
+          </a:xfrm>
+          <a:prstGeom prst="rect">
+            <a:avLst/>
+          </a:prstGeom>
+          <a:noFill/>
+          <a:ln/>
+        </p:spPr>
+        <p:txBody>
+          <a:bodyPr wrap="square" lIns="0" tIns="0" rIns="0" bIns="0" rtlCol="0" anchor="t">
+            <a:spAutoFit/>
+          </a:bodyPr>
+          <a:lstStyle/>
+          <a:p>
+            <a:pPr marL="0" indent="0">
+              <a:lnSpc>
+                <a:spcPts val="1470"/>
+              </a:lnSpc>
+              <a:buNone/>
+            </a:pPr>
+            <a:r>
+              <a:rPr lang="en-US" sz="980" dirty="0">
+                <a:solidFill>
+                  <a:srgbClr val="E2E8F0"/>
+                </a:solidFill>
+                <a:latin typeface="ui-monospace" pitchFamily="34" charset="0"/>
+                <a:ea typeface="ui-monospace" pitchFamily="34" charset="-122"/>
+                <a:cs typeface="ui-monospace" pitchFamily="34" charset="-120"/>
+              </a:rPr>
               <a:t>}</a:t>
             </a:r>
             <a:endParaRPr lang="en-US" sz="980" dirty="0"/>
@@ -5539,7 +5750,7 @@
         <p:spPr>
           <a:xfrm>
             <a:off x="1104900" y="5581650"/>
-            <a:ext cx="2803059" cy="266700"/>
+            <a:ext cx="2803059" cy="248658"/>
           </a:xfrm>
           <a:prstGeom prst="rect">
             <a:avLst/>
@@ -5560,7 +5771,7 @@
               <a:buNone/>
             </a:pPr>
             <a:r>
-              <a:rPr lang="en-US" sz="1380" b="1" dirty="0">
+              <a:rPr lang="ru-RU" sz="1380" b="1" dirty="0">
                 <a:solidFill>
                   <a:srgbClr val="FFFFFF"/>
                 </a:solidFill>
@@ -5568,7 +5779,7 @@
                 <a:ea typeface="ui-sans-serif" pitchFamily="34" charset="-122"/>
                 <a:cs typeface="ui-sans-serif" pitchFamily="34" charset="-120"/>
               </a:rPr>
-              <a:t>Fonctionnement du flux</a:t>
+              <a:t>Балансировка нагрузки</a:t>
             </a:r>
             <a:endParaRPr lang="en-US" sz="1380" dirty="0"/>
           </a:p>
@@ -5583,7 +5794,7 @@
         <p:spPr>
           <a:xfrm>
             <a:off x="952500" y="5981700"/>
-            <a:ext cx="1179046" cy="228600"/>
+            <a:ext cx="1179046" cy="211083"/>
           </a:xfrm>
           <a:prstGeom prst="rect">
             <a:avLst/>
@@ -5612,7 +5823,18 @@
                 <a:ea typeface="ui-sans-serif" pitchFamily="34" charset="-122"/>
                 <a:cs typeface="ui-sans-serif" pitchFamily="34" charset="-120"/>
               </a:rPr>
-              <a:t>Requête HTTP</a:t>
+              <a:t>HTTP-</a:t>
+            </a:r>
+            <a:r>
+              <a:rPr lang="ru-RU" sz="1120" dirty="0">
+                <a:solidFill>
+                  <a:srgbClr val="E5E7EB"/>
+                </a:solidFill>
+                <a:latin typeface="ui-sans-serif" pitchFamily="34" charset="0"/>
+                <a:ea typeface="ui-sans-serif" pitchFamily="34" charset="-122"/>
+                <a:cs typeface="ui-sans-serif" pitchFamily="34" charset="-120"/>
+              </a:rPr>
+              <a:t>запрос</a:t>
             </a:r>
             <a:endParaRPr lang="en-US" sz="1120" dirty="0"/>
           </a:p>
@@ -5627,7 +5849,7 @@
         <p:spPr>
           <a:xfrm>
             <a:off x="5092898" y="5981700"/>
-            <a:ext cx="1265977" cy="228600"/>
+            <a:ext cx="1265977" cy="211083"/>
           </a:xfrm>
           <a:prstGeom prst="rect">
             <a:avLst/>
@@ -5648,7 +5870,7 @@
               <a:buNone/>
             </a:pPr>
             <a:r>
-              <a:rPr lang="en-US" sz="1120" dirty="0">
+              <a:rPr lang="ru-RU" sz="1120" dirty="0">
                 <a:solidFill>
                   <a:srgbClr val="E5E7EB"/>
                 </a:solidFill>
@@ -5656,7 +5878,7 @@
                 <a:ea typeface="ui-sans-serif" pitchFamily="34" charset="-122"/>
                 <a:cs typeface="ui-sans-serif" pitchFamily="34" charset="-120"/>
               </a:rPr>
-              <a:t>Logique métier</a:t>
+              <a:t>Бизнес-логика</a:t>
             </a:r>
             <a:endParaRPr lang="en-US" sz="1120" dirty="0"/>
           </a:p>
@@ -5671,7 +5893,7 @@
         <p:spPr>
           <a:xfrm>
             <a:off x="9312325" y="5981700"/>
-            <a:ext cx="2329279" cy="228600"/>
+            <a:ext cx="2329279" cy="211083"/>
           </a:xfrm>
           <a:prstGeom prst="rect">
             <a:avLst/>
@@ -5692,7 +5914,7 @@
               <a:buNone/>
             </a:pPr>
             <a:r>
-              <a:rPr lang="en-US" sz="1120" dirty="0">
+              <a:rPr lang="ru-RU" sz="1120" dirty="0">
                 <a:solidFill>
                   <a:srgbClr val="E5E7EB"/>
                 </a:solidFill>
@@ -5700,7 +5922,7 @@
                 <a:ea typeface="ui-sans-serif" pitchFamily="34" charset="-122"/>
                 <a:cs typeface="ui-sans-serif" pitchFamily="34" charset="-120"/>
               </a:rPr>
-              <a:t>Accès à la base de données</a:t>
+              <a:t>Доступ к базе данных</a:t>
             </a:r>
             <a:endParaRPr lang="en-US" sz="1120" dirty="0"/>
           </a:p>
@@ -6155,7 +6377,7 @@
         </p:blipFill>
         <p:spPr>
           <a:xfrm>
-            <a:off x="778818" y="5524500"/>
+            <a:off x="485775" y="5562600"/>
             <a:ext cx="238125" cy="190500"/>
           </a:xfrm>
           <a:prstGeom prst="rect">
@@ -6260,7 +6482,7 @@
         <p:spPr>
           <a:xfrm>
             <a:off x="952500" y="1600200"/>
-            <a:ext cx="1860575" cy="342900"/>
+            <a:ext cx="1860575" cy="328744"/>
           </a:xfrm>
           <a:prstGeom prst="rect">
             <a:avLst/>
@@ -6281,7 +6503,7 @@
               <a:buNone/>
             </a:pPr>
             <a:r>
-              <a:rPr lang="en-US" sz="2040" b="1" dirty="0">
+              <a:rPr lang="ru-RU" sz="2040" b="1" dirty="0">
                 <a:solidFill>
                   <a:srgbClr val="4ADE80"/>
                 </a:solidFill>
@@ -6289,7 +6511,7 @@
                 <a:ea typeface="ui-sans-serif" pitchFamily="34" charset="-122"/>
                 <a:cs typeface="ui-sans-serif" pitchFamily="34" charset="-120"/>
               </a:rPr>
-              <a:t>Avantages</a:t>
+              <a:t>Преимущества</a:t>
             </a:r>
             <a:endParaRPr lang="en-US" sz="2040" dirty="0"/>
           </a:p>
@@ -6304,7 +6526,7 @@
         <p:spPr>
           <a:xfrm>
             <a:off x="981075" y="2247900"/>
-            <a:ext cx="2694191" cy="266700"/>
+            <a:ext cx="2694191" cy="248658"/>
           </a:xfrm>
           <a:prstGeom prst="rect">
             <a:avLst/>
@@ -6325,7 +6547,7 @@
               <a:buNone/>
             </a:pPr>
             <a:r>
-              <a:rPr lang="en-US" sz="1380" b="1" dirty="0">
+              <a:rPr lang="ru-RU" sz="1380" b="1" dirty="0">
                 <a:solidFill>
                   <a:srgbClr val="86EFAC"/>
                 </a:solidFill>
@@ -6333,7 +6555,7 @@
                 <a:ea typeface="ui-sans-serif" pitchFamily="34" charset="-122"/>
                 <a:cs typeface="ui-sans-serif" pitchFamily="34" charset="-120"/>
               </a:rPr>
-              <a:t>Développement rapide</a:t>
+              <a:t>Быстрое развитие</a:t>
             </a:r>
             <a:endParaRPr lang="en-US" sz="1380" dirty="0"/>
           </a:p>
@@ -6369,7 +6591,7 @@
               <a:buNone/>
             </a:pPr>
             <a:r>
-              <a:rPr lang="en-US" sz="1120" dirty="0">
+              <a:rPr lang="ru-RU" sz="1120" dirty="0">
                 <a:solidFill>
                   <a:srgbClr val="D1D5DB"/>
                 </a:solidFill>
@@ -6377,7 +6599,7 @@
                 <a:ea typeface="ui-sans-serif" pitchFamily="34" charset="-122"/>
                 <a:cs typeface="ui-sans-serif" pitchFamily="34" charset="-120"/>
               </a:rPr>
-              <a:t>Réduit la configuration boilerplate et accélère le cycle de développement</a:t>
+              <a:t>Сокращает объем шаблонной конфигурации и ускоряет цикл разработки.</a:t>
             </a:r>
             <a:endParaRPr lang="en-US" sz="1120" dirty="0"/>
           </a:p>
@@ -6392,7 +6614,7 @@
         <p:spPr>
           <a:xfrm>
             <a:off x="4765625" y="2247900"/>
-            <a:ext cx="2248406" cy="266700"/>
+            <a:ext cx="2248406" cy="248658"/>
           </a:xfrm>
           <a:prstGeom prst="rect">
             <a:avLst/>
@@ -6413,6 +6635,17 @@
               <a:buNone/>
             </a:pPr>
             <a:r>
+              <a:rPr lang="ru-RU" sz="1380" b="1" dirty="0">
+                <a:solidFill>
+                  <a:srgbClr val="86EFAC"/>
+                </a:solidFill>
+                <a:latin typeface="ui-sans-serif" pitchFamily="34" charset="0"/>
+                <a:ea typeface="ui-sans-serif" pitchFamily="34" charset="-122"/>
+                <a:cs typeface="ui-sans-serif" pitchFamily="34" charset="-120"/>
+              </a:rPr>
+              <a:t>Экосистема </a:t>
+            </a:r>
+            <a:r>
               <a:rPr lang="en-US" sz="1380" b="1" dirty="0">
                 <a:solidFill>
                   <a:srgbClr val="86EFAC"/>
@@ -6421,7 +6654,7 @@
                 <a:ea typeface="ui-sans-serif" pitchFamily="34" charset="-122"/>
                 <a:cs typeface="ui-sans-serif" pitchFamily="34" charset="-120"/>
               </a:rPr>
-              <a:t>Écosystème Spring</a:t>
+              <a:t>Spring</a:t>
             </a:r>
             <a:endParaRPr lang="en-US" sz="1380" dirty="0"/>
           </a:p>
@@ -6457,7 +6690,7 @@
               <a:buNone/>
             </a:pPr>
             <a:r>
-              <a:rPr lang="en-US" sz="1120" dirty="0">
+              <a:rPr lang="ru-RU" sz="1120" dirty="0">
                 <a:solidFill>
                   <a:srgbClr val="D1D5DB"/>
                 </a:solidFill>
@@ -6465,7 +6698,7 @@
                 <a:ea typeface="ui-sans-serif" pitchFamily="34" charset="-122"/>
                 <a:cs typeface="ui-sans-serif" pitchFamily="34" charset="-120"/>
               </a:rPr>
-              <a:t>Profite de la richesse des modules et des extensions disponibles</a:t>
+              <a:t>Использует множество доступных модулей и расширений.</a:t>
             </a:r>
             <a:endParaRPr lang="en-US" sz="1120" dirty="0"/>
           </a:p>
@@ -6480,7 +6713,7 @@
         <p:spPr>
           <a:xfrm>
             <a:off x="8473976" y="2247900"/>
-            <a:ext cx="3141777" cy="266700"/>
+            <a:ext cx="3141777" cy="248658"/>
           </a:xfrm>
           <a:prstGeom prst="rect">
             <a:avLst/>
@@ -6501,7 +6734,7 @@
               <a:buNone/>
             </a:pPr>
             <a:r>
-              <a:rPr lang="en-US" sz="1380" b="1" dirty="0">
+              <a:rPr lang="ru-RU" sz="1380" b="1" dirty="0">
                 <a:solidFill>
                   <a:srgbClr val="86EFAC"/>
                 </a:solidFill>
@@ -6509,7 +6742,18 @@
                 <a:ea typeface="ui-sans-serif" pitchFamily="34" charset="-122"/>
                 <a:cs typeface="ui-sans-serif" pitchFamily="34" charset="-120"/>
               </a:rPr>
-              <a:t>Support des microservices</a:t>
+              <a:t>Поддержка </a:t>
+            </a:r>
+            <a:r>
+              <a:rPr lang="ru-RU" sz="1380" b="1" dirty="0" err="1">
+                <a:solidFill>
+                  <a:srgbClr val="86EFAC"/>
+                </a:solidFill>
+                <a:latin typeface="ui-sans-serif" pitchFamily="34" charset="0"/>
+                <a:ea typeface="ui-sans-serif" pitchFamily="34" charset="-122"/>
+                <a:cs typeface="ui-sans-serif" pitchFamily="34" charset="-120"/>
+              </a:rPr>
+              <a:t>микросервисов</a:t>
             </a:r>
             <a:endParaRPr lang="en-US" sz="1380" dirty="0"/>
           </a:p>
@@ -6545,7 +6789,7 @@
               <a:buNone/>
             </a:pPr>
             <a:r>
-              <a:rPr lang="en-US" sz="1120" dirty="0">
+              <a:rPr lang="ru-RU" sz="1120" dirty="0">
                 <a:solidFill>
                   <a:srgbClr val="D1D5DB"/>
                 </a:solidFill>
@@ -6553,7 +6797,7 @@
                 <a:ea typeface="ui-sans-serif" pitchFamily="34" charset="-122"/>
                 <a:cs typeface="ui-sans-serif" pitchFamily="34" charset="-120"/>
               </a:rPr>
-              <a:t>Facilite la création et le déploiement d'applications distribuées</a:t>
+              <a:t>Облегчает создание и развертывание распределенных приложений.</a:t>
             </a:r>
             <a:endParaRPr lang="en-US" sz="1120" dirty="0"/>
           </a:p>
@@ -6568,7 +6812,7 @@
         <p:spPr>
           <a:xfrm>
             <a:off x="952500" y="3429000"/>
-            <a:ext cx="2490698" cy="342900"/>
+            <a:ext cx="2490698" cy="328744"/>
           </a:xfrm>
           <a:prstGeom prst="rect">
             <a:avLst/>
@@ -6589,7 +6833,7 @@
               <a:buNone/>
             </a:pPr>
             <a:r>
-              <a:rPr lang="en-US" sz="2040" b="1" dirty="0">
+              <a:rPr lang="ru-RU" sz="2040" b="1" dirty="0">
                 <a:solidFill>
                   <a:srgbClr val="F97316"/>
                 </a:solidFill>
@@ -6597,7 +6841,7 @@
                 <a:ea typeface="ui-sans-serif" pitchFamily="34" charset="-122"/>
                 <a:cs typeface="ui-sans-serif" pitchFamily="34" charset="-120"/>
               </a:rPr>
-              <a:t>Inconvénients</a:t>
+              <a:t>Недостатки</a:t>
             </a:r>
             <a:endParaRPr lang="en-US" sz="2040" dirty="0"/>
           </a:p>
@@ -6612,7 +6856,7 @@
         <p:spPr>
           <a:xfrm>
             <a:off x="1028700" y="4076700"/>
-            <a:ext cx="2148870" cy="266700"/>
+            <a:ext cx="2148870" cy="248658"/>
           </a:xfrm>
           <a:prstGeom prst="rect">
             <a:avLst/>
@@ -6633,7 +6877,7 @@
               <a:buNone/>
             </a:pPr>
             <a:r>
-              <a:rPr lang="en-US" sz="1380" b="1" dirty="0">
+              <a:rPr lang="ru-RU" sz="1380" b="1" dirty="0">
                 <a:solidFill>
                   <a:srgbClr val="FDBA74"/>
                 </a:solidFill>
@@ -6641,7 +6885,7 @@
                 <a:ea typeface="ui-sans-serif" pitchFamily="34" charset="-122"/>
                 <a:cs typeface="ui-sans-serif" pitchFamily="34" charset="-120"/>
               </a:rPr>
-              <a:t>"Magie" excessive</a:t>
+              <a:t>Излишняя «магия»</a:t>
             </a:r>
             <a:endParaRPr lang="en-US" sz="1380" dirty="0"/>
           </a:p>
@@ -6677,7 +6921,7 @@
               <a:buNone/>
             </a:pPr>
             <a:r>
-              <a:rPr lang="en-US" sz="1120" dirty="0">
+              <a:rPr lang="ru-RU" sz="1120" dirty="0">
                 <a:solidFill>
                   <a:srgbClr val="D1D5DB"/>
                 </a:solidFill>
@@ -6685,7 +6929,7 @@
                 <a:ea typeface="ui-sans-serif" pitchFamily="34" charset="-122"/>
                 <a:cs typeface="ui-sans-serif" pitchFamily="34" charset="-120"/>
               </a:rPr>
-              <a:t>La configuration automatique peut cacher la complexité réelle et rendre le débogage plus difficile</a:t>
+              <a:t>Автоматическая настройка может скрыть реальную сложность и затруднить отладку.</a:t>
             </a:r>
             <a:endParaRPr lang="en-US" sz="1120" dirty="0"/>
           </a:p>
@@ -6699,8 +6943,8 @@
         </p:nvSpPr>
         <p:spPr>
           <a:xfrm>
-            <a:off x="6543675" y="4076700"/>
-            <a:ext cx="2052280" cy="266700"/>
+            <a:off x="6543674" y="4076700"/>
+            <a:ext cx="3209925" cy="248658"/>
           </a:xfrm>
           <a:prstGeom prst="rect">
             <a:avLst/>
@@ -6721,6 +6965,17 @@
               <a:buNone/>
             </a:pPr>
             <a:r>
+              <a:rPr lang="ru-RU" sz="1380" b="1" dirty="0">
+                <a:solidFill>
+                  <a:srgbClr val="FDBA74"/>
+                </a:solidFill>
+                <a:latin typeface="ui-sans-serif" pitchFamily="34" charset="0"/>
+                <a:ea typeface="ui-sans-serif" pitchFamily="34" charset="-122"/>
+                <a:cs typeface="ui-sans-serif" pitchFamily="34" charset="-120"/>
+              </a:rPr>
+              <a:t>Окончательный размер </a:t>
+            </a:r>
+            <a:r>
               <a:rPr lang="en-US" sz="1380" b="1" dirty="0">
                 <a:solidFill>
                   <a:srgbClr val="FDBA74"/>
@@ -6729,7 +6984,18 @@
                 <a:ea typeface="ui-sans-serif" pitchFamily="34" charset="-122"/>
                 <a:cs typeface="ui-sans-serif" pitchFamily="34" charset="-120"/>
               </a:rPr>
-              <a:t>Taille du JAR final</a:t>
+              <a:t>JAR-</a:t>
+            </a:r>
+            <a:r>
+              <a:rPr lang="ru-RU" sz="1380" b="1" dirty="0">
+                <a:solidFill>
+                  <a:srgbClr val="FDBA74"/>
+                </a:solidFill>
+                <a:latin typeface="ui-sans-serif" pitchFamily="34" charset="0"/>
+                <a:ea typeface="ui-sans-serif" pitchFamily="34" charset="-122"/>
+                <a:cs typeface="ui-sans-serif" pitchFamily="34" charset="-120"/>
+              </a:rPr>
+              <a:t>файла</a:t>
             </a:r>
             <a:endParaRPr lang="en-US" sz="1380" dirty="0"/>
           </a:p>
@@ -6765,7 +7031,7 @@
               <a:buNone/>
             </a:pPr>
             <a:r>
-              <a:rPr lang="en-US" sz="1120" dirty="0">
+              <a:rPr lang="ru-RU" sz="1120" dirty="0">
                 <a:solidFill>
                   <a:srgbClr val="D1D5DB"/>
                 </a:solidFill>
@@ -6773,7 +7039,7 @@
                 <a:ea typeface="ui-sans-serif" pitchFamily="34" charset="-122"/>
                 <a:cs typeface="ui-sans-serif" pitchFamily="34" charset="-120"/>
               </a:rPr>
-              <a:t>L'empaquetage contenant le serveur intégré peut entraîner des fichiers JAR plus volumineux</a:t>
+              <a:t>Упаковка со встроенным сервером может привести к увеличению размера JAR-файлов.</a:t>
             </a:r>
             <a:endParaRPr lang="en-US" sz="1120" dirty="0"/>
           </a:p>
@@ -6788,7 +7054,7 @@
         <p:spPr>
           <a:xfrm>
             <a:off x="762000" y="5486400"/>
-            <a:ext cx="10668000" cy="800100"/>
+            <a:ext cx="10668000" cy="517962"/>
           </a:xfrm>
           <a:prstGeom prst="rect">
             <a:avLst/>
@@ -6809,7 +7075,7 @@
               <a:buNone/>
             </a:pPr>
             <a:r>
-              <a:rPr lang="en-US" sz="1380" dirty="0">
+              <a:rPr lang="ru-RU" sz="1380" dirty="0">
                 <a:solidFill>
                   <a:srgbClr val="E5E7EB"/>
                 </a:solidFill>
@@ -6817,7 +7083,7 @@
                 <a:ea typeface="ui-sans-serif" pitchFamily="34" charset="-122"/>
                 <a:cs typeface="ui-sans-serif" pitchFamily="34" charset="-120"/>
               </a:rPr>
-              <a:t>Spring Boot est idéal pour les projets où la rapidité de développement et la simplicité de configuration sont prioritaires, mais il convient de bien peser ses options pour les applications critiques où la taille du binaire et la configuration fine sont des préoccupations.</a:t>
+              <a:t>Spring Boot идеально подходит для проектов, где приоритетами являются скорость разработки и простота настройки, но его возможности следует тщательно продумать для критически важных приложений, где важны размер двоичного файла и детальная конфигурация.</a:t>
             </a:r>
             <a:endParaRPr lang="en-US" sz="1380" dirty="0"/>
           </a:p>
@@ -7670,7 +7936,7 @@
               <a:buNone/>
             </a:pPr>
             <a:r>
-              <a:rPr lang="en-US" sz="3158" b="1" dirty="0">
+              <a:rPr lang="ru-RU" sz="3158" b="1" dirty="0">
                 <a:solidFill>
                   <a:srgbClr val="FFFFFF"/>
                 </a:solidFill>
@@ -7678,7 +7944,7 @@
                 <a:ea typeface="ui-sans-serif" pitchFamily="34" charset="-122"/>
                 <a:cs typeface="ui-sans-serif" pitchFamily="34" charset="-120"/>
               </a:rPr>
-              <a:t>Applications Réelles</a:t>
+              <a:t>Реальные приложения</a:t>
             </a:r>
             <a:endParaRPr lang="en-US" sz="3158" dirty="0"/>
           </a:p>
@@ -7693,7 +7959,7 @@
         <p:spPr>
           <a:xfrm>
             <a:off x="60960" y="990600"/>
-            <a:ext cx="12070080" cy="304800"/>
+            <a:ext cx="12070080" cy="286553"/>
           </a:xfrm>
           <a:prstGeom prst="rect">
             <a:avLst/>
@@ -7714,6 +7980,17 @@
               <a:buNone/>
             </a:pPr>
             <a:r>
+              <a:rPr lang="ru-RU" sz="1646" dirty="0">
+                <a:solidFill>
+                  <a:srgbClr val="D1D5DB"/>
+                </a:solidFill>
+                <a:latin typeface="ui-sans-serif" pitchFamily="34" charset="0"/>
+                <a:ea typeface="ui-sans-serif" pitchFamily="34" charset="-122"/>
+                <a:cs typeface="ui-sans-serif" pitchFamily="34" charset="-120"/>
+              </a:rPr>
+              <a:t>Конкретные применения </a:t>
+            </a:r>
+            <a:r>
               <a:rPr lang="en-US" sz="1646" dirty="0">
                 <a:solidFill>
                   <a:srgbClr val="D1D5DB"/>
@@ -7722,7 +7999,7 @@
                 <a:ea typeface="ui-sans-serif" pitchFamily="34" charset="-122"/>
                 <a:cs typeface="ui-sans-serif" pitchFamily="34" charset="-120"/>
               </a:rPr>
-              <a:t>Utilisations concretes de Spring Boot</a:t>
+              <a:t>Spring Boot</a:t>
             </a:r>
             <a:endParaRPr lang="en-US" sz="1646" dirty="0"/>
           </a:p>
@@ -7737,7 +8014,7 @@
         <p:spPr>
           <a:xfrm>
             <a:off x="887462" y="2705100"/>
-            <a:ext cx="3188271" cy="304800"/>
+            <a:ext cx="3188271" cy="286553"/>
           </a:xfrm>
           <a:prstGeom prst="rect">
             <a:avLst/>
@@ -7758,7 +8035,7 @@
               <a:buNone/>
             </a:pPr>
             <a:r>
-              <a:rPr lang="en-US" sz="1646" b="1" dirty="0">
+              <a:rPr lang="ru-RU" sz="1646" b="1" dirty="0">
                 <a:solidFill>
                   <a:srgbClr val="FFFFFF"/>
                 </a:solidFill>
@@ -7766,7 +8043,7 @@
                 <a:ea typeface="ui-sans-serif" pitchFamily="34" charset="-122"/>
                 <a:cs typeface="ui-sans-serif" pitchFamily="34" charset="-120"/>
               </a:rPr>
-              <a:t>Systèmes d'Entreprise</a:t>
+              <a:t>Корпоративные системы</a:t>
             </a:r>
             <a:endParaRPr lang="en-US" sz="1646" dirty="0"/>
           </a:p>
@@ -7781,7 +8058,7 @@
         <p:spPr>
           <a:xfrm>
             <a:off x="1066800" y="3162300"/>
-            <a:ext cx="2936483" cy="228600"/>
+            <a:ext cx="2936483" cy="211083"/>
           </a:xfrm>
           <a:prstGeom prst="rect">
             <a:avLst/>
@@ -7802,7 +8079,7 @@
               <a:buNone/>
             </a:pPr>
             <a:r>
-              <a:rPr lang="en-US" sz="1120" dirty="0">
+              <a:rPr lang="ru-RU" sz="1120" dirty="0">
                 <a:solidFill>
                   <a:srgbClr val="D1D5DB"/>
                 </a:solidFill>
@@ -7810,7 +8087,7 @@
                 <a:ea typeface="ui-sans-serif" pitchFamily="34" charset="-122"/>
                 <a:cs typeface="ui-sans-serif" pitchFamily="34" charset="-120"/>
               </a:rPr>
-              <a:t>Applications robustes et évolutives</a:t>
+              <a:t>Надежные и масштабируемые приложения</a:t>
             </a:r>
             <a:endParaRPr lang="en-US" sz="1120" dirty="0"/>
           </a:p>
@@ -7825,7 +8102,7 @@
         <p:spPr>
           <a:xfrm>
             <a:off x="1066800" y="3505200"/>
-            <a:ext cx="2621831" cy="228600"/>
+            <a:ext cx="2621831" cy="211083"/>
           </a:xfrm>
           <a:prstGeom prst="rect">
             <a:avLst/>
@@ -7846,7 +8123,7 @@
               <a:buNone/>
             </a:pPr>
             <a:r>
-              <a:rPr lang="en-US" sz="1120" dirty="0">
+              <a:rPr lang="ru-RU" sz="1120" dirty="0">
                 <a:solidFill>
                   <a:srgbClr val="D1D5DB"/>
                 </a:solidFill>
@@ -7854,7 +8131,7 @@
                 <a:ea typeface="ui-sans-serif" pitchFamily="34" charset="-122"/>
                 <a:cs typeface="ui-sans-serif" pitchFamily="34" charset="-120"/>
               </a:rPr>
-              <a:t>Gestion de données complexes</a:t>
+              <a:t>Комплексное управление данными</a:t>
             </a:r>
             <a:endParaRPr lang="en-US" sz="1120" dirty="0"/>
           </a:p>
@@ -7869,7 +8146,7 @@
         <p:spPr>
           <a:xfrm>
             <a:off x="1066800" y="3848100"/>
-            <a:ext cx="2960385" cy="228600"/>
+            <a:ext cx="2960385" cy="211083"/>
           </a:xfrm>
           <a:prstGeom prst="rect">
             <a:avLst/>
@@ -7890,7 +8167,7 @@
               <a:buNone/>
             </a:pPr>
             <a:r>
-              <a:rPr lang="en-US" sz="1120" dirty="0">
+              <a:rPr lang="ru-RU" sz="1120" dirty="0">
                 <a:solidFill>
                   <a:srgbClr val="D1D5DB"/>
                 </a:solidFill>
@@ -7898,7 +8175,7 @@
                 <a:ea typeface="ui-sans-serif" pitchFamily="34" charset="-122"/>
                 <a:cs typeface="ui-sans-serif" pitchFamily="34" charset="-120"/>
               </a:rPr>
-              <a:t>Intégration avec d'autres systèmes</a:t>
+              <a:t>Интеграция с другими системами</a:t>
             </a:r>
             <a:endParaRPr lang="en-US" sz="1120" dirty="0"/>
           </a:p>
@@ -8001,7 +8278,7 @@
         <p:spPr>
           <a:xfrm>
             <a:off x="4825901" y="3162300"/>
-            <a:ext cx="2191598" cy="228600"/>
+            <a:ext cx="2616400" cy="211083"/>
           </a:xfrm>
           <a:prstGeom prst="rect">
             <a:avLst/>
@@ -8022,7 +8299,7 @@
               <a:buNone/>
             </a:pPr>
             <a:r>
-              <a:rPr lang="en-US" sz="1120" dirty="0">
+              <a:rPr lang="ru-RU" sz="1120" dirty="0">
                 <a:solidFill>
                   <a:srgbClr val="D1D5DB"/>
                 </a:solidFill>
@@ -8030,7 +8307,7 @@
                 <a:ea typeface="ui-sans-serif" pitchFamily="34" charset="-122"/>
                 <a:cs typeface="ui-sans-serif" pitchFamily="34" charset="-120"/>
               </a:rPr>
-              <a:t>Services web performants</a:t>
+              <a:t>Высокопроизводительные веб-сервисы</a:t>
             </a:r>
             <a:endParaRPr lang="en-US" sz="1120" dirty="0"/>
           </a:p>
@@ -8045,7 +8322,7 @@
         <p:spPr>
           <a:xfrm>
             <a:off x="4825901" y="3505200"/>
-            <a:ext cx="2685514" cy="228600"/>
+            <a:ext cx="2685514" cy="211083"/>
           </a:xfrm>
           <a:prstGeom prst="rect">
             <a:avLst/>
@@ -8066,7 +8343,7 @@
               <a:buNone/>
             </a:pPr>
             <a:r>
-              <a:rPr lang="en-US" sz="1120" dirty="0">
+              <a:rPr lang="ru-RU" sz="1120" dirty="0">
                 <a:solidFill>
                   <a:srgbClr val="D1D5DB"/>
                 </a:solidFill>
@@ -8074,7 +8351,7 @@
                 <a:ea typeface="ui-sans-serif" pitchFamily="34" charset="-122"/>
                 <a:cs typeface="ui-sans-serif" pitchFamily="34" charset="-120"/>
               </a:rPr>
-              <a:t>Interface simple et maintenable</a:t>
+              <a:t>Простой и удобный интерфейс</a:t>
             </a:r>
             <a:endParaRPr lang="en-US" sz="1120" dirty="0"/>
           </a:p>
@@ -8089,7 +8366,7 @@
         <p:spPr>
           <a:xfrm>
             <a:off x="4825901" y="3848100"/>
-            <a:ext cx="2893918" cy="228600"/>
+            <a:ext cx="2893918" cy="211083"/>
           </a:xfrm>
           <a:prstGeom prst="rect">
             <a:avLst/>
@@ -8110,7 +8387,7 @@
               <a:buNone/>
             </a:pPr>
             <a:r>
-              <a:rPr lang="en-US" sz="1120" dirty="0">
+              <a:rPr lang="ru-RU" sz="1120" dirty="0">
                 <a:solidFill>
                   <a:srgbClr val="D1D5DB"/>
                 </a:solidFill>
@@ -8118,7 +8395,7 @@
                 <a:ea typeface="ui-sans-serif" pitchFamily="34" charset="-122"/>
                 <a:cs typeface="ui-sans-serif" pitchFamily="34" charset="-120"/>
               </a:rPr>
-              <a:t>Facile à consommer par les clients</a:t>
+              <a:t>Удобство использования для клиентов</a:t>
             </a:r>
             <a:endParaRPr lang="en-US" sz="1120" dirty="0"/>
           </a:p>
@@ -8221,7 +8498,7 @@
         <p:spPr>
           <a:xfrm>
             <a:off x="8585150" y="3162300"/>
-            <a:ext cx="1693590" cy="228600"/>
+            <a:ext cx="1693590" cy="211083"/>
           </a:xfrm>
           <a:prstGeom prst="rect">
             <a:avLst/>
@@ -8242,6 +8519,105 @@
               <a:buNone/>
             </a:pPr>
             <a:r>
+              <a:rPr lang="ru-RU" sz="1120" dirty="0">
+                <a:solidFill>
+                  <a:srgbClr val="D1D5DB"/>
+                </a:solidFill>
+                <a:latin typeface="ui-sans-serif" pitchFamily="34" charset="0"/>
+                <a:ea typeface="ui-sans-serif" pitchFamily="34" charset="-122"/>
+                <a:cs typeface="ui-sans-serif" pitchFamily="34" charset="-120"/>
+              </a:rPr>
+              <a:t>Распределённые системы</a:t>
+            </a:r>
+            <a:endParaRPr lang="en-US" sz="1120" dirty="0"/>
+          </a:p>
+        </p:txBody>
+      </p:sp>
+      <p:sp>
+        <p:nvSpPr>
+          <p:cNvPr id="49" name="Text 14"/>
+          <p:cNvSpPr/>
+          <p:nvPr/>
+        </p:nvSpPr>
+        <p:spPr>
+          <a:xfrm>
+            <a:off x="8585150" y="3505200"/>
+            <a:ext cx="2657192" cy="211083"/>
+          </a:xfrm>
+          <a:prstGeom prst="rect">
+            <a:avLst/>
+          </a:prstGeom>
+          <a:noFill/>
+          <a:ln/>
+        </p:spPr>
+        <p:txBody>
+          <a:bodyPr wrap="square" lIns="0" tIns="0" rIns="0" bIns="0" rtlCol="0" anchor="t">
+            <a:spAutoFit/>
+          </a:bodyPr>
+          <a:lstStyle/>
+          <a:p>
+            <a:pPr marL="0" indent="0" algn="l">
+              <a:lnSpc>
+                <a:spcPts val="1800"/>
+              </a:lnSpc>
+              <a:buNone/>
+            </a:pPr>
+            <a:r>
+              <a:rPr lang="ru-RU" sz="1120" dirty="0">
+                <a:solidFill>
+                  <a:srgbClr val="D1D5DB"/>
+                </a:solidFill>
+                <a:latin typeface="ui-sans-serif" pitchFamily="34" charset="0"/>
+                <a:ea typeface="ui-sans-serif" pitchFamily="34" charset="-122"/>
+                <a:cs typeface="ui-sans-serif" pitchFamily="34" charset="-120"/>
+              </a:rPr>
+              <a:t>Небольшие независимые сервисы</a:t>
+            </a:r>
+            <a:endParaRPr lang="en-US" sz="1120" dirty="0"/>
+          </a:p>
+        </p:txBody>
+      </p:sp>
+      <p:sp>
+        <p:nvSpPr>
+          <p:cNvPr id="50" name="Text 15"/>
+          <p:cNvSpPr/>
+          <p:nvPr/>
+        </p:nvSpPr>
+        <p:spPr>
+          <a:xfrm>
+            <a:off x="8585150" y="3848100"/>
+            <a:ext cx="2609880" cy="211083"/>
+          </a:xfrm>
+          <a:prstGeom prst="rect">
+            <a:avLst/>
+          </a:prstGeom>
+          <a:noFill/>
+          <a:ln/>
+        </p:spPr>
+        <p:txBody>
+          <a:bodyPr wrap="square" lIns="0" tIns="0" rIns="0" bIns="0" rtlCol="0" anchor="t">
+            <a:spAutoFit/>
+          </a:bodyPr>
+          <a:lstStyle/>
+          <a:p>
+            <a:pPr marL="0" indent="0" algn="l">
+              <a:lnSpc>
+                <a:spcPts val="1800"/>
+              </a:lnSpc>
+              <a:buNone/>
+            </a:pPr>
+            <a:r>
+              <a:rPr lang="ru-RU" sz="1120" dirty="0">
+                <a:solidFill>
+                  <a:srgbClr val="D1D5DB"/>
+                </a:solidFill>
+                <a:latin typeface="ui-sans-serif" pitchFamily="34" charset="0"/>
+                <a:ea typeface="ui-sans-serif" pitchFamily="34" charset="-122"/>
+                <a:cs typeface="ui-sans-serif" pitchFamily="34" charset="-120"/>
+              </a:rPr>
+              <a:t>Взаимодействие через лёгкие </a:t>
+            </a:r>
+            <a:r>
               <a:rPr lang="en-US" sz="1120" dirty="0">
                 <a:solidFill>
                   <a:srgbClr val="D1D5DB"/>
@@ -8250,95 +8626,7 @@
                 <a:ea typeface="ui-sans-serif" pitchFamily="34" charset="-122"/>
                 <a:cs typeface="ui-sans-serif" pitchFamily="34" charset="-120"/>
               </a:rPr>
-              <a:t>Systèmes distribués</a:t>
-            </a:r>
-            <a:endParaRPr lang="en-US" sz="1120" dirty="0"/>
-          </a:p>
-        </p:txBody>
-      </p:sp>
-      <p:sp>
-        <p:nvSpPr>
-          <p:cNvPr id="49" name="Text 14"/>
-          <p:cNvSpPr/>
-          <p:nvPr/>
-        </p:nvSpPr>
-        <p:spPr>
-          <a:xfrm>
-            <a:off x="8585150" y="3505200"/>
-            <a:ext cx="2657192" cy="228600"/>
-          </a:xfrm>
-          <a:prstGeom prst="rect">
-            <a:avLst/>
-          </a:prstGeom>
-          <a:noFill/>
-          <a:ln/>
-        </p:spPr>
-        <p:txBody>
-          <a:bodyPr wrap="square" lIns="0" tIns="0" rIns="0" bIns="0" rtlCol="0" anchor="t">
-            <a:spAutoFit/>
-          </a:bodyPr>
-          <a:lstStyle/>
-          <a:p>
-            <a:pPr marL="0" indent="0" algn="l">
-              <a:lnSpc>
-                <a:spcPts val="1800"/>
-              </a:lnSpc>
-              <a:buNone/>
-            </a:pPr>
-            <a:r>
-              <a:rPr lang="en-US" sz="1120" dirty="0">
-                <a:solidFill>
-                  <a:srgbClr val="D1D5DB"/>
-                </a:solidFill>
-                <a:latin typeface="ui-sans-serif" pitchFamily="34" charset="0"/>
-                <a:ea typeface="ui-sans-serif" pitchFamily="34" charset="-122"/>
-                <a:cs typeface="ui-sans-serif" pitchFamily="34" charset="-120"/>
-              </a:rPr>
-              <a:t>Services indépendants et petits</a:t>
-            </a:r>
-            <a:endParaRPr lang="en-US" sz="1120" dirty="0"/>
-          </a:p>
-        </p:txBody>
-      </p:sp>
-      <p:sp>
-        <p:nvSpPr>
-          <p:cNvPr id="50" name="Text 15"/>
-          <p:cNvSpPr/>
-          <p:nvPr/>
-        </p:nvSpPr>
-        <p:spPr>
-          <a:xfrm>
-            <a:off x="8585150" y="3848100"/>
-            <a:ext cx="2609880" cy="228600"/>
-          </a:xfrm>
-          <a:prstGeom prst="rect">
-            <a:avLst/>
-          </a:prstGeom>
-          <a:noFill/>
-          <a:ln/>
-        </p:spPr>
-        <p:txBody>
-          <a:bodyPr wrap="square" lIns="0" tIns="0" rIns="0" bIns="0" rtlCol="0" anchor="t">
-            <a:spAutoFit/>
-          </a:bodyPr>
-          <a:lstStyle/>
-          <a:p>
-            <a:pPr marL="0" indent="0" algn="l">
-              <a:lnSpc>
-                <a:spcPts val="1800"/>
-              </a:lnSpc>
-              <a:buNone/>
-            </a:pPr>
-            <a:r>
-              <a:rPr lang="en-US" sz="1120" dirty="0">
-                <a:solidFill>
-                  <a:srgbClr val="D1D5DB"/>
-                </a:solidFill>
-                <a:latin typeface="ui-sans-serif" pitchFamily="34" charset="0"/>
-                <a:ea typeface="ui-sans-serif" pitchFamily="34" charset="-122"/>
-                <a:cs typeface="ui-sans-serif" pitchFamily="34" charset="-120"/>
-              </a:rPr>
-              <a:t>Communication via API légères</a:t>
+              <a:t>API</a:t>
             </a:r>
             <a:endParaRPr lang="en-US" sz="1120" dirty="0"/>
           </a:p>
@@ -8397,7 +8685,7 @@
         <p:spPr>
           <a:xfrm>
             <a:off x="186690" y="5524500"/>
-            <a:ext cx="11818620" cy="266700"/>
+            <a:ext cx="11818620" cy="244682"/>
           </a:xfrm>
           <a:prstGeom prst="rect">
             <a:avLst/>
@@ -8418,7 +8706,7 @@
               <a:buNone/>
             </a:pPr>
             <a:r>
-              <a:rPr lang="en-US" sz="1260" dirty="0">
+              <a:rPr lang="ru-RU" sz="1260" dirty="0">
                 <a:solidFill>
                   <a:srgbClr val="E5E7EB"/>
                 </a:solidFill>
@@ -8426,7 +8714,29 @@
                 <a:ea typeface="ui-sans-serif" pitchFamily="34" charset="-122"/>
                 <a:cs typeface="ui-sans-serif" pitchFamily="34" charset="-120"/>
               </a:rPr>
-              <a:t>Spring Boot s'adapte à diverses architectures d'applications, des monolithes aux microservices</a:t>
+              <a:t>Spring Boot адаптируется к различным архитектурам приложений: от монолитов до </a:t>
+            </a:r>
+            <a:r>
+              <a:rPr lang="ru-RU" sz="1260" dirty="0" err="1">
+                <a:solidFill>
+                  <a:srgbClr val="E5E7EB"/>
+                </a:solidFill>
+                <a:latin typeface="ui-sans-serif" pitchFamily="34" charset="0"/>
+                <a:ea typeface="ui-sans-serif" pitchFamily="34" charset="-122"/>
+                <a:cs typeface="ui-sans-serif" pitchFamily="34" charset="-120"/>
+              </a:rPr>
+              <a:t>микросервисов</a:t>
+            </a:r>
+            <a:r>
+              <a:rPr lang="ru-RU" sz="1260" dirty="0">
+                <a:solidFill>
+                  <a:srgbClr val="E5E7EB"/>
+                </a:solidFill>
+                <a:latin typeface="ui-sans-serif" pitchFamily="34" charset="0"/>
+                <a:ea typeface="ui-sans-serif" pitchFamily="34" charset="-122"/>
+                <a:cs typeface="ui-sans-serif" pitchFamily="34" charset="-120"/>
+              </a:rPr>
+              <a:t>.</a:t>
             </a:r>
             <a:endParaRPr lang="en-US" sz="1260" dirty="0"/>
           </a:p>
@@ -8823,7 +9133,7 @@
               <a:buNone/>
             </a:pPr>
             <a:r>
-              <a:rPr lang="en-US" sz="3158" b="1" dirty="0">
+              <a:rPr lang="ru-RU" sz="3158" b="1" dirty="0">
                 <a:solidFill>
                   <a:srgbClr val="FFFFFF"/>
                 </a:solidFill>
@@ -8831,7 +9141,7 @@
                 <a:ea typeface="ui-sans-serif" pitchFamily="34" charset="-122"/>
                 <a:cs typeface="ui-sans-serif" pitchFamily="34" charset="-120"/>
               </a:rPr>
-              <a:t>Conclusion</a:t>
+              <a:t>Заключение</a:t>
             </a:r>
             <a:endParaRPr lang="en-US" sz="3158" dirty="0"/>
           </a:p>
@@ -8846,7 +9156,7 @@
         <p:spPr>
           <a:xfrm>
             <a:off x="2443014" y="1543050"/>
-            <a:ext cx="8486939" cy="342900"/>
+            <a:ext cx="8486939" cy="328744"/>
           </a:xfrm>
           <a:prstGeom prst="rect">
             <a:avLst/>
@@ -8867,7 +9177,7 @@
               <a:buNone/>
             </a:pPr>
             <a:r>
-              <a:rPr lang="en-US" sz="2040" b="1" dirty="0">
+              <a:rPr lang="ru-RU" sz="2040" b="1" dirty="0">
                 <a:solidFill>
                   <a:srgbClr val="90EE90"/>
                 </a:solidFill>
@@ -8875,7 +9185,7 @@
                 <a:ea typeface="ui-sans-serif" pitchFamily="34" charset="-122"/>
                 <a:cs typeface="ui-sans-serif" pitchFamily="34" charset="-120"/>
               </a:rPr>
-              <a:t>Spring Boot = Standard du développement Java</a:t>
+              <a:t>Spring Boot = стандарт разработки Java</a:t>
             </a:r>
             <a:endParaRPr lang="en-US" sz="2040" dirty="0"/>
           </a:p>
@@ -8911,7 +9221,7 @@
               <a:buNone/>
             </a:pPr>
             <a:r>
-              <a:rPr lang="en-US" sz="1380" dirty="0">
+              <a:rPr lang="ru-RU" sz="1380" dirty="0">
                 <a:solidFill>
                   <a:srgbClr val="E5E7EB"/>
                 </a:solidFill>
@@ -8919,7 +9229,7 @@
                 <a:ea typeface="ui-sans-serif" pitchFamily="34" charset="-122"/>
                 <a:cs typeface="ui-sans-serif" pitchFamily="34" charset="-120"/>
               </a:rPr>
-              <a:t>Spring Boot s'est imposé comme un standard de facto dans le développement Java, offrant une combinaison inégalée de commodité et d'évolutivité.</a:t>
+              <a:t>Spring Boot зарекомендовал себя как фактический стандарт в разработке Java, предлагая непревзойденное сочетание удобства и масштабируемости.</a:t>
             </a:r>
             <a:endParaRPr lang="en-US" sz="1380" dirty="0"/>
           </a:p>
@@ -8934,7 +9244,7 @@
         <p:spPr>
           <a:xfrm>
             <a:off x="888318" y="4000500"/>
-            <a:ext cx="2947615" cy="266700"/>
+            <a:ext cx="2947615" cy="248658"/>
           </a:xfrm>
           <a:prstGeom prst="rect">
             <a:avLst/>
@@ -8955,7 +9265,7 @@
               <a:buNone/>
             </a:pPr>
             <a:r>
-              <a:rPr lang="en-US" sz="1380" b="1" dirty="0">
+              <a:rPr lang="ru-RU" sz="1380" b="1" dirty="0">
                 <a:solidFill>
                   <a:srgbClr val="E5E7EB"/>
                 </a:solidFill>
@@ -8963,7 +9273,7 @@
                 <a:ea typeface="ui-sans-serif" pitchFamily="34" charset="-122"/>
                 <a:cs typeface="ui-sans-serif" pitchFamily="34" charset="-120"/>
               </a:rPr>
-              <a:t>Développement Accéléré</a:t>
+              <a:t>Ускоренное развитие</a:t>
             </a:r>
             <a:endParaRPr lang="en-US" sz="1380" dirty="0"/>
           </a:p>
@@ -8999,7 +9309,7 @@
               <a:buNone/>
             </a:pPr>
             <a:r>
-              <a:rPr lang="en-US" sz="1120" dirty="0">
+              <a:rPr lang="ru-RU" sz="1120" dirty="0">
                 <a:solidFill>
                   <a:srgbClr val="D1D5DB"/>
                 </a:solidFill>
@@ -9007,7 +9317,7 @@
                 <a:ea typeface="ui-sans-serif" pitchFamily="34" charset="-122"/>
                 <a:cs typeface="ui-sans-serif" pitchFamily="34" charset="-120"/>
               </a:rPr>
-              <a:t>Abstraction des configurations complexes et fourniture de valeurs par défaut sensibles</a:t>
+              <a:t>Абстрагирование сложных конфигураций и предоставление разумных значений по умолчанию</a:t>
             </a:r>
             <a:endParaRPr lang="en-US" sz="1120" dirty="0"/>
           </a:p>
@@ -9022,7 +9332,7 @@
         <p:spPr>
           <a:xfrm>
             <a:off x="4462009" y="4000500"/>
-            <a:ext cx="3267834" cy="266700"/>
+            <a:ext cx="3267834" cy="248658"/>
           </a:xfrm>
           <a:prstGeom prst="rect">
             <a:avLst/>
@@ -9043,7 +9353,7 @@
               <a:buNone/>
             </a:pPr>
             <a:r>
-              <a:rPr lang="en-US" sz="1380" b="1" dirty="0">
+              <a:rPr lang="ru-RU" sz="1380" b="1" dirty="0">
                 <a:solidFill>
                   <a:srgbClr val="E5E7EB"/>
                 </a:solidFill>
@@ -9051,7 +9361,7 @@
                 <a:ea typeface="ui-sans-serif" pitchFamily="34" charset="-122"/>
                 <a:cs typeface="ui-sans-serif" pitchFamily="34" charset="-120"/>
               </a:rPr>
-              <a:t>Focus sur la Logique Métier</a:t>
+              <a:t>Сосредоточение на бизнес-логике</a:t>
             </a:r>
             <a:endParaRPr lang="en-US" sz="1380" dirty="0"/>
           </a:p>
@@ -9066,7 +9376,7 @@
         <p:spPr>
           <a:xfrm>
             <a:off x="4533900" y="4343400"/>
-            <a:ext cx="3124200" cy="685800"/>
+            <a:ext cx="3124200" cy="441916"/>
           </a:xfrm>
           <a:prstGeom prst="rect">
             <a:avLst/>
@@ -9087,7 +9397,7 @@
               <a:buNone/>
             </a:pPr>
             <a:r>
-              <a:rPr lang="en-US" sz="1120" dirty="0">
+              <a:rPr lang="ru-RU" sz="1120" dirty="0">
                 <a:solidFill>
                   <a:srgbClr val="D1D5DB"/>
                 </a:solidFill>
@@ -9095,7 +9405,7 @@
                 <a:ea typeface="ui-sans-serif" pitchFamily="34" charset="-122"/>
                 <a:cs typeface="ui-sans-serif" pitchFamily="34" charset="-120"/>
               </a:rPr>
-              <a:t>Permet aux développeurs se concentrer sur la logique métier plutôt que sur la configuration</a:t>
+              <a:t>Позволяет разработчикам сосредоточиться на бизнес-логике, а не на конфигурации</a:t>
             </a:r>
             <a:endParaRPr lang="en-US" sz="1120" dirty="0"/>
           </a:p>
@@ -9110,7 +9420,7 @@
         <p:spPr>
           <a:xfrm>
             <a:off x="8267700" y="4000500"/>
-            <a:ext cx="3124200" cy="533400"/>
+            <a:ext cx="3124200" cy="248658"/>
           </a:xfrm>
           <a:prstGeom prst="rect">
             <a:avLst/>
@@ -9131,7 +9441,7 @@
               <a:buNone/>
             </a:pPr>
             <a:r>
-              <a:rPr lang="en-US" sz="1380" b="1" dirty="0">
+              <a:rPr lang="ru-RU" sz="1380" b="1" dirty="0">
                 <a:solidFill>
                   <a:srgbClr val="E5E7EB"/>
                 </a:solidFill>
@@ -9139,7 +9449,18 @@
                 <a:ea typeface="ui-sans-serif" pitchFamily="34" charset="-122"/>
                 <a:cs typeface="ui-sans-serif" pitchFamily="34" charset="-120"/>
               </a:rPr>
-              <a:t>Applications Web &amp; Microservices</a:t>
+              <a:t>Веб-приложения и </a:t>
+            </a:r>
+            <a:r>
+              <a:rPr lang="ru-RU" sz="1380" b="1" dirty="0" err="1">
+                <a:solidFill>
+                  <a:srgbClr val="E5E7EB"/>
+                </a:solidFill>
+                <a:latin typeface="ui-sans-serif" pitchFamily="34" charset="0"/>
+                <a:ea typeface="ui-sans-serif" pitchFamily="34" charset="-122"/>
+                <a:cs typeface="ui-sans-serif" pitchFamily="34" charset="-120"/>
+              </a:rPr>
+              <a:t>микросервисы</a:t>
             </a:r>
             <a:endParaRPr lang="en-US" sz="1380" dirty="0"/>
           </a:p>
@@ -9154,7 +9475,7 @@
         <p:spPr>
           <a:xfrm>
             <a:off x="8267700" y="4610100"/>
-            <a:ext cx="3124200" cy="685800"/>
+            <a:ext cx="3124200" cy="441916"/>
           </a:xfrm>
           <a:prstGeom prst="rect">
             <a:avLst/>
@@ -9175,7 +9496,7 @@
               <a:buNone/>
             </a:pPr>
             <a:r>
-              <a:rPr lang="en-US" sz="1120" dirty="0">
+              <a:rPr lang="ru-RU" sz="1120" dirty="0">
                 <a:solidFill>
                   <a:srgbClr val="D1D5DB"/>
                 </a:solidFill>
@@ -9183,7 +9504,18 @@
                 <a:ea typeface="ui-sans-serif" pitchFamily="34" charset="-122"/>
                 <a:cs typeface="ui-sans-serif" pitchFamily="34" charset="-120"/>
               </a:rPr>
-              <a:t>Idéal pour le développement d'applications web modernes et de microservices</a:t>
+              <a:t>Идеально подходит для разработки современных веб-приложений и </a:t>
+            </a:r>
+            <a:r>
+              <a:rPr lang="ru-RU" sz="1120" dirty="0" err="1">
+                <a:solidFill>
+                  <a:srgbClr val="D1D5DB"/>
+                </a:solidFill>
+                <a:latin typeface="ui-sans-serif" pitchFamily="34" charset="0"/>
+                <a:ea typeface="ui-sans-serif" pitchFamily="34" charset="-122"/>
+                <a:cs typeface="ui-sans-serif" pitchFamily="34" charset="-120"/>
+              </a:rPr>
+              <a:t>микросервисов</a:t>
             </a:r>
             <a:endParaRPr lang="en-US" sz="1120" dirty="0"/>
           </a:p>
@@ -9198,7 +9530,7 @@
         <p:spPr>
           <a:xfrm>
             <a:off x="762000" y="5943600"/>
-            <a:ext cx="10668000" cy="609600"/>
+            <a:ext cx="10668000" cy="286553"/>
           </a:xfrm>
           <a:prstGeom prst="rect">
             <a:avLst/>
@@ -9219,7 +9551,7 @@
               <a:buNone/>
             </a:pPr>
             <a:r>
-              <a:rPr lang="en-US" sz="1646" b="1" dirty="0">
+              <a:rPr lang="ru-RU" sz="1646" b="1" dirty="0">
                 <a:solidFill>
                   <a:srgbClr val="FFFFFF"/>
                 </a:solidFill>
@@ -9227,7 +9559,7 @@
                 <a:ea typeface="ui-sans-serif" pitchFamily="34" charset="-122"/>
                 <a:cs typeface="ui-sans-serif" pitchFamily="34" charset="-120"/>
               </a:rPr>
-              <a:t>Spring Boot → Le choix idéal pour le développement rapide et robuste d'applications modernes</a:t>
+              <a:t>Spring Boot → Идеальный выбор для быстрой и надежной разработки современных приложений</a:t>
             </a:r>
             <a:endParaRPr lang="en-US" sz="1646" dirty="0"/>
           </a:p>
@@ -9242,7 +9574,7 @@
         <p:spPr>
           <a:xfrm>
             <a:off x="60960" y="7010400"/>
-            <a:ext cx="12070080" cy="342900"/>
+            <a:ext cx="12070080" cy="328744"/>
           </a:xfrm>
           <a:prstGeom prst="rect">
             <a:avLst/>
@@ -9263,7 +9595,7 @@
               <a:buNone/>
             </a:pPr>
             <a:r>
-              <a:rPr lang="en-US" sz="2040" b="1" dirty="0">
+              <a:rPr lang="ru-RU" sz="2040" b="1" dirty="0">
                 <a:solidFill>
                   <a:srgbClr val="90EE90"/>
                 </a:solidFill>
@@ -9271,7 +9603,7 @@
                 <a:ea typeface="ui-sans-serif" pitchFamily="34" charset="-122"/>
                 <a:cs typeface="ui-sans-serif" pitchFamily="34" charset="-120"/>
               </a:rPr>
-              <a:t>Merci !</a:t>
+              <a:t>СПАСИБО !</a:t>
             </a:r>
             <a:endParaRPr lang="en-US" sz="2040" dirty="0"/>
           </a:p>
@@ -9286,7 +9618,7 @@
         <p:spPr>
           <a:xfrm>
             <a:off x="60960" y="7353300"/>
-            <a:ext cx="12070080" cy="266700"/>
+            <a:ext cx="12070080" cy="244682"/>
           </a:xfrm>
           <a:prstGeom prst="rect">
             <a:avLst/>
@@ -9307,7 +9639,7 @@
               <a:buNone/>
             </a:pPr>
             <a:r>
-              <a:rPr lang="en-US" sz="1260" dirty="0">
+              <a:rPr lang="ru-RU" sz="1260" dirty="0">
                 <a:solidFill>
                   <a:srgbClr val="9CA3AF"/>
                 </a:solidFill>
@@ -9315,7 +9647,7 @@
                 <a:ea typeface="ui-sans-serif" pitchFamily="34" charset="-122"/>
                 <a:cs typeface="ui-sans-serif" pitchFamily="34" charset="-120"/>
               </a:rPr>
-              <a:t>Questions ?</a:t>
+              <a:t>Вопросы ?</a:t>
             </a:r>
             <a:endParaRPr lang="en-US" sz="1260" dirty="0"/>
           </a:p>
@@ -14909,7 +15241,7 @@
               <a:buNone/>
             </a:pPr>
             <a:r>
-              <a:rPr lang="en-US" sz="1120" dirty="0">
+              <a:rPr lang="ru-RU" sz="1120" dirty="0">
                 <a:solidFill>
                   <a:srgbClr val="E5E7EB"/>
                 </a:solidFill>
@@ -14917,7 +15249,7 @@
                 <a:ea typeface="ui-sans-serif" pitchFamily="34" charset="-122"/>
                 <a:cs typeface="ui-sans-serif" pitchFamily="34" charset="-120"/>
               </a:rPr>
-              <a:t>This three-tier structure promotes separation of concerns and maintainability of the application, by clearly defining the responsibilities of each component.</a:t>
+              <a:t>Трехуровневая структура способствует разделению задач и удобству обслуживания приложения за счет четкого определения обязанностей каждого компонента.</a:t>
             </a:r>
             <a:endParaRPr lang="en-US" sz="1120" dirty="0"/>
           </a:p>
@@ -17120,7 +17452,7 @@
         <p:spPr>
           <a:xfrm>
             <a:off x="800100" y="3162300"/>
-            <a:ext cx="3124200" cy="685800"/>
+            <a:ext cx="3124200" cy="672748"/>
           </a:xfrm>
           <a:prstGeom prst="rect">
             <a:avLst/>
@@ -17141,7 +17473,7 @@
               <a:buNone/>
             </a:pPr>
             <a:r>
-              <a:rPr lang="en-US" sz="1120" dirty="0">
+              <a:rPr lang="ru-RU" sz="1120" dirty="0">
                 <a:solidFill>
                   <a:srgbClr val="E5E7EB"/>
                 </a:solidFill>
@@ -17149,8 +17481,24 @@
                 <a:ea typeface="ui-sans-serif" pitchFamily="34" charset="-122"/>
                 <a:cs typeface="ui-sans-serif" pitchFamily="34" charset="-120"/>
               </a:rPr>
-              <a:t>Transfère la responsabilité de la création et du gestionnaire d'objets vers le conteneur Spring.</a:t>
-            </a:r>
+              <a:t>Передает ответственность за создание и управление объектами контейнеру Spring.</a:t>
+            </a:r>
+            <a:endParaRPr lang="en-US" sz="1120" dirty="0">
+              <a:solidFill>
+                <a:srgbClr val="E5E7EB"/>
+              </a:solidFill>
+              <a:latin typeface="ui-sans-serif" pitchFamily="34" charset="0"/>
+              <a:ea typeface="ui-sans-serif" pitchFamily="34" charset="-122"/>
+              <a:cs typeface="ui-sans-serif" pitchFamily="34" charset="-120"/>
+            </a:endParaRPr>
+          </a:p>
+          <a:p>
+            <a:pPr marL="0" indent="0">
+              <a:lnSpc>
+                <a:spcPts val="1800"/>
+              </a:lnSpc>
+              <a:buNone/>
+            </a:pPr>
             <a:endParaRPr lang="en-US" sz="1120" dirty="0"/>
           </a:p>
         </p:txBody>
@@ -17164,7 +17512,7 @@
         <p:spPr>
           <a:xfrm>
             <a:off x="1009650" y="3962400"/>
-            <a:ext cx="3436620" cy="190500"/>
+            <a:ext cx="3436620" cy="177421"/>
           </a:xfrm>
           <a:prstGeom prst="rect">
             <a:avLst/>
@@ -17185,7 +17533,7 @@
               <a:buNone/>
             </a:pPr>
             <a:r>
-              <a:rPr lang="en-US" sz="980" dirty="0">
+              <a:rPr lang="ru-RU" sz="980" dirty="0">
                 <a:solidFill>
                   <a:srgbClr val="D1D5DB"/>
                 </a:solidFill>
@@ -17193,7 +17541,7 @@
                 <a:ea typeface="ui-sans-serif" pitchFamily="34" charset="-122"/>
                 <a:cs typeface="ui-sans-serif" pitchFamily="34" charset="-120"/>
               </a:rPr>
-              <a:t>Réduit la couplage</a:t>
+              <a:t>Уменьшает сцепление</a:t>
             </a:r>
             <a:endParaRPr lang="en-US" sz="980" dirty="0"/>
           </a:p>
@@ -17208,7 +17556,7 @@
         <p:spPr>
           <a:xfrm>
             <a:off x="1009650" y="4152900"/>
-            <a:ext cx="3436620" cy="190500"/>
+            <a:ext cx="3436620" cy="177421"/>
           </a:xfrm>
           <a:prstGeom prst="rect">
             <a:avLst/>
@@ -17229,7 +17577,7 @@
               <a:buNone/>
             </a:pPr>
             <a:r>
-              <a:rPr lang="en-US" sz="980" dirty="0">
+              <a:rPr lang="ru-RU" sz="980" dirty="0">
                 <a:solidFill>
                   <a:srgbClr val="D1D5DB"/>
                 </a:solidFill>
@@ -17237,7 +17585,7 @@
                 <a:ea typeface="ui-sans-serif" pitchFamily="34" charset="-122"/>
                 <a:cs typeface="ui-sans-serif" pitchFamily="34" charset="-120"/>
               </a:rPr>
-              <a:t>Simplifie les tests</a:t>
+              <a:t>Упрощает тестирование</a:t>
             </a:r>
             <a:endParaRPr lang="en-US" sz="980" dirty="0"/>
           </a:p>
@@ -17317,7 +17665,7 @@
               <a:buNone/>
             </a:pPr>
             <a:r>
-              <a:rPr lang="en-US" sz="1120" dirty="0">
+              <a:rPr lang="ru-RU" sz="1120" dirty="0">
                 <a:solidFill>
                   <a:srgbClr val="E5E7EB"/>
                 </a:solidFill>
@@ -17325,7 +17673,7 @@
                 <a:ea typeface="ui-sans-serif" pitchFamily="34" charset="-122"/>
                 <a:cs typeface="ui-sans-serif" pitchFamily="34" charset="-120"/>
               </a:rPr>
-              <a:t>Assure qu'une seule instance d'une classe est créée et la même instance est retournée à toutes les demandes.</a:t>
+              <a:t>Гарантирует, что создается только один экземпляр класса и во всех запросах возвращается один и тот же экземпляр.</a:t>
             </a:r>
             <a:endParaRPr lang="en-US" sz="1120" dirty="0"/>
           </a:p>
@@ -17340,7 +17688,7 @@
         <p:spPr>
           <a:xfrm>
             <a:off x="4743450" y="3810000"/>
-            <a:ext cx="3436620" cy="190500"/>
+            <a:ext cx="3436620" cy="177421"/>
           </a:xfrm>
           <a:prstGeom prst="rect">
             <a:avLst/>
@@ -17369,7 +17717,7 @@
                 <a:ea typeface="ui-sans-serif" pitchFamily="34" charset="-122"/>
                 <a:cs typeface="ui-sans-serif" pitchFamily="34" charset="-120"/>
               </a:rPr>
-              <a:t>Partage d'état</a:t>
+              <a:t>State sharing</a:t>
             </a:r>
             <a:endParaRPr lang="en-US" sz="980" dirty="0"/>
           </a:p>
@@ -17384,7 +17732,7 @@
         <p:spPr>
           <a:xfrm>
             <a:off x="4743450" y="4000500"/>
-            <a:ext cx="3436620" cy="190500"/>
+            <a:ext cx="3436620" cy="177421"/>
           </a:xfrm>
           <a:prstGeom prst="rect">
             <a:avLst/>
@@ -17405,7 +17753,7 @@
               <a:buNone/>
             </a:pPr>
             <a:r>
-              <a:rPr lang="en-US" sz="980" dirty="0">
+              <a:rPr lang="ru-RU" sz="980" dirty="0">
                 <a:solidFill>
                   <a:srgbClr val="D1D5DB"/>
                 </a:solidFill>
@@ -17413,7 +17761,7 @@
                 <a:ea typeface="ui-sans-serif" pitchFamily="34" charset="-122"/>
                 <a:cs typeface="ui-sans-serif" pitchFamily="34" charset="-120"/>
               </a:rPr>
-              <a:t>Optimisation des ressources</a:t>
+              <a:t>Оптимизация ресурсов</a:t>
             </a:r>
             <a:endParaRPr lang="en-US" sz="980" dirty="0"/>
           </a:p>
@@ -17472,7 +17820,7 @@
         <p:spPr>
           <a:xfrm>
             <a:off x="8267700" y="3009900"/>
-            <a:ext cx="3124200" cy="685800"/>
+            <a:ext cx="3124200" cy="441916"/>
           </a:xfrm>
           <a:prstGeom prst="rect">
             <a:avLst/>
@@ -17493,7 +17841,7 @@
               <a:buNone/>
             </a:pPr>
             <a:r>
-              <a:rPr lang="en-US" sz="1120" dirty="0">
+              <a:rPr lang="ru-RU" sz="1120" dirty="0">
                 <a:solidFill>
                   <a:srgbClr val="E5E7EB"/>
                 </a:solidFill>
@@ -17501,7 +17849,7 @@
                 <a:ea typeface="ui-sans-serif" pitchFamily="34" charset="-122"/>
                 <a:cs typeface="ui-sans-serif" pitchFamily="34" charset="-120"/>
               </a:rPr>
-              <a:t>Crée des objets sans exposer la logique de création, seuls les objets créés sont exposés.</a:t>
+              <a:t>Создает объекты, не раскрывая логику создания, раскрываются только созданные объекты.</a:t>
             </a:r>
             <a:endParaRPr lang="en-US" sz="1120" dirty="0"/>
           </a:p>
@@ -17516,7 +17864,7 @@
         <p:spPr>
           <a:xfrm>
             <a:off x="8477250" y="3810000"/>
-            <a:ext cx="3436620" cy="190500"/>
+            <a:ext cx="3436620" cy="177421"/>
           </a:xfrm>
           <a:prstGeom prst="rect">
             <a:avLst/>
@@ -17537,7 +17885,7 @@
               <a:buNone/>
             </a:pPr>
             <a:r>
-              <a:rPr lang="en-US" sz="980" dirty="0">
+              <a:rPr lang="ru-RU" sz="980" dirty="0">
                 <a:solidFill>
                   <a:srgbClr val="D1D5DB"/>
                 </a:solidFill>
@@ -17545,7 +17893,7 @@
                 <a:ea typeface="ui-sans-serif" pitchFamily="34" charset="-122"/>
                 <a:cs typeface="ui-sans-serif" pitchFamily="34" charset="-120"/>
               </a:rPr>
-              <a:t>Encapsulation de la création</a:t>
+              <a:t>Инкапсуляция творения</a:t>
             </a:r>
             <a:endParaRPr lang="en-US" sz="980" dirty="0"/>
           </a:p>
@@ -17560,7 +17908,7 @@
         <p:spPr>
           <a:xfrm>
             <a:off x="8477250" y="4000500"/>
-            <a:ext cx="3436620" cy="190500"/>
+            <a:ext cx="3436620" cy="177421"/>
           </a:xfrm>
           <a:prstGeom prst="rect">
             <a:avLst/>
@@ -17581,7 +17929,7 @@
               <a:buNone/>
             </a:pPr>
             <a:r>
-              <a:rPr lang="en-US" sz="980" dirty="0">
+              <a:rPr lang="ru-RU" sz="980" dirty="0">
                 <a:solidFill>
                   <a:srgbClr val="D1D5DB"/>
                 </a:solidFill>
@@ -17589,7 +17937,7 @@
                 <a:ea typeface="ui-sans-serif" pitchFamily="34" charset="-122"/>
                 <a:cs typeface="ui-sans-serif" pitchFamily="34" charset="-120"/>
               </a:rPr>
-              <a:t>Interface client indépendante</a:t>
+              <a:t>Независимый клиентский интерфейс</a:t>
             </a:r>
             <a:endParaRPr lang="en-US" sz="980" dirty="0"/>
           </a:p>
@@ -17648,7 +17996,7 @@
         <p:spPr>
           <a:xfrm>
             <a:off x="800100" y="5524500"/>
-            <a:ext cx="3124200" cy="685800"/>
+            <a:ext cx="3124200" cy="441916"/>
           </a:xfrm>
           <a:prstGeom prst="rect">
             <a:avLst/>
@@ -17669,7 +18017,7 @@
               <a:buNone/>
             </a:pPr>
             <a:r>
-              <a:rPr lang="en-US" sz="1120" dirty="0">
+              <a:rPr lang="ru-RU" sz="1120" dirty="0">
                 <a:solidFill>
                   <a:srgbClr val="E5E7EB"/>
                 </a:solidFill>
@@ -17677,7 +18025,7 @@
                 <a:ea typeface="ui-sans-serif" pitchFamily="34" charset="-122"/>
                 <a:cs typeface="ui-sans-serif" pitchFamily="34" charset="-120"/>
               </a:rPr>
-              <a:t>Fournit une interface pour accéder à un autre objet, en ajoutant des fonctionnalités.</a:t>
+              <a:t>Предоставляет интерфейс для доступа к другому объекту, добавляя функциональность.</a:t>
             </a:r>
             <a:endParaRPr lang="en-US" sz="1120" dirty="0"/>
           </a:p>
@@ -17692,7 +18040,7 @@
         <p:spPr>
           <a:xfrm>
             <a:off x="1009650" y="6324600"/>
-            <a:ext cx="3436620" cy="190500"/>
+            <a:ext cx="3436620" cy="177421"/>
           </a:xfrm>
           <a:prstGeom prst="rect">
             <a:avLst/>
@@ -17713,7 +18061,7 @@
               <a:buNone/>
             </a:pPr>
             <a:r>
-              <a:rPr lang="en-US" sz="980" dirty="0">
+              <a:rPr lang="ru-RU" sz="980" dirty="0">
                 <a:solidFill>
                   <a:srgbClr val="D1D5DB"/>
                 </a:solidFill>
@@ -17721,7 +18069,7 @@
                 <a:ea typeface="ui-sans-serif" pitchFamily="34" charset="-122"/>
                 <a:cs typeface="ui-sans-serif" pitchFamily="34" charset="-120"/>
               </a:rPr>
-              <a:t>Contrôle d'accès</a:t>
+              <a:t>Контроль доступа</a:t>
             </a:r>
             <a:endParaRPr lang="en-US" sz="980" dirty="0"/>
           </a:p>
@@ -17736,7 +18084,7 @@
         <p:spPr>
           <a:xfrm>
             <a:off x="1009650" y="6515100"/>
-            <a:ext cx="3436620" cy="190500"/>
+            <a:ext cx="3436620" cy="177421"/>
           </a:xfrm>
           <a:prstGeom prst="rect">
             <a:avLst/>
@@ -17757,7 +18105,7 @@
               <a:buNone/>
             </a:pPr>
             <a:r>
-              <a:rPr lang="en-US" sz="980" dirty="0">
+              <a:rPr lang="ru-RU" sz="980" dirty="0">
                 <a:solidFill>
                   <a:srgbClr val="D1D5DB"/>
                 </a:solidFill>
@@ -17765,7 +18113,7 @@
                 <a:ea typeface="ui-sans-serif" pitchFamily="34" charset="-122"/>
                 <a:cs typeface="ui-sans-serif" pitchFamily="34" charset="-120"/>
               </a:rPr>
-              <a:t>Journalisation, transaction</a:t>
+              <a:t>Ведение журнала, транзакции</a:t>
             </a:r>
             <a:endParaRPr lang="en-US" sz="980" dirty="0"/>
           </a:p>
@@ -17824,7 +18172,7 @@
         <p:spPr>
           <a:xfrm>
             <a:off x="4533900" y="5524500"/>
-            <a:ext cx="3124200" cy="685800"/>
+            <a:ext cx="3124200" cy="441916"/>
           </a:xfrm>
           <a:prstGeom prst="rect">
             <a:avLst/>
@@ -17845,7 +18193,7 @@
               <a:buNone/>
             </a:pPr>
             <a:r>
-              <a:rPr lang="en-US" sz="1120" dirty="0">
+              <a:rPr lang="ru-RU" sz="1120" dirty="0">
                 <a:solidFill>
                   <a:srgbClr val="E5E7EB"/>
                 </a:solidFill>
@@ -17853,7 +18201,7 @@
                 <a:ea typeface="ui-sans-serif" pitchFamily="34" charset="-122"/>
                 <a:cs typeface="ui-sans-serif" pitchFamily="34" charset="-120"/>
               </a:rPr>
-              <a:t>Définit la structure d'une méthode, en laissant certaines étapes pour les sous-classes.</a:t>
+              <a:t>Определяет структуру метода, оставляя некоторые шаги для подклассов.</a:t>
             </a:r>
             <a:endParaRPr lang="en-US" sz="1120" dirty="0"/>
           </a:p>
@@ -17868,7 +18216,7 @@
         <p:spPr>
           <a:xfrm>
             <a:off x="4743450" y="6324600"/>
-            <a:ext cx="3436620" cy="190500"/>
+            <a:ext cx="3436620" cy="177421"/>
           </a:xfrm>
           <a:prstGeom prst="rect">
             <a:avLst/>
@@ -17889,7 +18237,7 @@
               <a:buNone/>
             </a:pPr>
             <a:r>
-              <a:rPr lang="en-US" sz="980" dirty="0">
+              <a:rPr lang="ru-RU" sz="980" dirty="0">
                 <a:solidFill>
                   <a:srgbClr val="D1D5DB"/>
                 </a:solidFill>
@@ -17897,7 +18245,7 @@
                 <a:ea typeface="ui-sans-serif" pitchFamily="34" charset="-122"/>
                 <a:cs typeface="ui-sans-serif" pitchFamily="34" charset="-120"/>
               </a:rPr>
-              <a:t>Algorithmes avec des étapes</a:t>
+              <a:t>Алгоритмы с шагами</a:t>
             </a:r>
             <a:endParaRPr lang="en-US" sz="980" dirty="0"/>
           </a:p>
@@ -17912,7 +18260,7 @@
         <p:spPr>
           <a:xfrm>
             <a:off x="4743450" y="6515100"/>
-            <a:ext cx="3436620" cy="190500"/>
+            <a:ext cx="3436620" cy="177421"/>
           </a:xfrm>
           <a:prstGeom prst="rect">
             <a:avLst/>
@@ -17933,7 +18281,7 @@
               <a:buNone/>
             </a:pPr>
             <a:r>
-              <a:rPr lang="en-US" sz="980" dirty="0">
+              <a:rPr lang="ru-RU" sz="980" dirty="0">
                 <a:solidFill>
                   <a:srgbClr val="D1D5DB"/>
                 </a:solidFill>
@@ -17941,7 +18289,7 @@
                 <a:ea typeface="ui-sans-serif" pitchFamily="34" charset="-122"/>
                 <a:cs typeface="ui-sans-serif" pitchFamily="34" charset="-120"/>
               </a:rPr>
-              <a:t>Moins de surcharge</a:t>
+              <a:t>Меньше перегрузки</a:t>
             </a:r>
             <a:endParaRPr lang="en-US" sz="980" dirty="0"/>
           </a:p>
@@ -18000,7 +18348,7 @@
         <p:spPr>
           <a:xfrm>
             <a:off x="8267700" y="5524500"/>
-            <a:ext cx="3124200" cy="685800"/>
+            <a:ext cx="3124200" cy="441916"/>
           </a:xfrm>
           <a:prstGeom prst="rect">
             <a:avLst/>
@@ -18021,7 +18369,7 @@
               <a:buNone/>
             </a:pPr>
             <a:r>
-              <a:rPr lang="en-US" sz="1120" dirty="0">
+              <a:rPr lang="ru-RU" sz="1120" dirty="0">
                 <a:solidFill>
                   <a:srgbClr val="E5E7EB"/>
                 </a:solidFill>
@@ -18029,7 +18377,7 @@
                 <a:ea typeface="ui-sans-serif" pitchFamily="34" charset="-122"/>
                 <a:cs typeface="ui-sans-serif" pitchFamily="34" charset="-120"/>
               </a:rPr>
-              <a:t>Spring Boot utilise ces patterns pour créer une architecture flexible et puissante.</a:t>
+              <a:t>Spring Boot использует эти шаблоны для создания гибкой и мощной архитектуры.</a:t>
             </a:r>
             <a:endParaRPr lang="en-US" sz="1120" dirty="0"/>
           </a:p>
@@ -18733,7 +19081,7 @@
         <p:spPr>
           <a:xfrm>
             <a:off x="2752725" y="1981200"/>
-            <a:ext cx="2438400" cy="685800"/>
+            <a:ext cx="2438400" cy="441916"/>
           </a:xfrm>
           <a:prstGeom prst="rect">
             <a:avLst/>
@@ -18754,7 +19102,7 @@
               <a:buNone/>
             </a:pPr>
             <a:r>
-              <a:rPr lang="en-US" sz="1120" dirty="0">
+              <a:rPr lang="ru-RU" sz="1120" dirty="0">
                 <a:solidFill>
                   <a:srgbClr val="9CA3AF"/>
                 </a:solidFill>
@@ -18762,7 +19110,7 @@
                 <a:ea typeface="ui-sans-serif" pitchFamily="34" charset="-122"/>
                 <a:cs typeface="ui-sans-serif" pitchFamily="34" charset="-120"/>
               </a:rPr>
-              <a:t>Une seule application gérant tout le business logic et la gestion des données</a:t>
+              <a:t>Единое приложение, управляющее всей бизнес-логикой и данными</a:t>
             </a:r>
             <a:endParaRPr lang="en-US" sz="1120" dirty="0"/>
           </a:p>
@@ -18821,7 +19169,7 @@
         <p:spPr>
           <a:xfrm>
             <a:off x="7000875" y="1866900"/>
-            <a:ext cx="2438400" cy="914400"/>
+            <a:ext cx="2438400" cy="672748"/>
           </a:xfrm>
           <a:prstGeom prst="rect">
             <a:avLst/>
@@ -18842,7 +19190,7 @@
               <a:buNone/>
             </a:pPr>
             <a:r>
-              <a:rPr lang="en-US" sz="1120" dirty="0">
+              <a:rPr lang="ru-RU" sz="1120" dirty="0">
                 <a:solidFill>
                   <a:srgbClr val="E5E7EB"/>
                 </a:solidFill>
@@ -18850,7 +19198,7 @@
                 <a:ea typeface="ui-sans-serif" pitchFamily="34" charset="-122"/>
                 <a:cs typeface="ui-sans-serif" pitchFamily="34" charset="-120"/>
               </a:rPr>
-              <a:t>Application décomposée en services indépendants communiquant via des API légères</a:t>
+              <a:t>Приложение разделено на независимые сервисы, взаимодействующие через легкие API</a:t>
             </a:r>
             <a:endParaRPr lang="en-US" sz="1120" dirty="0"/>
           </a:p>
@@ -18909,7 +19257,7 @@
         <p:spPr>
           <a:xfrm>
             <a:off x="1028700" y="3886200"/>
-            <a:ext cx="2432908" cy="228600"/>
+            <a:ext cx="3238500" cy="211083"/>
           </a:xfrm>
           <a:prstGeom prst="rect">
             <a:avLst/>
@@ -18930,7 +19278,7 @@
               <a:buNone/>
             </a:pPr>
             <a:r>
-              <a:rPr lang="en-US" sz="1120" dirty="0">
+              <a:rPr lang="ru-RU" sz="1120" dirty="0">
                 <a:solidFill>
                   <a:srgbClr val="D1D5DB"/>
                 </a:solidFill>
@@ -18938,7 +19286,7 @@
                 <a:ea typeface="ui-sans-serif" pitchFamily="34" charset="-122"/>
                 <a:cs typeface="ui-sans-serif" pitchFamily="34" charset="-120"/>
               </a:rPr>
-              <a:t>Architecture orientée service</a:t>
+              <a:t>Сервисно-ориентированная архитектура</a:t>
             </a:r>
             <a:endParaRPr lang="en-US" sz="1120" dirty="0"/>
           </a:p>
@@ -18953,7 +19301,7 @@
         <p:spPr>
           <a:xfrm>
             <a:off x="1028700" y="4191000"/>
-            <a:ext cx="5055885" cy="228600"/>
+            <a:ext cx="5055885" cy="211083"/>
           </a:xfrm>
           <a:prstGeom prst="rect">
             <a:avLst/>
@@ -18974,7 +19322,7 @@
               <a:buNone/>
             </a:pPr>
             <a:r>
-              <a:rPr lang="en-US" sz="1120" dirty="0">
+              <a:rPr lang="ru-RU" sz="1120" dirty="0">
                 <a:solidFill>
                   <a:srgbClr val="D1D5DB"/>
                 </a:solidFill>
@@ -18982,7 +19330,7 @@
                 <a:ea typeface="ui-sans-serif" pitchFamily="34" charset="-122"/>
                 <a:cs typeface="ui-sans-serif" pitchFamily="34" charset="-120"/>
               </a:rPr>
-              <a:t>Evolution vers des approches plus distribuées et modulaires</a:t>
+              <a:t>Эволюция в сторону более распределенных и модульных подходов</a:t>
             </a:r>
             <a:endParaRPr lang="en-US" sz="1120" dirty="0"/>
           </a:p>
@@ -19018,7 +19366,7 @@
               <a:buNone/>
             </a:pPr>
             <a:r>
-              <a:rPr lang="en-US" sz="1120" dirty="0">
+              <a:rPr lang="ru-RU" sz="1120" dirty="0">
                 <a:solidFill>
                   <a:srgbClr val="D1D5DB"/>
                 </a:solidFill>
@@ -19026,7 +19374,7 @@
                 <a:ea typeface="ui-sans-serif" pitchFamily="34" charset="-122"/>
                 <a:cs typeface="ui-sans-serif" pitchFamily="34" charset="-120"/>
               </a:rPr>
-              <a:t>Monolithes deviennent difficiles à mettre à l'échelle et à déployer à mesure qu'ils grandissent</a:t>
+              <a:t>Монолиты становится трудно масштабировать и развертывать по мере их роста.</a:t>
             </a:r>
             <a:endParaRPr lang="en-US" sz="1120" dirty="0"/>
           </a:p>
@@ -19041,7 +19389,7 @@
         <p:spPr>
           <a:xfrm>
             <a:off x="6800850" y="3162300"/>
-            <a:ext cx="4121423" cy="304800"/>
+            <a:ext cx="4121423" cy="286553"/>
           </a:xfrm>
           <a:prstGeom prst="rect">
             <a:avLst/>
@@ -19062,7 +19410,7 @@
               <a:buNone/>
             </a:pPr>
             <a:r>
-              <a:rPr lang="en-US" sz="1646" b="1" dirty="0">
+              <a:rPr lang="ru-RU" sz="1646" b="1" dirty="0">
                 <a:solidFill>
                   <a:srgbClr val="90EE90"/>
                 </a:solidFill>
@@ -19070,7 +19418,18 @@
                 <a:ea typeface="ui-sans-serif" pitchFamily="34" charset="-122"/>
                 <a:cs typeface="ui-sans-serif" pitchFamily="34" charset="-120"/>
               </a:rPr>
-              <a:t>Avantages des microservices</a:t>
+              <a:t>Преимущества </a:t>
+            </a:r>
+            <a:r>
+              <a:rPr lang="ru-RU" sz="1646" b="1" dirty="0" err="1">
+                <a:solidFill>
+                  <a:srgbClr val="90EE90"/>
+                </a:solidFill>
+                <a:latin typeface="ui-sans-serif" pitchFamily="34" charset="0"/>
+                <a:ea typeface="ui-sans-serif" pitchFamily="34" charset="-122"/>
+                <a:cs typeface="ui-sans-serif" pitchFamily="34" charset="-120"/>
+              </a:rPr>
+              <a:t>микросервисов</a:t>
             </a:r>
             <a:endParaRPr lang="en-US" sz="1646" dirty="0"/>
           </a:p>
@@ -19085,7 +19444,7 @@
         <p:spPr>
           <a:xfrm>
             <a:off x="6629400" y="3581400"/>
-            <a:ext cx="1665104" cy="228600"/>
+            <a:ext cx="1665104" cy="211083"/>
           </a:xfrm>
           <a:prstGeom prst="rect">
             <a:avLst/>
@@ -19106,7 +19465,7 @@
               <a:buNone/>
             </a:pPr>
             <a:r>
-              <a:rPr lang="en-US" sz="1120" dirty="0">
+              <a:rPr lang="ru-RU" sz="1120" dirty="0">
                 <a:solidFill>
                   <a:srgbClr val="D1D5DB"/>
                 </a:solidFill>
@@ -19114,7 +19473,7 @@
                 <a:ea typeface="ui-sans-serif" pitchFamily="34" charset="-122"/>
                 <a:cs typeface="ui-sans-serif" pitchFamily="34" charset="-120"/>
               </a:rPr>
-              <a:t>Meilleure scalabilité</a:t>
+              <a:t>Лучшая масштабируемость</a:t>
             </a:r>
             <a:endParaRPr lang="en-US" sz="1120" dirty="0"/>
           </a:p>
@@ -19129,7 +19488,7 @@
         <p:spPr>
           <a:xfrm>
             <a:off x="6629400" y="3886200"/>
-            <a:ext cx="2032308" cy="228600"/>
+            <a:ext cx="2032308" cy="211083"/>
           </a:xfrm>
           <a:prstGeom prst="rect">
             <a:avLst/>
@@ -19150,7 +19509,7 @@
               <a:buNone/>
             </a:pPr>
             <a:r>
-              <a:rPr lang="en-US" sz="1120" dirty="0">
+              <a:rPr lang="ru-RU" sz="1120" dirty="0">
                 <a:solidFill>
                   <a:srgbClr val="D1D5DB"/>
                 </a:solidFill>
@@ -19158,7 +19517,7 @@
                 <a:ea typeface="ui-sans-serif" pitchFamily="34" charset="-122"/>
                 <a:cs typeface="ui-sans-serif" pitchFamily="34" charset="-120"/>
               </a:rPr>
-              <a:t>Médecine plus résiliente</a:t>
+              <a:t>Более устойчивая медицина</a:t>
             </a:r>
             <a:endParaRPr lang="en-US" sz="1120" dirty="0"/>
           </a:p>
@@ -19173,7 +19532,7 @@
         <p:spPr>
           <a:xfrm>
             <a:off x="6629400" y="4191000"/>
-            <a:ext cx="1422648" cy="228600"/>
+            <a:ext cx="1422648" cy="211083"/>
           </a:xfrm>
           <a:prstGeom prst="rect">
             <a:avLst/>
@@ -19194,7 +19553,7 @@
               <a:buNone/>
             </a:pPr>
             <a:r>
-              <a:rPr lang="en-US" sz="1120" dirty="0">
+              <a:rPr lang="ru-RU" sz="1120" dirty="0">
                 <a:solidFill>
                   <a:srgbClr val="D1D5DB"/>
                 </a:solidFill>
@@ -19202,7 +19561,7 @@
                 <a:ea typeface="ui-sans-serif" pitchFamily="34" charset="-122"/>
                 <a:cs typeface="ui-sans-serif" pitchFamily="34" charset="-120"/>
               </a:rPr>
-              <a:t>Flexibilité accrue</a:t>
+              <a:t>Повышенная гибкость</a:t>
             </a:r>
             <a:endParaRPr lang="en-US" sz="1120" dirty="0"/>
           </a:p>
@@ -19217,7 +19576,7 @@
         <p:spPr>
           <a:xfrm>
             <a:off x="1143000" y="5562600"/>
-            <a:ext cx="4291355" cy="304800"/>
+            <a:ext cx="4291355" cy="286553"/>
           </a:xfrm>
           <a:prstGeom prst="rect">
             <a:avLst/>
@@ -19238,7 +19597,7 @@
               <a:buNone/>
             </a:pPr>
             <a:r>
-              <a:rPr lang="en-US" sz="1646" b="1" dirty="0">
+              <a:rPr lang="ru-RU" sz="1646" b="1" dirty="0">
                 <a:solidFill>
                   <a:srgbClr val="FFFFFF"/>
                 </a:solidFill>
@@ -19246,7 +19605,7 @@
                 <a:ea typeface="ui-sans-serif" pitchFamily="34" charset="-122"/>
                 <a:cs typeface="ui-sans-serif" pitchFamily="34" charset="-120"/>
               </a:rPr>
-              <a:t>Spring Boot comme outil idéal</a:t>
+              <a:t>Spring Boot как идеальный инструмент</a:t>
             </a:r>
             <a:endParaRPr lang="en-US" sz="1646" dirty="0"/>
           </a:p>
@@ -19261,7 +19620,7 @@
         <p:spPr>
           <a:xfrm>
             <a:off x="1028700" y="5981700"/>
-            <a:ext cx="1925568" cy="228600"/>
+            <a:ext cx="1925568" cy="211083"/>
           </a:xfrm>
           <a:prstGeom prst="rect">
             <a:avLst/>
@@ -19282,7 +19641,7 @@
               <a:buNone/>
             </a:pPr>
             <a:r>
-              <a:rPr lang="en-US" sz="1120" dirty="0">
+              <a:rPr lang="ru-RU" sz="1120" dirty="0">
                 <a:solidFill>
                   <a:srgbClr val="D1D5DB"/>
                 </a:solidFill>
@@ -19290,7 +19649,7 @@
                 <a:ea typeface="ui-sans-serif" pitchFamily="34" charset="-122"/>
                 <a:cs typeface="ui-sans-serif" pitchFamily="34" charset="-120"/>
               </a:rPr>
-              <a:t>Développement rapide</a:t>
+              <a:t>Быстрое развитие</a:t>
             </a:r>
             <a:endParaRPr lang="en-US" sz="1120" dirty="0"/>
           </a:p>
@@ -19305,7 +19664,7 @@
         <p:spPr>
           <a:xfrm>
             <a:off x="4610100" y="5981700"/>
-            <a:ext cx="1480438" cy="228600"/>
+            <a:ext cx="1480438" cy="441916"/>
           </a:xfrm>
           <a:prstGeom prst="rect">
             <a:avLst/>
@@ -19326,7 +19685,7 @@
               <a:buNone/>
             </a:pPr>
             <a:r>
-              <a:rPr lang="en-US" sz="1120" dirty="0">
+              <a:rPr lang="ru-RU" sz="1120" dirty="0">
                 <a:solidFill>
                   <a:srgbClr val="D1D5DB"/>
                 </a:solidFill>
@@ -19334,7 +19693,7 @@
                 <a:ea typeface="ui-sans-serif" pitchFamily="34" charset="-122"/>
                 <a:cs typeface="ui-sans-serif" pitchFamily="34" charset="-120"/>
               </a:rPr>
-              <a:t>Serveurs intégrés</a:t>
+              <a:t>Интегрированные серверы</a:t>
             </a:r>
             <a:endParaRPr lang="en-US" sz="1120" dirty="0"/>
           </a:p>
@@ -19349,7 +19708,7 @@
         <p:spPr>
           <a:xfrm>
             <a:off x="8191500" y="5981700"/>
-            <a:ext cx="3196620" cy="228600"/>
+            <a:ext cx="3196620" cy="211083"/>
           </a:xfrm>
           <a:prstGeom prst="rect">
             <a:avLst/>
@@ -19370,7 +19729,7 @@
               <a:buNone/>
             </a:pPr>
             <a:r>
-              <a:rPr lang="en-US" sz="1120" dirty="0">
+              <a:rPr lang="ru-RU" sz="1120" dirty="0">
                 <a:solidFill>
                   <a:srgbClr val="D1D5DB"/>
                 </a:solidFill>
@@ -19378,7 +19737,7 @@
                 <a:ea typeface="ui-sans-serif" pitchFamily="34" charset="-122"/>
                 <a:cs typeface="ui-sans-serif" pitchFamily="34" charset="-120"/>
               </a:rPr>
-              <a:t>Simplifie la création et le déploiement</a:t>
+              <a:t>Упрощает создание и развертывание</a:t>
             </a:r>
             <a:endParaRPr lang="en-US" sz="1120" dirty="0"/>
           </a:p>
@@ -20079,30 +20438,161 @@
               <a:buNone/>
             </a:pPr>
             <a:r>
+              <a:rPr lang="ru-RU" sz="1120" dirty="0">
+                <a:solidFill>
+                  <a:srgbClr val="D1D5DB"/>
+                </a:solidFill>
+                <a:latin typeface="ui-sans-serif" pitchFamily="34" charset="0"/>
+                <a:ea typeface="ui-sans-serif" pitchFamily="34" charset="-122"/>
+                <a:cs typeface="ui-sans-serif" pitchFamily="34" charset="-120"/>
+              </a:rPr>
+              <a:t>Коллекция инструментов, обеспечивающих общие закономерности в распределенных системах.</a:t>
+            </a:r>
+            <a:endParaRPr lang="en-US" sz="1120" dirty="0"/>
+          </a:p>
+        </p:txBody>
+      </p:sp>
+      <p:sp>
+        <p:nvSpPr>
+          <p:cNvPr id="28" name="Text 3"/>
+          <p:cNvSpPr/>
+          <p:nvPr/>
+        </p:nvSpPr>
+        <p:spPr>
+          <a:xfrm>
+            <a:off x="1028700" y="2438400"/>
+            <a:ext cx="2244313" cy="211083"/>
+          </a:xfrm>
+          <a:prstGeom prst="rect">
+            <a:avLst/>
+          </a:prstGeom>
+          <a:noFill/>
+          <a:ln/>
+        </p:spPr>
+        <p:txBody>
+          <a:bodyPr wrap="square" lIns="0" tIns="0" rIns="0" bIns="0" rtlCol="0" anchor="t">
+            <a:spAutoFit/>
+          </a:bodyPr>
+          <a:lstStyle/>
+          <a:p>
+            <a:pPr marL="0" indent="0" algn="l">
+              <a:lnSpc>
+                <a:spcPts val="1800"/>
+              </a:lnSpc>
+              <a:buNone/>
+            </a:pPr>
+            <a:r>
+              <a:rPr lang="ru-RU" sz="1120" dirty="0">
+                <a:solidFill>
+                  <a:srgbClr val="E5E7EB"/>
+                </a:solidFill>
+                <a:latin typeface="ui-sans-serif" pitchFamily="34" charset="0"/>
+                <a:ea typeface="ui-sans-serif" pitchFamily="34" charset="-122"/>
+                <a:cs typeface="ui-sans-serif" pitchFamily="34" charset="-120"/>
+              </a:rPr>
+              <a:t>Управление конфигурацией</a:t>
+            </a:r>
+            <a:endParaRPr lang="en-US" sz="1120" dirty="0"/>
+          </a:p>
+        </p:txBody>
+      </p:sp>
+      <p:sp>
+        <p:nvSpPr>
+          <p:cNvPr id="29" name="Text 4"/>
+          <p:cNvSpPr/>
+          <p:nvPr/>
+        </p:nvSpPr>
+        <p:spPr>
+          <a:xfrm>
+            <a:off x="1028700" y="2743200"/>
+            <a:ext cx="1977301" cy="211083"/>
+          </a:xfrm>
+          <a:prstGeom prst="rect">
+            <a:avLst/>
+          </a:prstGeom>
+          <a:noFill/>
+          <a:ln/>
+        </p:spPr>
+        <p:txBody>
+          <a:bodyPr wrap="square" lIns="0" tIns="0" rIns="0" bIns="0" rtlCol="0" anchor="t">
+            <a:spAutoFit/>
+          </a:bodyPr>
+          <a:lstStyle/>
+          <a:p>
+            <a:pPr marL="0" indent="0" algn="l">
+              <a:lnSpc>
+                <a:spcPts val="1800"/>
+              </a:lnSpc>
+              <a:buNone/>
+            </a:pPr>
+            <a:r>
+              <a:rPr lang="ru-RU" sz="1120" dirty="0">
+                <a:solidFill>
+                  <a:srgbClr val="E5E7EB"/>
+                </a:solidFill>
+                <a:latin typeface="ui-sans-serif" pitchFamily="34" charset="0"/>
+                <a:ea typeface="ui-sans-serif" pitchFamily="34" charset="-122"/>
+                <a:cs typeface="ui-sans-serif" pitchFamily="34" charset="-120"/>
+              </a:rPr>
+              <a:t>Обнаружение сервисов</a:t>
+            </a:r>
+            <a:endParaRPr lang="en-US" sz="1120" dirty="0"/>
+          </a:p>
+        </p:txBody>
+      </p:sp>
+      <p:sp>
+        <p:nvSpPr>
+          <p:cNvPr id="30" name="Text 5"/>
+          <p:cNvSpPr/>
+          <p:nvPr/>
+        </p:nvSpPr>
+        <p:spPr>
+          <a:xfrm>
+            <a:off x="1028700" y="3048000"/>
+            <a:ext cx="1320984" cy="211083"/>
+          </a:xfrm>
+          <a:prstGeom prst="rect">
+            <a:avLst/>
+          </a:prstGeom>
+          <a:noFill/>
+          <a:ln/>
+        </p:spPr>
+        <p:txBody>
+          <a:bodyPr wrap="square" lIns="0" tIns="0" rIns="0" bIns="0" rtlCol="0" anchor="t">
+            <a:spAutoFit/>
+          </a:bodyPr>
+          <a:lstStyle/>
+          <a:p>
+            <a:pPr marL="0" indent="0" algn="l">
+              <a:lnSpc>
+                <a:spcPts val="1800"/>
+              </a:lnSpc>
+              <a:buNone/>
+            </a:pPr>
+            <a:r>
               <a:rPr lang="en-US" sz="1120" dirty="0">
                 <a:solidFill>
-                  <a:srgbClr val="D1D5DB"/>
-                </a:solidFill>
-                <a:latin typeface="ui-sans-serif" pitchFamily="34" charset="0"/>
-                <a:ea typeface="ui-sans-serif" pitchFamily="34" charset="-122"/>
-                <a:cs typeface="ui-sans-serif" pitchFamily="34" charset="-120"/>
-              </a:rPr>
-              <a:t>Collection d'outils fournissant des modèles communs dans les systèmes distribués.</a:t>
-            </a:r>
-            <a:endParaRPr lang="en-US" sz="1120" dirty="0"/>
-          </a:p>
-        </p:txBody>
-      </p:sp>
-      <p:sp>
-        <p:nvSpPr>
-          <p:cNvPr id="28" name="Text 3"/>
-          <p:cNvSpPr/>
-          <p:nvPr/>
-        </p:nvSpPr>
-        <p:spPr>
-          <a:xfrm>
-            <a:off x="1028700" y="2438400"/>
-            <a:ext cx="2244313" cy="228600"/>
+                  <a:srgbClr val="E5E7EB"/>
+                </a:solidFill>
+                <a:latin typeface="ui-sans-serif" pitchFamily="34" charset="0"/>
+                <a:ea typeface="ui-sans-serif" pitchFamily="34" charset="-122"/>
+                <a:cs typeface="ui-sans-serif" pitchFamily="34" charset="-120"/>
+              </a:rPr>
+              <a:t>Circuit breakers</a:t>
+            </a:r>
+          </a:p>
+        </p:txBody>
+      </p:sp>
+      <p:sp>
+        <p:nvSpPr>
+          <p:cNvPr id="31" name="Text 6"/>
+          <p:cNvSpPr/>
+          <p:nvPr/>
+        </p:nvSpPr>
+        <p:spPr>
+          <a:xfrm>
+            <a:off x="1028699" y="3352800"/>
+            <a:ext cx="2483757" cy="211083"/>
           </a:xfrm>
           <a:prstGeom prst="rect">
             <a:avLst/>
@@ -20123,7 +20613,7 @@
               <a:buNone/>
             </a:pPr>
             <a:r>
-              <a:rPr lang="en-US" sz="1120" dirty="0">
+              <a:rPr lang="ru-RU" sz="1120" dirty="0">
                 <a:solidFill>
                   <a:srgbClr val="E5E7EB"/>
                 </a:solidFill>
@@ -20131,139 +20621,7 @@
                 <a:ea typeface="ui-sans-serif" pitchFamily="34" charset="-122"/>
                 <a:cs typeface="ui-sans-serif" pitchFamily="34" charset="-120"/>
               </a:rPr>
-              <a:t>Gestion des configurations</a:t>
-            </a:r>
-            <a:endParaRPr lang="en-US" sz="1120" dirty="0"/>
-          </a:p>
-        </p:txBody>
-      </p:sp>
-      <p:sp>
-        <p:nvSpPr>
-          <p:cNvPr id="29" name="Text 4"/>
-          <p:cNvSpPr/>
-          <p:nvPr/>
-        </p:nvSpPr>
-        <p:spPr>
-          <a:xfrm>
-            <a:off x="1028700" y="2743200"/>
-            <a:ext cx="1977301" cy="228600"/>
-          </a:xfrm>
-          <a:prstGeom prst="rect">
-            <a:avLst/>
-          </a:prstGeom>
-          <a:noFill/>
-          <a:ln/>
-        </p:spPr>
-        <p:txBody>
-          <a:bodyPr wrap="square" lIns="0" tIns="0" rIns="0" bIns="0" rtlCol="0" anchor="t">
-            <a:spAutoFit/>
-          </a:bodyPr>
-          <a:lstStyle/>
-          <a:p>
-            <a:pPr marL="0" indent="0" algn="l">
-              <a:lnSpc>
-                <a:spcPts val="1800"/>
-              </a:lnSpc>
-              <a:buNone/>
-            </a:pPr>
-            <a:r>
-              <a:rPr lang="en-US" sz="1120" dirty="0">
-                <a:solidFill>
-                  <a:srgbClr val="E5E7EB"/>
-                </a:solidFill>
-                <a:latin typeface="ui-sans-serif" pitchFamily="34" charset="0"/>
-                <a:ea typeface="ui-sans-serif" pitchFamily="34" charset="-122"/>
-                <a:cs typeface="ui-sans-serif" pitchFamily="34" charset="-120"/>
-              </a:rPr>
-              <a:t>Découverte de services</a:t>
-            </a:r>
-            <a:endParaRPr lang="en-US" sz="1120" dirty="0"/>
-          </a:p>
-        </p:txBody>
-      </p:sp>
-      <p:sp>
-        <p:nvSpPr>
-          <p:cNvPr id="30" name="Text 5"/>
-          <p:cNvSpPr/>
-          <p:nvPr/>
-        </p:nvSpPr>
-        <p:spPr>
-          <a:xfrm>
-            <a:off x="1028700" y="3048000"/>
-            <a:ext cx="1320984" cy="228600"/>
-          </a:xfrm>
-          <a:prstGeom prst="rect">
-            <a:avLst/>
-          </a:prstGeom>
-          <a:noFill/>
-          <a:ln/>
-        </p:spPr>
-        <p:txBody>
-          <a:bodyPr wrap="square" lIns="0" tIns="0" rIns="0" bIns="0" rtlCol="0" anchor="t">
-            <a:spAutoFit/>
-          </a:bodyPr>
-          <a:lstStyle/>
-          <a:p>
-            <a:pPr marL="0" indent="0" algn="l">
-              <a:lnSpc>
-                <a:spcPts val="1800"/>
-              </a:lnSpc>
-              <a:buNone/>
-            </a:pPr>
-            <a:r>
-              <a:rPr lang="en-US" sz="1120" dirty="0">
-                <a:solidFill>
-                  <a:srgbClr val="E5E7EB"/>
-                </a:solidFill>
-                <a:latin typeface="ui-sans-serif" pitchFamily="34" charset="0"/>
-                <a:ea typeface="ui-sans-serif" pitchFamily="34" charset="-122"/>
-                <a:cs typeface="ui-sans-serif" pitchFamily="34" charset="-120"/>
-              </a:rPr>
-              <a:t>Circuit breakers</a:t>
-            </a:r>
-            <a:endParaRPr lang="en-US" sz="1120" dirty="0"/>
-          </a:p>
-        </p:txBody>
-      </p:sp>
-      <p:sp>
-        <p:nvSpPr>
-          <p:cNvPr id="31" name="Text 6"/>
-          <p:cNvSpPr/>
-          <p:nvPr/>
-        </p:nvSpPr>
-        <p:spPr>
-          <a:xfrm>
-            <a:off x="1028700" y="3352800"/>
-            <a:ext cx="1539047" cy="228600"/>
-          </a:xfrm>
-          <a:prstGeom prst="rect">
-            <a:avLst/>
-          </a:prstGeom>
-          <a:noFill/>
-          <a:ln/>
-        </p:spPr>
-        <p:txBody>
-          <a:bodyPr wrap="square" lIns="0" tIns="0" rIns="0" bIns="0" rtlCol="0" anchor="t">
-            <a:spAutoFit/>
-          </a:bodyPr>
-          <a:lstStyle/>
-          <a:p>
-            <a:pPr marL="0" indent="0" algn="l">
-              <a:lnSpc>
-                <a:spcPts val="1800"/>
-              </a:lnSpc>
-              <a:buNone/>
-            </a:pPr>
-            <a:r>
-              <a:rPr lang="en-US" sz="1120" dirty="0">
-                <a:solidFill>
-                  <a:srgbClr val="E5E7EB"/>
-                </a:solidFill>
-                <a:latin typeface="ui-sans-serif" pitchFamily="34" charset="0"/>
-                <a:ea typeface="ui-sans-serif" pitchFamily="34" charset="-122"/>
-                <a:cs typeface="ui-sans-serif" pitchFamily="34" charset="-120"/>
-              </a:rPr>
-              <a:t>Routing intelligent</a:t>
+              <a:t>Интеллектуальная маршрутизация</a:t>
             </a:r>
             <a:endParaRPr lang="en-US" sz="1120" dirty="0"/>
           </a:p>
@@ -20343,7 +20701,7 @@
               <a:buNone/>
             </a:pPr>
             <a:r>
-              <a:rPr lang="en-US" sz="1120" dirty="0">
+              <a:rPr lang="ru-RU" sz="1120" dirty="0">
                 <a:solidFill>
                   <a:srgbClr val="E5E7EB"/>
                 </a:solidFill>
@@ -20351,7 +20709,29 @@
                 <a:ea typeface="ui-sans-serif" pitchFamily="34" charset="-122"/>
                 <a:cs typeface="ui-sans-serif" pitchFamily="34" charset="-120"/>
               </a:rPr>
-              <a:t>Serveur de découverte de services permettant aux microservices de s'enregistrer et de découvrir d'autres services.</a:t>
+              <a:t>Сервер обнаружения сервисов, позволяющий </a:t>
+            </a:r>
+            <a:r>
+              <a:rPr lang="ru-RU" sz="1120" dirty="0" err="1">
+                <a:solidFill>
+                  <a:srgbClr val="E5E7EB"/>
+                </a:solidFill>
+                <a:latin typeface="ui-sans-serif" pitchFamily="34" charset="0"/>
+                <a:ea typeface="ui-sans-serif" pitchFamily="34" charset="-122"/>
+                <a:cs typeface="ui-sans-serif" pitchFamily="34" charset="-120"/>
+              </a:rPr>
+              <a:t>микросервисам</a:t>
+            </a:r>
+            <a:r>
+              <a:rPr lang="ru-RU" sz="1120" dirty="0">
+                <a:solidFill>
+                  <a:srgbClr val="E5E7EB"/>
+                </a:solidFill>
+                <a:latin typeface="ui-sans-serif" pitchFamily="34" charset="0"/>
+                <a:ea typeface="ui-sans-serif" pitchFamily="34" charset="-122"/>
+                <a:cs typeface="ui-sans-serif" pitchFamily="34" charset="-120"/>
+              </a:rPr>
+              <a:t> регистрироваться и обнаруживать другие сервисы.</a:t>
             </a:r>
             <a:endParaRPr lang="en-US" sz="1120" dirty="0"/>
           </a:p>
@@ -20366,7 +20746,7 @@
         <p:spPr>
           <a:xfrm>
             <a:off x="5429250" y="2743200"/>
-            <a:ext cx="6600825" cy="266700"/>
+            <a:ext cx="6600825" cy="248658"/>
           </a:xfrm>
           <a:prstGeom prst="rect">
             <a:avLst/>
@@ -20387,7 +20767,7 @@
               <a:buNone/>
             </a:pPr>
             <a:r>
-              <a:rPr lang="en-US" sz="1380" b="1" dirty="0">
+              <a:rPr lang="ru-RU" sz="1380" b="1" dirty="0">
                 <a:solidFill>
                   <a:srgbClr val="FFFFFF"/>
                 </a:solidFill>
@@ -20395,7 +20775,7 @@
                 <a:ea typeface="ui-sans-serif" pitchFamily="34" charset="-122"/>
                 <a:cs typeface="ui-sans-serif" pitchFamily="34" charset="-120"/>
               </a:rPr>
-              <a:t>Processus de Découverte de Services</a:t>
+              <a:t>Процесс обнаружения услуг</a:t>
             </a:r>
             <a:endParaRPr lang="en-US" sz="1380" dirty="0"/>
           </a:p>
@@ -20453,8 +20833,8 @@
         </p:nvSpPr>
         <p:spPr>
           <a:xfrm>
-            <a:off x="6828383" y="4095750"/>
-            <a:ext cx="1131734" cy="190500"/>
+            <a:off x="7011404" y="4095750"/>
+            <a:ext cx="1131734" cy="177421"/>
           </a:xfrm>
           <a:prstGeom prst="rect">
             <a:avLst/>
@@ -20475,7 +20855,7 @@
               <a:buNone/>
             </a:pPr>
             <a:r>
-              <a:rPr lang="en-US" sz="980" dirty="0">
+              <a:rPr lang="ru-RU" sz="980" dirty="0">
                 <a:solidFill>
                   <a:srgbClr val="D1D5DB"/>
                 </a:solidFill>
@@ -20483,7 +20863,7 @@
                 <a:ea typeface="ui-sans-serif" pitchFamily="34" charset="-122"/>
                 <a:cs typeface="ui-sans-serif" pitchFamily="34" charset="-120"/>
               </a:rPr>
-              <a:t>Enregistrement</a:t>
+              <a:t>Регистрация</a:t>
             </a:r>
             <a:endParaRPr lang="en-US" sz="980" dirty="0"/>
           </a:p>
@@ -20541,8 +20921,8 @@
         </p:nvSpPr>
         <p:spPr>
           <a:xfrm>
-            <a:off x="9256365" y="4095750"/>
-            <a:ext cx="851788" cy="190500"/>
+            <a:off x="9359250" y="4108828"/>
+            <a:ext cx="851788" cy="177421"/>
           </a:xfrm>
           <a:prstGeom prst="rect">
             <a:avLst/>
@@ -20563,7 +20943,7 @@
               <a:buNone/>
             </a:pPr>
             <a:r>
-              <a:rPr lang="en-US" sz="980" dirty="0">
+              <a:rPr lang="ru-RU" sz="980" dirty="0">
                 <a:solidFill>
                   <a:srgbClr val="D1D5DB"/>
                 </a:solidFill>
@@ -20571,7 +20951,7 @@
                 <a:ea typeface="ui-sans-serif" pitchFamily="34" charset="-122"/>
                 <a:cs typeface="ui-sans-serif" pitchFamily="34" charset="-120"/>
               </a:rPr>
-              <a:t>Découverte</a:t>
+              <a:t>Открытие</a:t>
             </a:r>
             <a:endParaRPr lang="en-US" sz="980" dirty="0"/>
           </a:p>
@@ -20630,7 +21010,7 @@
         <p:spPr>
           <a:xfrm>
             <a:off x="1162050" y="5410200"/>
-            <a:ext cx="11294745" cy="266700"/>
+            <a:ext cx="11294745" cy="248658"/>
           </a:xfrm>
           <a:prstGeom prst="rect">
             <a:avLst/>
@@ -20651,7 +21031,7 @@
               <a:buNone/>
             </a:pPr>
             <a:r>
-              <a:rPr lang="en-US" sz="1380" b="1" dirty="0">
+              <a:rPr lang="ru-RU" sz="1380" b="1" dirty="0">
                 <a:solidFill>
                   <a:srgbClr val="FFFFFF"/>
                 </a:solidFill>
@@ -20659,7 +21039,7 @@
                 <a:ea typeface="ui-sans-serif" pitchFamily="34" charset="-122"/>
                 <a:cs typeface="ui-sans-serif" pitchFamily="34" charset="-120"/>
               </a:rPr>
-              <a:t>Équilibrage de charge</a:t>
+              <a:t>Балансировка нагрузки</a:t>
             </a:r>
             <a:endParaRPr lang="en-US" sz="1380" dirty="0"/>
           </a:p>
@@ -20695,7 +21075,7 @@
               <a:buNone/>
             </a:pPr>
             <a:r>
-              <a:rPr lang="en-US" sz="1120" dirty="0">
+              <a:rPr lang="ru-RU" sz="1120" dirty="0" err="1">
                 <a:solidFill>
                   <a:srgbClr val="D1D5DB"/>
                 </a:solidFill>
@@ -20703,7 +21083,62 @@
                 <a:ea typeface="ui-sans-serif" pitchFamily="34" charset="-122"/>
                 <a:cs typeface="ui-sans-serif" pitchFamily="34" charset="-120"/>
               </a:rPr>
-              <a:t>Eureka fournit une liste d'instances de service disponibles, permettant aux équilibreurs de charge côté client (comme Spring Cloud Ribbon) de distribuer les requêtes across ces instances, améliorant la tolérance aux pannes et les performances.</a:t>
+              <a:t>Eureka</a:t>
+            </a:r>
+            <a:r>
+              <a:rPr lang="ru-RU" sz="1120" dirty="0">
+                <a:solidFill>
+                  <a:srgbClr val="D1D5DB"/>
+                </a:solidFill>
+                <a:latin typeface="ui-sans-serif" pitchFamily="34" charset="0"/>
+                <a:ea typeface="ui-sans-serif" pitchFamily="34" charset="-122"/>
+                <a:cs typeface="ui-sans-serif" pitchFamily="34" charset="-120"/>
+              </a:rPr>
+              <a:t> предоставляет список доступных экземпляров служб, позволяя клиентским балансировщикам нагрузки (например, Spring </a:t>
+            </a:r>
+            <a:r>
+              <a:rPr lang="ru-RU" sz="1120" dirty="0" err="1">
+                <a:solidFill>
+                  <a:srgbClr val="D1D5DB"/>
+                </a:solidFill>
+                <a:latin typeface="ui-sans-serif" pitchFamily="34" charset="0"/>
+                <a:ea typeface="ui-sans-serif" pitchFamily="34" charset="-122"/>
+                <a:cs typeface="ui-sans-serif" pitchFamily="34" charset="-120"/>
+              </a:rPr>
+              <a:t>Cloud</a:t>
+            </a:r>
+            <a:r>
+              <a:rPr lang="ru-RU" sz="1120" dirty="0">
+                <a:solidFill>
+                  <a:srgbClr val="D1D5DB"/>
+                </a:solidFill>
+                <a:latin typeface="ui-sans-serif" pitchFamily="34" charset="0"/>
+                <a:ea typeface="ui-sans-serif" pitchFamily="34" charset="-122"/>
+                <a:cs typeface="ui-sans-serif" pitchFamily="34" charset="-120"/>
+              </a:rPr>
+              <a:t> </a:t>
+            </a:r>
+            <a:r>
+              <a:rPr lang="ru-RU" sz="1120" dirty="0" err="1">
+                <a:solidFill>
+                  <a:srgbClr val="D1D5DB"/>
+                </a:solidFill>
+                <a:latin typeface="ui-sans-serif" pitchFamily="34" charset="0"/>
+                <a:ea typeface="ui-sans-serif" pitchFamily="34" charset="-122"/>
+                <a:cs typeface="ui-sans-serif" pitchFamily="34" charset="-120"/>
+              </a:rPr>
+              <a:t>Ribbon</a:t>
+            </a:r>
+            <a:r>
+              <a:rPr lang="ru-RU" sz="1120" dirty="0">
+                <a:solidFill>
+                  <a:srgbClr val="D1D5DB"/>
+                </a:solidFill>
+                <a:latin typeface="ui-sans-serif" pitchFamily="34" charset="0"/>
+                <a:ea typeface="ui-sans-serif" pitchFamily="34" charset="-122"/>
+                <a:cs typeface="ui-sans-serif" pitchFamily="34" charset="-120"/>
+              </a:rPr>
+              <a:t>) распределять запросы по этим экземплярам, ​​повышая отказоустойчивость и производительность.</a:t>
             </a:r>
             <a:endParaRPr lang="en-US" sz="1120" dirty="0"/>
           </a:p>

</xml_diff>

<commit_message>
added main structure for the report
</commit_message>
<xml_diff>
--- a/web application/Application Spring Boot.pptx
+++ b/web application/Application Spring Boot.pptx
@@ -2783,8 +2783,8 @@
         </p:blipFill>
         <p:spPr>
           <a:xfrm>
-            <a:off x="838200" y="2095500"/>
-            <a:ext cx="3200400" cy="2438400"/>
+            <a:off x="838200" y="2057139"/>
+            <a:ext cx="3200400" cy="2839604"/>
           </a:xfrm>
           <a:prstGeom prst="rect">
             <a:avLst/>
@@ -2855,8 +2855,8 @@
         </p:blipFill>
         <p:spPr>
           <a:xfrm>
-            <a:off x="4495800" y="2095500"/>
-            <a:ext cx="3200400" cy="2438400"/>
+            <a:off x="4495800" y="2095499"/>
+            <a:ext cx="3200400" cy="2801243"/>
           </a:xfrm>
           <a:prstGeom prst="rect">
             <a:avLst/>
@@ -2880,7 +2880,7 @@
         <p:spPr>
           <a:xfrm>
             <a:off x="8001000" y="1524000"/>
-            <a:ext cx="3505200" cy="3657600"/>
+            <a:ext cx="4025592" cy="3657600"/>
           </a:xfrm>
           <a:prstGeom prst="rect">
             <a:avLst/>
@@ -2927,8 +2927,8 @@
         </p:blipFill>
         <p:spPr>
           <a:xfrm>
-            <a:off x="8153400" y="2095500"/>
-            <a:ext cx="3200400" cy="2438400"/>
+            <a:off x="8153399" y="2095500"/>
+            <a:ext cx="3768077" cy="2438400"/>
           </a:xfrm>
           <a:prstGeom prst="rect">
             <a:avLst/>
@@ -3189,7 +3189,7 @@
                 <a:ea typeface="ui-sans-serif" pitchFamily="34" charset="-122"/>
                 <a:cs typeface="ui-sans-serif" pitchFamily="34" charset="-120"/>
               </a:rPr>
-              <a:t>Exemple d'Application (REST API)</a:t>
+              <a:t>Example  Application (REST API)</a:t>
             </a:r>
             <a:endParaRPr lang="en-US" sz="3158" dirty="0"/>
           </a:p>
@@ -3379,7 +3379,7 @@
         </p:nvSpPr>
         <p:spPr>
           <a:xfrm>
-            <a:off x="2152948" y="2405955"/>
+            <a:off x="1970999" y="2411016"/>
             <a:ext cx="88076" cy="152400"/>
           </a:xfrm>
           <a:prstGeom prst="rect">
@@ -3423,8 +3423,8 @@
         </p:nvSpPr>
         <p:spPr>
           <a:xfrm>
-            <a:off x="2233017" y="2405955"/>
-            <a:ext cx="1056427" cy="152400"/>
+            <a:off x="2029428" y="2412659"/>
+            <a:ext cx="665300" cy="177421"/>
           </a:xfrm>
           <a:prstGeom prst="rect">
             <a:avLst/>
@@ -3467,7 +3467,7 @@
         </p:nvSpPr>
         <p:spPr>
           <a:xfrm>
-            <a:off x="3193405" y="2405955"/>
+            <a:off x="2680207" y="2407003"/>
             <a:ext cx="88076" cy="152400"/>
           </a:xfrm>
           <a:prstGeom prst="rect">
@@ -3555,7 +3555,7 @@
         </p:nvSpPr>
         <p:spPr>
           <a:xfrm>
-            <a:off x="1992957" y="2592586"/>
+            <a:off x="1550016" y="2609130"/>
             <a:ext cx="1232416" cy="152400"/>
           </a:xfrm>
           <a:prstGeom prst="rect">
@@ -3599,8 +3599,8 @@
         </p:nvSpPr>
         <p:spPr>
           <a:xfrm>
-            <a:off x="3113336" y="2592586"/>
-            <a:ext cx="2553072" cy="525661"/>
+            <a:off x="2357108" y="2612106"/>
+            <a:ext cx="136741" cy="180802"/>
           </a:xfrm>
           <a:prstGeom prst="rect">
             <a:avLst/>
@@ -3687,7 +3687,7 @@
         </p:nvSpPr>
         <p:spPr>
           <a:xfrm>
-            <a:off x="2393007" y="2965847"/>
+            <a:off x="1912888" y="2970819"/>
             <a:ext cx="968350" cy="152400"/>
           </a:xfrm>
           <a:prstGeom prst="rect">
@@ -3731,8 +3731,8 @@
         </p:nvSpPr>
         <p:spPr>
           <a:xfrm>
-            <a:off x="3273326" y="2965847"/>
-            <a:ext cx="3697248" cy="525661"/>
+            <a:off x="2557306" y="2980731"/>
+            <a:ext cx="669669" cy="177421"/>
           </a:xfrm>
           <a:prstGeom prst="rect">
             <a:avLst/>
@@ -3819,8 +3819,8 @@
         </p:nvSpPr>
         <p:spPr>
           <a:xfrm>
-            <a:off x="1752898" y="3339108"/>
-            <a:ext cx="4577522" cy="339030"/>
+            <a:off x="1602308" y="3343981"/>
+            <a:ext cx="2232741" cy="177421"/>
           </a:xfrm>
           <a:prstGeom prst="rect">
             <a:avLst/>
@@ -3907,8 +3907,8 @@
         </p:nvSpPr>
         <p:spPr>
           <a:xfrm>
-            <a:off x="1912888" y="3525738"/>
-            <a:ext cx="3121075" cy="712291"/>
+            <a:off x="1779687" y="3531558"/>
+            <a:ext cx="1473072" cy="369781"/>
           </a:xfrm>
           <a:prstGeom prst="rect">
             <a:avLst/>
@@ -3971,7 +3971,7 @@
         </p:nvSpPr>
         <p:spPr>
           <a:xfrm>
-            <a:off x="1272629" y="4085630"/>
+            <a:off x="1272629" y="3951894"/>
             <a:ext cx="968350" cy="152400"/>
           </a:xfrm>
           <a:prstGeom prst="rect">
@@ -4015,7 +4015,7 @@
         </p:nvSpPr>
         <p:spPr>
           <a:xfrm>
-            <a:off x="1272629" y="4272260"/>
+            <a:off x="1272629" y="4214461"/>
             <a:ext cx="528295" cy="152400"/>
           </a:xfrm>
           <a:prstGeom prst="rect">
@@ -4059,8 +4059,8 @@
         </p:nvSpPr>
         <p:spPr>
           <a:xfrm>
-            <a:off x="1752898" y="4272260"/>
-            <a:ext cx="3257193" cy="339030"/>
+            <a:off x="1624162" y="4224712"/>
+            <a:ext cx="1371451" cy="177421"/>
           </a:xfrm>
           <a:prstGeom prst="rect">
             <a:avLst/>
@@ -4103,7 +4103,7 @@
         </p:nvSpPr>
         <p:spPr>
           <a:xfrm>
-            <a:off x="1592759" y="4458891"/>
+            <a:off x="1596821" y="4391566"/>
             <a:ext cx="2464832" cy="152400"/>
           </a:xfrm>
           <a:prstGeom prst="rect">
@@ -4147,7 +4147,7 @@
         </p:nvSpPr>
         <p:spPr>
           <a:xfrm>
-            <a:off x="1592759" y="4645521"/>
+            <a:off x="1579416" y="4553752"/>
             <a:ext cx="528295" cy="152400"/>
           </a:xfrm>
           <a:prstGeom prst="rect">
@@ -4191,8 +4191,8 @@
         </p:nvSpPr>
         <p:spPr>
           <a:xfrm>
-            <a:off x="2073027" y="4645521"/>
-            <a:ext cx="2112690" cy="152400"/>
+            <a:off x="1933358" y="4574851"/>
+            <a:ext cx="1107826" cy="182165"/>
           </a:xfrm>
           <a:prstGeom prst="rect">
             <a:avLst/>
@@ -4235,8 +4235,8 @@
         </p:nvSpPr>
         <p:spPr>
           <a:xfrm>
-            <a:off x="3993654" y="4645521"/>
-            <a:ext cx="1144339" cy="152400"/>
+            <a:off x="3034345" y="4579596"/>
+            <a:ext cx="667904" cy="177421"/>
           </a:xfrm>
           <a:prstGeom prst="rect">
             <a:avLst/>
@@ -4279,8 +4279,8 @@
         </p:nvSpPr>
         <p:spPr>
           <a:xfrm>
-            <a:off x="5033963" y="4832152"/>
-            <a:ext cx="440219" cy="525661"/>
+            <a:off x="2917820" y="4732056"/>
+            <a:ext cx="217095" cy="177421"/>
           </a:xfrm>
           <a:prstGeom prst="rect">
             <a:avLst/>
@@ -4323,7 +4323,7 @@
         </p:nvSpPr>
         <p:spPr>
           <a:xfrm>
-            <a:off x="1272629" y="5205413"/>
+            <a:off x="1318222" y="4725907"/>
             <a:ext cx="2552745" cy="177421"/>
           </a:xfrm>
           <a:prstGeom prst="rect">
@@ -4389,7 +4389,7 @@
         </p:nvSpPr>
         <p:spPr>
           <a:xfrm>
-            <a:off x="3593306" y="5392043"/>
+            <a:off x="2848102" y="4732044"/>
             <a:ext cx="88076" cy="152400"/>
           </a:xfrm>
           <a:prstGeom prst="rect">
@@ -4521,8 +4521,8 @@
         </p:nvSpPr>
         <p:spPr>
           <a:xfrm>
-            <a:off x="4610100" y="2405955"/>
-            <a:ext cx="1056427" cy="152400"/>
+            <a:off x="4610101" y="2405955"/>
+            <a:ext cx="704284" cy="177421"/>
           </a:xfrm>
           <a:prstGeom prst="rect">
             <a:avLst/>
@@ -4565,7 +4565,7 @@
         </p:nvSpPr>
         <p:spPr>
           <a:xfrm>
-            <a:off x="5650557" y="2405955"/>
+            <a:off x="5219974" y="2420667"/>
             <a:ext cx="968350" cy="152400"/>
           </a:xfrm>
           <a:prstGeom prst="rect">
@@ -4609,8 +4609,8 @@
         </p:nvSpPr>
         <p:spPr>
           <a:xfrm>
-            <a:off x="6530876" y="2405955"/>
-            <a:ext cx="2289006" cy="525661"/>
+            <a:off x="5905258" y="2426503"/>
+            <a:ext cx="85967" cy="177421"/>
           </a:xfrm>
           <a:prstGeom prst="rect">
             <a:avLst/>
@@ -4697,7 +4697,7 @@
         </p:nvSpPr>
         <p:spPr>
           <a:xfrm>
-            <a:off x="6050607" y="2779216"/>
+            <a:off x="5609868" y="2783514"/>
             <a:ext cx="1232416" cy="152400"/>
           </a:xfrm>
           <a:prstGeom prst="rect">
@@ -4741,8 +4741,8 @@
         </p:nvSpPr>
         <p:spPr>
           <a:xfrm>
-            <a:off x="7170986" y="2779216"/>
-            <a:ext cx="4225379" cy="525661"/>
+            <a:off x="6445306" y="2783865"/>
+            <a:ext cx="917519" cy="177421"/>
           </a:xfrm>
           <a:prstGeom prst="rect">
             <a:avLst/>
@@ -4763,7 +4763,7 @@
               <a:buNone/>
             </a:pPr>
             <a:r>
-              <a:rPr lang="en-US" sz="980" dirty="0">
+              <a:rPr lang="en-US" sz="980" dirty="0" err="1">
                 <a:solidFill>
                   <a:srgbClr val="E2E8F0"/>
                 </a:solidFill>
@@ -4771,51 +4771,18 @@
                 <a:ea typeface="ui-monospace" pitchFamily="34" charset="-122"/>
                 <a:cs typeface="ui-monospace" pitchFamily="34" charset="-120"/>
               </a:rPr>
-              <a:t>todoRepository;</a:t>
-            </a:r>
-            <a:endParaRPr lang="en-US" sz="980" dirty="0"/>
-          </a:p>
-        </p:txBody>
-      </p:sp>
-      <p:sp>
-        <p:nvSpPr>
-          <p:cNvPr id="60" name="Text 36"/>
-          <p:cNvSpPr/>
-          <p:nvPr/>
-        </p:nvSpPr>
-        <p:spPr>
-          <a:xfrm>
-            <a:off x="4930229" y="3152477"/>
-            <a:ext cx="528295" cy="152400"/>
-          </a:xfrm>
-          <a:prstGeom prst="rect">
-            <a:avLst/>
-          </a:prstGeom>
-          <a:noFill/>
-          <a:ln/>
-        </p:spPr>
-        <p:txBody>
-          <a:bodyPr wrap="square" lIns="0" tIns="0" rIns="0" bIns="0" rtlCol="0" anchor="t">
-            <a:spAutoFit/>
-          </a:bodyPr>
-          <a:lstStyle/>
-          <a:p>
-            <a:pPr marL="0" indent="0">
-              <a:lnSpc>
-                <a:spcPts val="1470"/>
-              </a:lnSpc>
-              <a:buNone/>
-            </a:pPr>
+              <a:t>todoRepository</a:t>
+            </a:r>
             <a:r>
               <a:rPr lang="en-US" sz="980" dirty="0">
                 <a:solidFill>
-                  <a:srgbClr val="90EE90"/>
+                  <a:srgbClr val="E2E8F0"/>
                 </a:solidFill>
                 <a:latin typeface="ui-monospace" pitchFamily="34" charset="0"/>
                 <a:ea typeface="ui-monospace" pitchFamily="34" charset="-122"/>
                 <a:cs typeface="ui-monospace" pitchFamily="34" charset="-120"/>
               </a:rPr>
-              <a:t>public</a:t>
+              <a:t>;</a:t>
             </a:r>
             <a:endParaRPr lang="en-US" sz="980" dirty="0"/>
           </a:p>
@@ -4823,14 +4790,14 @@
       </p:sp>
       <p:sp>
         <p:nvSpPr>
-          <p:cNvPr id="61" name="Text 37"/>
-          <p:cNvSpPr/>
-          <p:nvPr/>
-        </p:nvSpPr>
-        <p:spPr>
-          <a:xfrm>
-            <a:off x="5410498" y="3152477"/>
-            <a:ext cx="4841587" cy="339030"/>
+          <p:cNvPr id="60" name="Text 36"/>
+          <p:cNvSpPr/>
+          <p:nvPr/>
+        </p:nvSpPr>
+        <p:spPr>
+          <a:xfrm>
+            <a:off x="4930229" y="3152477"/>
+            <a:ext cx="528295" cy="152400"/>
           </a:xfrm>
           <a:prstGeom prst="rect">
             <a:avLst/>
@@ -4853,13 +4820,13 @@
             <a:r>
               <a:rPr lang="en-US" sz="980" dirty="0">
                 <a:solidFill>
-                  <a:srgbClr val="E2E8F0"/>
+                  <a:srgbClr val="90EE90"/>
                 </a:solidFill>
                 <a:latin typeface="ui-monospace" pitchFamily="34" charset="0"/>
                 <a:ea typeface="ui-monospace" pitchFamily="34" charset="-122"/>
                 <a:cs typeface="ui-monospace" pitchFamily="34" charset="-120"/>
               </a:rPr>
-              <a:t>TodoService(TodoRepository todoRepository) {</a:t>
+              <a:t>public</a:t>
             </a:r>
             <a:endParaRPr lang="en-US" sz="980" dirty="0"/>
           </a:p>
@@ -4867,14 +4834,14 @@
       </p:sp>
       <p:sp>
         <p:nvSpPr>
-          <p:cNvPr id="62" name="Text 38"/>
-          <p:cNvSpPr/>
-          <p:nvPr/>
-        </p:nvSpPr>
-        <p:spPr>
-          <a:xfrm>
-            <a:off x="5250359" y="3339108"/>
-            <a:ext cx="352142" cy="152400"/>
+          <p:cNvPr id="61" name="Text 37"/>
+          <p:cNvSpPr/>
+          <p:nvPr/>
+        </p:nvSpPr>
+        <p:spPr>
+          <a:xfrm>
+            <a:off x="5305807" y="3161687"/>
+            <a:ext cx="2372504" cy="177421"/>
           </a:xfrm>
           <a:prstGeom prst="rect">
             <a:avLst/>
@@ -4897,13 +4864,13 @@
             <a:r>
               <a:rPr lang="en-US" sz="980" dirty="0">
                 <a:solidFill>
-                  <a:srgbClr val="90EE90"/>
+                  <a:srgbClr val="E2E8F0"/>
                 </a:solidFill>
                 <a:latin typeface="ui-monospace" pitchFamily="34" charset="0"/>
                 <a:ea typeface="ui-monospace" pitchFamily="34" charset="-122"/>
                 <a:cs typeface="ui-monospace" pitchFamily="34" charset="-120"/>
               </a:rPr>
-              <a:t>this</a:t>
+              <a:t>TodoService(TodoRepository todoRepository) {</a:t>
             </a:r>
             <a:endParaRPr lang="en-US" sz="980" dirty="0"/>
           </a:p>
@@ -4911,14 +4878,14 @@
       </p:sp>
       <p:sp>
         <p:nvSpPr>
-          <p:cNvPr id="63" name="Text 39"/>
-          <p:cNvSpPr/>
-          <p:nvPr/>
-        </p:nvSpPr>
-        <p:spPr>
-          <a:xfrm>
-            <a:off x="5570488" y="3339108"/>
-            <a:ext cx="3601194" cy="712291"/>
+          <p:cNvPr id="62" name="Text 38"/>
+          <p:cNvSpPr/>
+          <p:nvPr/>
+        </p:nvSpPr>
+        <p:spPr>
+          <a:xfrm>
+            <a:off x="5250359" y="3339108"/>
+            <a:ext cx="352142" cy="152400"/>
           </a:xfrm>
           <a:prstGeom prst="rect">
             <a:avLst/>
@@ -4941,16 +4908,40 @@
             <a:r>
               <a:rPr lang="en-US" sz="980" dirty="0">
                 <a:solidFill>
-                  <a:srgbClr val="E2E8F0"/>
+                  <a:srgbClr val="90EE90"/>
                 </a:solidFill>
                 <a:latin typeface="ui-monospace" pitchFamily="34" charset="0"/>
                 <a:ea typeface="ui-monospace" pitchFamily="34" charset="-122"/>
                 <a:cs typeface="ui-monospace" pitchFamily="34" charset="-120"/>
               </a:rPr>
-              <a:t>.todoRepository = todoRepository;</a:t>
+              <a:t>this</a:t>
             </a:r>
             <a:endParaRPr lang="en-US" sz="980" dirty="0"/>
           </a:p>
+        </p:txBody>
+      </p:sp>
+      <p:sp>
+        <p:nvSpPr>
+          <p:cNvPr id="63" name="Text 39"/>
+          <p:cNvSpPr/>
+          <p:nvPr/>
+        </p:nvSpPr>
+        <p:spPr>
+          <a:xfrm>
+            <a:off x="5436721" y="3347702"/>
+            <a:ext cx="3601194" cy="712291"/>
+          </a:xfrm>
+          <a:prstGeom prst="rect">
+            <a:avLst/>
+          </a:prstGeom>
+          <a:noFill/>
+          <a:ln/>
+        </p:spPr>
+        <p:txBody>
+          <a:bodyPr wrap="square" lIns="0" tIns="0" rIns="0" bIns="0" rtlCol="0" anchor="t">
+            <a:spAutoFit/>
+          </a:bodyPr>
+          <a:lstStyle/>
           <a:p>
             <a:pPr marL="0" indent="0">
               <a:lnSpc>
@@ -4967,34 +4958,10 @@
                 <a:ea typeface="ui-monospace" pitchFamily="34" charset="-122"/>
                 <a:cs typeface="ui-monospace" pitchFamily="34" charset="-120"/>
               </a:rPr>
-              <a:t>    }</a:t>
+              <a:t>.todoRepository = todoRepository;</a:t>
             </a:r>
             <a:endParaRPr lang="en-US" sz="980" dirty="0"/>
           </a:p>
-        </p:txBody>
-      </p:sp>
-      <p:sp>
-        <p:nvSpPr>
-          <p:cNvPr id="64" name="Text 40"/>
-          <p:cNvSpPr/>
-          <p:nvPr/>
-        </p:nvSpPr>
-        <p:spPr>
-          <a:xfrm>
-            <a:off x="4930229" y="3898999"/>
-            <a:ext cx="528295" cy="152400"/>
-          </a:xfrm>
-          <a:prstGeom prst="rect">
-            <a:avLst/>
-          </a:prstGeom>
-          <a:noFill/>
-          <a:ln/>
-        </p:spPr>
-        <p:txBody>
-          <a:bodyPr wrap="square" lIns="0" tIns="0" rIns="0" bIns="0" rtlCol="0" anchor="t">
-            <a:spAutoFit/>
-          </a:bodyPr>
-          <a:lstStyle/>
           <a:p>
             <a:pPr marL="0" indent="0">
               <a:lnSpc>
@@ -5005,13 +4972,13 @@
             <a:r>
               <a:rPr lang="en-US" sz="980" dirty="0">
                 <a:solidFill>
-                  <a:srgbClr val="90EE90"/>
+                  <a:srgbClr val="E2E8F0"/>
                 </a:solidFill>
                 <a:latin typeface="ui-monospace" pitchFamily="34" charset="0"/>
                 <a:ea typeface="ui-monospace" pitchFamily="34" charset="-122"/>
                 <a:cs typeface="ui-monospace" pitchFamily="34" charset="-120"/>
               </a:rPr>
-              <a:t>public</a:t>
+              <a:t>    }</a:t>
             </a:r>
             <a:endParaRPr lang="en-US" sz="980" dirty="0"/>
           </a:p>
@@ -5019,14 +4986,14 @@
       </p:sp>
       <p:sp>
         <p:nvSpPr>
-          <p:cNvPr id="65" name="Text 41"/>
-          <p:cNvSpPr/>
-          <p:nvPr/>
-        </p:nvSpPr>
-        <p:spPr>
-          <a:xfrm>
-            <a:off x="5410498" y="3898999"/>
-            <a:ext cx="2905051" cy="339030"/>
+          <p:cNvPr id="64" name="Text 40"/>
+          <p:cNvSpPr/>
+          <p:nvPr/>
+        </p:nvSpPr>
+        <p:spPr>
+          <a:xfrm>
+            <a:off x="4911119" y="3743297"/>
+            <a:ext cx="528295" cy="152400"/>
           </a:xfrm>
           <a:prstGeom prst="rect">
             <a:avLst/>
@@ -5049,13 +5016,13 @@
             <a:r>
               <a:rPr lang="en-US" sz="980" dirty="0">
                 <a:solidFill>
-                  <a:srgbClr val="E2E8F0"/>
+                  <a:srgbClr val="90EE90"/>
                 </a:solidFill>
                 <a:latin typeface="ui-monospace" pitchFamily="34" charset="0"/>
                 <a:ea typeface="ui-monospace" pitchFamily="34" charset="-122"/>
                 <a:cs typeface="ui-monospace" pitchFamily="34" charset="-120"/>
               </a:rPr>
-              <a:t>List&lt;Todo&gt; findAll() {</a:t>
+              <a:t>public</a:t>
             </a:r>
             <a:endParaRPr lang="en-US" sz="980" dirty="0"/>
           </a:p>
@@ -5063,14 +5030,14 @@
       </p:sp>
       <p:sp>
         <p:nvSpPr>
-          <p:cNvPr id="66" name="Text 42"/>
-          <p:cNvSpPr/>
-          <p:nvPr/>
-        </p:nvSpPr>
-        <p:spPr>
-          <a:xfrm>
-            <a:off x="5250359" y="4085630"/>
-            <a:ext cx="2112690" cy="152400"/>
+          <p:cNvPr id="65" name="Text 41"/>
+          <p:cNvSpPr/>
+          <p:nvPr/>
+        </p:nvSpPr>
+        <p:spPr>
+          <a:xfrm>
+            <a:off x="5243350" y="3755194"/>
+            <a:ext cx="1115526" cy="177421"/>
           </a:xfrm>
           <a:prstGeom prst="rect">
             <a:avLst/>
@@ -5093,13 +5060,13 @@
             <a:r>
               <a:rPr lang="en-US" sz="980" dirty="0">
                 <a:solidFill>
-                  <a:srgbClr val="718096"/>
+                  <a:srgbClr val="E2E8F0"/>
                 </a:solidFill>
                 <a:latin typeface="ui-monospace" pitchFamily="34" charset="0"/>
                 <a:ea typeface="ui-monospace" pitchFamily="34" charset="-122"/>
                 <a:cs typeface="ui-monospace" pitchFamily="34" charset="-120"/>
               </a:rPr>
-              <a:t>// Service -&gt; Repository</a:t>
+              <a:t>List&lt;Todo&gt; findAll() {</a:t>
             </a:r>
             <a:endParaRPr lang="en-US" sz="980" dirty="0"/>
           </a:p>
@@ -5107,14 +5074,14 @@
       </p:sp>
       <p:sp>
         <p:nvSpPr>
-          <p:cNvPr id="67" name="Text 43"/>
-          <p:cNvSpPr/>
-          <p:nvPr/>
-        </p:nvSpPr>
-        <p:spPr>
-          <a:xfrm>
-            <a:off x="5250359" y="4272260"/>
-            <a:ext cx="528295" cy="152400"/>
+          <p:cNvPr id="66" name="Text 42"/>
+          <p:cNvSpPr/>
+          <p:nvPr/>
+        </p:nvSpPr>
+        <p:spPr>
+          <a:xfrm>
+            <a:off x="5251058" y="3985838"/>
+            <a:ext cx="1279818" cy="177421"/>
           </a:xfrm>
           <a:prstGeom prst="rect">
             <a:avLst/>
@@ -5137,13 +5104,13 @@
             <a:r>
               <a:rPr lang="en-US" sz="980" dirty="0">
                 <a:solidFill>
-                  <a:srgbClr val="90EE90"/>
+                  <a:srgbClr val="718096"/>
                 </a:solidFill>
                 <a:latin typeface="ui-monospace" pitchFamily="34" charset="0"/>
                 <a:ea typeface="ui-monospace" pitchFamily="34" charset="-122"/>
                 <a:cs typeface="ui-monospace" pitchFamily="34" charset="-120"/>
               </a:rPr>
-              <a:t>return</a:t>
+              <a:t>// Service -&gt; Repository</a:t>
             </a:r>
             <a:endParaRPr lang="en-US" sz="980" dirty="0"/>
           </a:p>
@@ -5151,14 +5118,14 @@
       </p:sp>
       <p:sp>
         <p:nvSpPr>
-          <p:cNvPr id="68" name="Text 44"/>
-          <p:cNvSpPr/>
-          <p:nvPr/>
-        </p:nvSpPr>
-        <p:spPr>
-          <a:xfrm>
-            <a:off x="5730627" y="4272260"/>
-            <a:ext cx="3201144" cy="712291"/>
+          <p:cNvPr id="67" name="Text 43"/>
+          <p:cNvSpPr/>
+          <p:nvPr/>
+        </p:nvSpPr>
+        <p:spPr>
+          <a:xfrm>
+            <a:off x="5238250" y="4200534"/>
+            <a:ext cx="528295" cy="152400"/>
           </a:xfrm>
           <a:prstGeom prst="rect">
             <a:avLst/>
@@ -5181,16 +5148,40 @@
             <a:r>
               <a:rPr lang="en-US" sz="980" dirty="0">
                 <a:solidFill>
-                  <a:srgbClr val="E2E8F0"/>
+                  <a:srgbClr val="90EE90"/>
                 </a:solidFill>
                 <a:latin typeface="ui-monospace" pitchFamily="34" charset="0"/>
                 <a:ea typeface="ui-monospace" pitchFamily="34" charset="-122"/>
                 <a:cs typeface="ui-monospace" pitchFamily="34" charset="-120"/>
               </a:rPr>
-              <a:t>todoRepository.findAll();</a:t>
+              <a:t>return</a:t>
             </a:r>
             <a:endParaRPr lang="en-US" sz="980" dirty="0"/>
           </a:p>
+        </p:txBody>
+      </p:sp>
+      <p:sp>
+        <p:nvSpPr>
+          <p:cNvPr id="68" name="Text 44"/>
+          <p:cNvSpPr/>
+          <p:nvPr/>
+        </p:nvSpPr>
+        <p:spPr>
+          <a:xfrm>
+            <a:off x="5566520" y="4205811"/>
+            <a:ext cx="1324818" cy="373786"/>
+          </a:xfrm>
+          <a:prstGeom prst="rect">
+            <a:avLst/>
+          </a:prstGeom>
+          <a:noFill/>
+          <a:ln/>
+        </p:spPr>
+        <p:txBody>
+          <a:bodyPr wrap="square" lIns="0" tIns="0" rIns="0" bIns="0" rtlCol="0" anchor="t">
+            <a:spAutoFit/>
+          </a:bodyPr>
+          <a:lstStyle/>
           <a:p>
             <a:pPr marL="0" indent="0">
               <a:lnSpc>
@@ -5207,34 +5198,10 @@
                 <a:ea typeface="ui-monospace" pitchFamily="34" charset="-122"/>
                 <a:cs typeface="ui-monospace" pitchFamily="34" charset="-120"/>
               </a:rPr>
-              <a:t>    }</a:t>
+              <a:t>todoRepository.findAll();</a:t>
             </a:r>
             <a:endParaRPr lang="en-US" sz="980" dirty="0"/>
           </a:p>
-        </p:txBody>
-      </p:sp>
-      <p:sp>
-        <p:nvSpPr>
-          <p:cNvPr id="69" name="Text 45"/>
-          <p:cNvSpPr/>
-          <p:nvPr/>
-        </p:nvSpPr>
-        <p:spPr>
-          <a:xfrm>
-            <a:off x="4930229" y="4832152"/>
-            <a:ext cx="1848624" cy="177421"/>
-          </a:xfrm>
-          <a:prstGeom prst="rect">
-            <a:avLst/>
-          </a:prstGeom>
-          <a:noFill/>
-          <a:ln/>
-        </p:spPr>
-        <p:txBody>
-          <a:bodyPr wrap="square" lIns="0" tIns="0" rIns="0" bIns="0" rtlCol="0" anchor="t">
-            <a:spAutoFit/>
-          </a:bodyPr>
-          <a:lstStyle/>
           <a:p>
             <a:pPr marL="0" indent="0">
               <a:lnSpc>
@@ -5243,15 +5210,15 @@
               <a:buNone/>
             </a:pPr>
             <a:r>
-              <a:rPr lang="ru-RU" sz="980" dirty="0">
-                <a:solidFill>
-                  <a:srgbClr val="718096"/>
+              <a:rPr lang="en-US" sz="980" dirty="0">
+                <a:solidFill>
+                  <a:srgbClr val="E2E8F0"/>
                 </a:solidFill>
                 <a:latin typeface="ui-monospace" pitchFamily="34" charset="0"/>
                 <a:ea typeface="ui-monospace" pitchFamily="34" charset="-122"/>
                 <a:cs typeface="ui-monospace" pitchFamily="34" charset="-120"/>
               </a:rPr>
-              <a:t>// ... бизнес-логика</a:t>
+              <a:t>    }</a:t>
             </a:r>
             <a:endParaRPr lang="en-US" sz="980" dirty="0"/>
           </a:p>
@@ -5259,14 +5226,14 @@
       </p:sp>
       <p:sp>
         <p:nvSpPr>
-          <p:cNvPr id="70" name="Text 46"/>
-          <p:cNvSpPr/>
-          <p:nvPr/>
-        </p:nvSpPr>
-        <p:spPr>
-          <a:xfrm>
-            <a:off x="6610796" y="5018782"/>
-            <a:ext cx="88076" cy="152400"/>
+          <p:cNvPr id="69" name="Text 45"/>
+          <p:cNvSpPr/>
+          <p:nvPr/>
+        </p:nvSpPr>
+        <p:spPr>
+          <a:xfrm>
+            <a:off x="5205740" y="4593711"/>
+            <a:ext cx="1848624" cy="177421"/>
           </a:xfrm>
           <a:prstGeom prst="rect">
             <a:avLst/>
@@ -5287,103 +5254,26 @@
               <a:buNone/>
             </a:pPr>
             <a:r>
-              <a:rPr lang="en-US" sz="980" dirty="0">
-                <a:solidFill>
-                  <a:srgbClr val="E2E8F0"/>
+              <a:rPr lang="ru-RU" sz="980" dirty="0">
+                <a:solidFill>
+                  <a:srgbClr val="718096"/>
                 </a:solidFill>
                 <a:latin typeface="ui-monospace" pitchFamily="34" charset="0"/>
                 <a:ea typeface="ui-monospace" pitchFamily="34" charset="-122"/>
                 <a:cs typeface="ui-monospace" pitchFamily="34" charset="-120"/>
               </a:rPr>
-              <a:t>}</a:t>
-            </a:r>
-            <a:endParaRPr lang="en-US" sz="980" dirty="0"/>
-          </a:p>
-        </p:txBody>
-      </p:sp>
-      <p:sp>
-        <p:nvSpPr>
-          <p:cNvPr id="71" name="Text 47"/>
-          <p:cNvSpPr/>
-          <p:nvPr/>
-        </p:nvSpPr>
-        <p:spPr>
-          <a:xfrm>
-            <a:off x="8467725" y="1676400"/>
-            <a:ext cx="1533808" cy="304800"/>
-          </a:xfrm>
-          <a:prstGeom prst="rect">
-            <a:avLst/>
-          </a:prstGeom>
-          <a:noFill/>
-          <a:ln/>
-        </p:spPr>
-        <p:txBody>
-          <a:bodyPr wrap="square" lIns="0" tIns="0" rIns="0" bIns="0" rtlCol="0" anchor="t">
-            <a:spAutoFit/>
-          </a:bodyPr>
-          <a:lstStyle/>
-          <a:p>
-            <a:pPr marL="0" indent="0">
-              <a:lnSpc>
-                <a:spcPts val="2400"/>
-              </a:lnSpc>
-              <a:buNone/>
-            </a:pPr>
-            <a:r>
-              <a:rPr lang="en-US" sz="1646" b="1" dirty="0">
-                <a:solidFill>
-                  <a:srgbClr val="C084FC"/>
-                </a:solidFill>
-                <a:latin typeface="ui-sans-serif" pitchFamily="34" charset="0"/>
-                <a:ea typeface="ui-sans-serif" pitchFamily="34" charset="-122"/>
-                <a:cs typeface="ui-sans-serif" pitchFamily="34" charset="-120"/>
-              </a:rPr>
-              <a:t>Repository</a:t>
-            </a:r>
-            <a:endParaRPr lang="en-US" sz="1646" dirty="0"/>
-          </a:p>
-        </p:txBody>
-      </p:sp>
-      <p:sp>
-        <p:nvSpPr>
-          <p:cNvPr id="72" name="Text 48"/>
-          <p:cNvSpPr/>
-          <p:nvPr/>
-        </p:nvSpPr>
-        <p:spPr>
-          <a:xfrm>
-            <a:off x="8267700" y="2219325"/>
-            <a:ext cx="968350" cy="152400"/>
-          </a:xfrm>
-          <a:prstGeom prst="rect">
-            <a:avLst/>
-          </a:prstGeom>
-          <a:noFill/>
-          <a:ln/>
-        </p:spPr>
-        <p:txBody>
-          <a:bodyPr wrap="square" lIns="0" tIns="0" rIns="0" bIns="0" rtlCol="0" anchor="t">
-            <a:spAutoFit/>
-          </a:bodyPr>
-          <a:lstStyle/>
-          <a:p>
-            <a:pPr marL="0" indent="0">
-              <a:lnSpc>
-                <a:spcPts val="1470"/>
-              </a:lnSpc>
-              <a:buNone/>
-            </a:pPr>
+              <a:t>// ... </a:t>
+            </a:r>
             <a:r>
               <a:rPr lang="en-US" sz="980" dirty="0">
                 <a:solidFill>
-                  <a:srgbClr val="90EE90"/>
+                  <a:srgbClr val="718096"/>
                 </a:solidFill>
                 <a:latin typeface="ui-monospace" pitchFamily="34" charset="0"/>
                 <a:ea typeface="ui-monospace" pitchFamily="34" charset="-122"/>
                 <a:cs typeface="ui-monospace" pitchFamily="34" charset="-120"/>
               </a:rPr>
-              <a:t>@Repository</a:t>
+              <a:t>Business logic</a:t>
             </a:r>
             <a:endParaRPr lang="en-US" sz="980" dirty="0"/>
           </a:p>
@@ -5391,14 +5281,14 @@
       </p:sp>
       <p:sp>
         <p:nvSpPr>
-          <p:cNvPr id="73" name="Text 49"/>
-          <p:cNvSpPr/>
-          <p:nvPr/>
-        </p:nvSpPr>
-        <p:spPr>
-          <a:xfrm>
-            <a:off x="8267700" y="2405955"/>
-            <a:ext cx="1408405" cy="152400"/>
+          <p:cNvPr id="70" name="Text 46"/>
+          <p:cNvSpPr/>
+          <p:nvPr/>
+        </p:nvSpPr>
+        <p:spPr>
+          <a:xfrm>
+            <a:off x="6243160" y="4605186"/>
+            <a:ext cx="88076" cy="177421"/>
           </a:xfrm>
           <a:prstGeom prst="rect">
             <a:avLst/>
@@ -5421,13 +5311,13 @@
             <a:r>
               <a:rPr lang="en-US" sz="980" dirty="0">
                 <a:solidFill>
-                  <a:srgbClr val="90EE90"/>
+                  <a:srgbClr val="E2E8F0"/>
                 </a:solidFill>
                 <a:latin typeface="ui-monospace" pitchFamily="34" charset="0"/>
                 <a:ea typeface="ui-monospace" pitchFamily="34" charset="-122"/>
                 <a:cs typeface="ui-monospace" pitchFamily="34" charset="-120"/>
               </a:rPr>
-              <a:t>public interface</a:t>
+              <a:t>}</a:t>
             </a:r>
             <a:endParaRPr lang="en-US" sz="980" dirty="0"/>
           </a:p>
@@ -5435,14 +5325,14 @@
       </p:sp>
       <p:sp>
         <p:nvSpPr>
-          <p:cNvPr id="74" name="Text 50"/>
-          <p:cNvSpPr/>
-          <p:nvPr/>
-        </p:nvSpPr>
-        <p:spPr>
-          <a:xfrm>
-            <a:off x="9628138" y="2405955"/>
-            <a:ext cx="1232416" cy="152400"/>
+          <p:cNvPr id="71" name="Text 47"/>
+          <p:cNvSpPr/>
+          <p:nvPr/>
+        </p:nvSpPr>
+        <p:spPr>
+          <a:xfrm>
+            <a:off x="8467725" y="1676400"/>
+            <a:ext cx="1533808" cy="304800"/>
           </a:xfrm>
           <a:prstGeom prst="rect">
             <a:avLst/>
@@ -5458,6 +5348,50 @@
           <a:p>
             <a:pPr marL="0" indent="0">
               <a:lnSpc>
+                <a:spcPts val="2400"/>
+              </a:lnSpc>
+              <a:buNone/>
+            </a:pPr>
+            <a:r>
+              <a:rPr lang="en-US" sz="1646" b="1" dirty="0">
+                <a:solidFill>
+                  <a:srgbClr val="C084FC"/>
+                </a:solidFill>
+                <a:latin typeface="ui-sans-serif" pitchFamily="34" charset="0"/>
+                <a:ea typeface="ui-sans-serif" pitchFamily="34" charset="-122"/>
+                <a:cs typeface="ui-sans-serif" pitchFamily="34" charset="-120"/>
+              </a:rPr>
+              <a:t>Repository</a:t>
+            </a:r>
+            <a:endParaRPr lang="en-US" sz="1646" dirty="0"/>
+          </a:p>
+        </p:txBody>
+      </p:sp>
+      <p:sp>
+        <p:nvSpPr>
+          <p:cNvPr id="72" name="Text 48"/>
+          <p:cNvSpPr/>
+          <p:nvPr/>
+        </p:nvSpPr>
+        <p:spPr>
+          <a:xfrm>
+            <a:off x="8267700" y="2219325"/>
+            <a:ext cx="968350" cy="152400"/>
+          </a:xfrm>
+          <a:prstGeom prst="rect">
+            <a:avLst/>
+          </a:prstGeom>
+          <a:noFill/>
+          <a:ln/>
+        </p:spPr>
+        <p:txBody>
+          <a:bodyPr wrap="square" lIns="0" tIns="0" rIns="0" bIns="0" rtlCol="0" anchor="t">
+            <a:spAutoFit/>
+          </a:bodyPr>
+          <a:lstStyle/>
+          <a:p>
+            <a:pPr marL="0" indent="0">
+              <a:lnSpc>
                 <a:spcPts val="1470"/>
               </a:lnSpc>
               <a:buNone/>
@@ -5465,13 +5399,13 @@
             <a:r>
               <a:rPr lang="en-US" sz="980" dirty="0">
                 <a:solidFill>
-                  <a:srgbClr val="FFA500"/>
+                  <a:srgbClr val="90EE90"/>
                 </a:solidFill>
                 <a:latin typeface="ui-monospace" pitchFamily="34" charset="0"/>
                 <a:ea typeface="ui-monospace" pitchFamily="34" charset="-122"/>
                 <a:cs typeface="ui-monospace" pitchFamily="34" charset="-120"/>
               </a:rPr>
-              <a:t>TodoRepository</a:t>
+              <a:t>@Repository</a:t>
             </a:r>
             <a:endParaRPr lang="en-US" sz="980" dirty="0"/>
           </a:p>
@@ -5479,14 +5413,14 @@
       </p:sp>
       <p:sp>
         <p:nvSpPr>
-          <p:cNvPr id="75" name="Text 51"/>
-          <p:cNvSpPr/>
-          <p:nvPr/>
-        </p:nvSpPr>
-        <p:spPr>
-          <a:xfrm>
-            <a:off x="10828586" y="2405955"/>
-            <a:ext cx="616208" cy="152400"/>
+          <p:cNvPr id="73" name="Text 49"/>
+          <p:cNvSpPr/>
+          <p:nvPr/>
+        </p:nvSpPr>
+        <p:spPr>
+          <a:xfrm>
+            <a:off x="8267700" y="2405954"/>
+            <a:ext cx="866775" cy="182761"/>
           </a:xfrm>
           <a:prstGeom prst="rect">
             <a:avLst/>
@@ -5515,7 +5449,7 @@
                 <a:ea typeface="ui-monospace" pitchFamily="34" charset="-122"/>
                 <a:cs typeface="ui-monospace" pitchFamily="34" charset="-120"/>
               </a:rPr>
-              <a:t>extends</a:t>
+              <a:t>public interface</a:t>
             </a:r>
             <a:endParaRPr lang="en-US" sz="980" dirty="0"/>
           </a:p>
@@ -5523,14 +5457,14 @@
       </p:sp>
       <p:sp>
         <p:nvSpPr>
-          <p:cNvPr id="76" name="Text 52"/>
-          <p:cNvSpPr/>
-          <p:nvPr/>
-        </p:nvSpPr>
-        <p:spPr>
-          <a:xfrm>
-            <a:off x="11388775" y="2405955"/>
-            <a:ext cx="5898014" cy="339030"/>
+          <p:cNvPr id="74" name="Text 50"/>
+          <p:cNvSpPr/>
+          <p:nvPr/>
+        </p:nvSpPr>
+        <p:spPr>
+          <a:xfrm>
+            <a:off x="9104531" y="2415636"/>
+            <a:ext cx="1232416" cy="152400"/>
           </a:xfrm>
           <a:prstGeom prst="rect">
             <a:avLst/>
@@ -5553,13 +5487,13 @@
             <a:r>
               <a:rPr lang="en-US" sz="980" dirty="0">
                 <a:solidFill>
-                  <a:srgbClr val="E2E8F0"/>
+                  <a:srgbClr val="FFA500"/>
                 </a:solidFill>
                 <a:latin typeface="ui-monospace" pitchFamily="34" charset="0"/>
                 <a:ea typeface="ui-monospace" pitchFamily="34" charset="-122"/>
                 <a:cs typeface="ui-monospace" pitchFamily="34" charset="-120"/>
               </a:rPr>
-              <a:t>JpaRepository&lt;Todo, Long&gt; {</a:t>
+              <a:t>TodoRepository</a:t>
             </a:r>
             <a:endParaRPr lang="en-US" sz="980" dirty="0"/>
           </a:p>
@@ -5567,14 +5501,14 @@
       </p:sp>
       <p:sp>
         <p:nvSpPr>
-          <p:cNvPr id="77" name="Text 53"/>
-          <p:cNvSpPr/>
-          <p:nvPr/>
-        </p:nvSpPr>
-        <p:spPr>
-          <a:xfrm>
-            <a:off x="8587829" y="2592586"/>
-            <a:ext cx="5281642" cy="152400"/>
+          <p:cNvPr id="75" name="Text 51"/>
+          <p:cNvSpPr/>
+          <p:nvPr/>
+        </p:nvSpPr>
+        <p:spPr>
+          <a:xfrm>
+            <a:off x="9952278" y="2415635"/>
+            <a:ext cx="616208" cy="152400"/>
           </a:xfrm>
           <a:prstGeom prst="rect">
             <a:avLst/>
@@ -5597,13 +5531,13 @@
             <a:r>
               <a:rPr lang="en-US" sz="980" dirty="0">
                 <a:solidFill>
-                  <a:srgbClr val="718096"/>
+                  <a:srgbClr val="90EE90"/>
                 </a:solidFill>
                 <a:latin typeface="ui-monospace" pitchFamily="34" charset="0"/>
                 <a:ea typeface="ui-monospace" pitchFamily="34" charset="-122"/>
                 <a:cs typeface="ui-monospace" pitchFamily="34" charset="-120"/>
               </a:rPr>
-              <a:t>// Spring Data JPA fournit automatiquement des méthodes CRUD</a:t>
+              <a:t>extends</a:t>
             </a:r>
             <a:endParaRPr lang="en-US" sz="980" dirty="0"/>
           </a:p>
@@ -5611,14 +5545,14 @@
       </p:sp>
       <p:sp>
         <p:nvSpPr>
-          <p:cNvPr id="78" name="Text 54"/>
-          <p:cNvSpPr/>
-          <p:nvPr/>
-        </p:nvSpPr>
-        <p:spPr>
-          <a:xfrm>
-            <a:off x="8587829" y="2779216"/>
-            <a:ext cx="3609171" cy="152400"/>
+          <p:cNvPr id="76" name="Text 52"/>
+          <p:cNvSpPr/>
+          <p:nvPr/>
+        </p:nvSpPr>
+        <p:spPr>
+          <a:xfrm>
+            <a:off x="10392414" y="2415635"/>
+            <a:ext cx="1540521" cy="177421"/>
           </a:xfrm>
           <a:prstGeom prst="rect">
             <a:avLst/>
@@ -5641,13 +5575,13 @@
             <a:r>
               <a:rPr lang="en-US" sz="980" dirty="0">
                 <a:solidFill>
-                  <a:srgbClr val="718096"/>
+                  <a:srgbClr val="E2E8F0"/>
                 </a:solidFill>
                 <a:latin typeface="ui-monospace" pitchFamily="34" charset="0"/>
                 <a:ea typeface="ui-monospace" pitchFamily="34" charset="-122"/>
                 <a:cs typeface="ui-monospace" pitchFamily="34" charset="-120"/>
               </a:rPr>
-              <a:t>// todoRepository.findAll() -&gt; Repository</a:t>
+              <a:t>JpaRepository&lt;Todo, Long&gt; {</a:t>
             </a:r>
             <a:endParaRPr lang="en-US" sz="980" dirty="0"/>
           </a:p>
@@ -5655,35 +5589,34 @@
       </p:sp>
       <p:sp>
         <p:nvSpPr>
-          <p:cNvPr id="79" name="Text 55"/>
-          <p:cNvSpPr/>
-          <p:nvPr/>
-        </p:nvSpPr>
-        <p:spPr>
-          <a:xfrm>
-            <a:off x="8587829" y="2965847"/>
-            <a:ext cx="3345106" cy="177421"/>
-          </a:xfrm>
-          <a:prstGeom prst="rect">
-            <a:avLst/>
-          </a:prstGeom>
-          <a:noFill/>
-          <a:ln/>
-        </p:spPr>
-        <p:txBody>
-          <a:bodyPr wrap="square" lIns="0" tIns="0" rIns="0" bIns="0" rtlCol="0" anchor="t">
-            <a:spAutoFit/>
-          </a:bodyPr>
-          <a:lstStyle/>
-          <a:p>
-            <a:pPr marL="0" indent="0">
+          <p:cNvPr id="77" name="Text 53"/>
+          <p:cNvSpPr/>
+          <p:nvPr/>
+        </p:nvSpPr>
+        <p:spPr>
+          <a:xfrm>
+            <a:off x="8587829" y="2592586"/>
+            <a:ext cx="5281642" cy="176587"/>
+          </a:xfrm>
+          <a:prstGeom prst="rect">
+            <a:avLst/>
+          </a:prstGeom>
+          <a:noFill/>
+          <a:ln/>
+        </p:spPr>
+        <p:txBody>
+          <a:bodyPr wrap="square" lIns="0" tIns="0" rIns="0" bIns="0" rtlCol="0" anchor="t">
+            <a:spAutoFit/>
+          </a:bodyPr>
+          <a:lstStyle/>
+          <a:p>
+            <a:pPr>
               <a:lnSpc>
                 <a:spcPts val="1470"/>
               </a:lnSpc>
-              <a:buNone/>
-            </a:pPr>
-            <a:r>
-              <a:rPr lang="ru-RU" sz="980" dirty="0">
+            </a:pPr>
+            <a:r>
+              <a:rPr lang="en-US" sz="980" dirty="0">
                 <a:solidFill>
                   <a:srgbClr val="718096"/>
                 </a:solidFill>
@@ -5691,7 +5624,7 @@
                 <a:ea typeface="ui-monospace" pitchFamily="34" charset="-122"/>
                 <a:cs typeface="ui-monospace" pitchFamily="34" charset="-120"/>
               </a:rPr>
-              <a:t>// Взаимодействие с базой данных</a:t>
+              <a:t>// Spring Data JPA automatically provides methods CRUD</a:t>
             </a:r>
             <a:endParaRPr lang="en-US" sz="980" dirty="0"/>
           </a:p>
@@ -5699,13 +5632,112 @@
       </p:sp>
       <p:sp>
         <p:nvSpPr>
+          <p:cNvPr id="78" name="Text 54"/>
+          <p:cNvSpPr/>
+          <p:nvPr/>
+        </p:nvSpPr>
+        <p:spPr>
+          <a:xfrm>
+            <a:off x="8587829" y="2779216"/>
+            <a:ext cx="3609171" cy="152400"/>
+          </a:xfrm>
+          <a:prstGeom prst="rect">
+            <a:avLst/>
+          </a:prstGeom>
+          <a:noFill/>
+          <a:ln/>
+        </p:spPr>
+        <p:txBody>
+          <a:bodyPr wrap="square" lIns="0" tIns="0" rIns="0" bIns="0" rtlCol="0" anchor="t">
+            <a:spAutoFit/>
+          </a:bodyPr>
+          <a:lstStyle/>
+          <a:p>
+            <a:pPr marL="0" indent="0">
+              <a:lnSpc>
+                <a:spcPts val="1470"/>
+              </a:lnSpc>
+              <a:buNone/>
+            </a:pPr>
+            <a:r>
+              <a:rPr lang="en-US" sz="980" dirty="0">
+                <a:solidFill>
+                  <a:srgbClr val="718096"/>
+                </a:solidFill>
+                <a:latin typeface="ui-monospace" pitchFamily="34" charset="0"/>
+                <a:ea typeface="ui-monospace" pitchFamily="34" charset="-122"/>
+                <a:cs typeface="ui-monospace" pitchFamily="34" charset="-120"/>
+              </a:rPr>
+              <a:t>// todoRepository.findAll() -&gt; Repository</a:t>
+            </a:r>
+            <a:endParaRPr lang="en-US" sz="980" dirty="0"/>
+          </a:p>
+        </p:txBody>
+      </p:sp>
+      <p:sp>
+        <p:nvSpPr>
+          <p:cNvPr id="79" name="Text 55"/>
+          <p:cNvSpPr/>
+          <p:nvPr/>
+        </p:nvSpPr>
+        <p:spPr>
+          <a:xfrm>
+            <a:off x="8587829" y="2965847"/>
+            <a:ext cx="3345106" cy="177421"/>
+          </a:xfrm>
+          <a:prstGeom prst="rect">
+            <a:avLst/>
+          </a:prstGeom>
+          <a:noFill/>
+          <a:ln/>
+        </p:spPr>
+        <p:txBody>
+          <a:bodyPr wrap="square" lIns="0" tIns="0" rIns="0" bIns="0" rtlCol="0" anchor="t">
+            <a:spAutoFit/>
+          </a:bodyPr>
+          <a:lstStyle/>
+          <a:p>
+            <a:pPr marL="0" indent="0">
+              <a:lnSpc>
+                <a:spcPts val="1470"/>
+              </a:lnSpc>
+              <a:buNone/>
+            </a:pPr>
+            <a:r>
+              <a:rPr lang="ru-RU" sz="980" dirty="0">
+                <a:solidFill>
+                  <a:srgbClr val="718096"/>
+                </a:solidFill>
+                <a:latin typeface="ui-monospace" pitchFamily="34" charset="0"/>
+                <a:ea typeface="ui-monospace" pitchFamily="34" charset="-122"/>
+                <a:cs typeface="ui-monospace" pitchFamily="34" charset="-120"/>
+              </a:rPr>
+              <a:t>// </a:t>
+            </a:r>
+            <a:r>
+              <a:rPr lang="en-US" sz="980" dirty="0">
+                <a:solidFill>
+                  <a:srgbClr val="718096"/>
+                </a:solidFill>
+                <a:latin typeface="ui-monospace" pitchFamily="34" charset="0"/>
+                <a:ea typeface="ui-monospace" pitchFamily="34" charset="-122"/>
+                <a:cs typeface="ui-monospace" pitchFamily="34" charset="-120"/>
+              </a:rPr>
+              <a:t>Database Interaction</a:t>
+            </a:r>
+            <a:endParaRPr lang="en-US" sz="980" dirty="0"/>
+          </a:p>
+        </p:txBody>
+      </p:sp>
+      <p:sp>
+        <p:nvSpPr>
           <p:cNvPr id="80" name="Text 56"/>
           <p:cNvSpPr/>
           <p:nvPr/>
         </p:nvSpPr>
         <p:spPr>
           <a:xfrm>
-            <a:off x="11628834" y="3152477"/>
+            <a:off x="8599259" y="3182408"/>
             <a:ext cx="88076" cy="152400"/>
           </a:xfrm>
           <a:prstGeom prst="rect">
@@ -6419,11 +6451,9 @@
                 <a:solidFill>
                   <a:srgbClr val="FFFFFF"/>
                 </a:solidFill>
-                <a:latin typeface="ui-sans-serif" pitchFamily="34" charset="0"/>
-                <a:ea typeface="ui-sans-serif" pitchFamily="34" charset="-122"/>
-                <a:cs typeface="ui-sans-serif" pitchFamily="34" charset="-120"/>
-              </a:rPr>
-              <a:t>Avantages et Inconvénients</a:t>
+                <a:ea typeface="ui-sans-serif" pitchFamily="34" charset="-122"/>
+              </a:rPr>
+              <a:t>Pros and Cons</a:t>
             </a:r>
             <a:endParaRPr lang="en-US" sz="3158" dirty="0"/>
           </a:p>
@@ -6438,38 +6468,34 @@
         <p:spPr>
           <a:xfrm>
             <a:off x="60960" y="990600"/>
-            <a:ext cx="12070080" cy="304800"/>
-          </a:xfrm>
-          <a:prstGeom prst="rect">
-            <a:avLst/>
-          </a:prstGeom>
-          <a:noFill/>
-          <a:ln/>
-        </p:spPr>
-        <p:txBody>
-          <a:bodyPr wrap="square" lIns="0" tIns="0" rIns="0" bIns="0" rtlCol="0" anchor="t">
-            <a:spAutoFit/>
-          </a:bodyPr>
-          <a:lstStyle/>
-          <a:p>
-            <a:pPr marL="0" indent="0" algn="ctr">
+            <a:ext cx="12070080" cy="286553"/>
+          </a:xfrm>
+          <a:prstGeom prst="rect">
+            <a:avLst/>
+          </a:prstGeom>
+          <a:noFill/>
+          <a:ln/>
+        </p:spPr>
+        <p:txBody>
+          <a:bodyPr wrap="square" lIns="0" tIns="0" rIns="0" bIns="0" rtlCol="0" anchor="t">
+            <a:spAutoFit/>
+          </a:bodyPr>
+          <a:lstStyle/>
+          <a:p>
+            <a:pPr algn="ctr">
               <a:lnSpc>
                 <a:spcPts val="2400"/>
               </a:lnSpc>
-              <a:buNone/>
-            </a:pPr>
-            <a:r>
-              <a:rPr lang="en-US" sz="1646" dirty="0">
+            </a:pPr>
+            <a:r>
+              <a:rPr lang="ru-RU" sz="1646" dirty="0">
                 <a:solidFill>
                   <a:srgbClr val="D1D5DB"/>
                 </a:solidFill>
-                <a:latin typeface="ui-sans-serif" pitchFamily="34" charset="0"/>
-                <a:ea typeface="ui-sans-serif" pitchFamily="34" charset="-122"/>
-                <a:cs typeface="ui-sans-serif" pitchFamily="34" charset="-120"/>
-              </a:rPr>
-              <a:t>Analyse critique de Spring Boot</a:t>
-            </a:r>
-            <a:endParaRPr lang="en-US" sz="1646" dirty="0"/>
+                <a:ea typeface="ui-sans-serif" pitchFamily="34" charset="-122"/>
+              </a:rPr>
+              <a:t>Критический анализ Spring Boot</a:t>
+            </a:r>
           </a:p>
         </p:txBody>
       </p:sp>
@@ -7370,7 +7396,7 @@
         </p:blipFill>
         <p:spPr>
           <a:xfrm>
-            <a:off x="838200" y="4229100"/>
+            <a:off x="812898" y="4236983"/>
             <a:ext cx="2997101" cy="723900"/>
           </a:xfrm>
           <a:prstGeom prst="rect">
@@ -7418,7 +7444,7 @@
         </p:blipFill>
         <p:spPr>
           <a:xfrm>
-            <a:off x="1602581" y="4781550"/>
+            <a:off x="3686175" y="4591050"/>
             <a:ext cx="123825" cy="133350"/>
           </a:xfrm>
           <a:prstGeom prst="rect">
@@ -7572,30 +7598,6 @@
       </p:pic>
       <p:pic>
         <p:nvPicPr>
-          <p:cNvPr id="21" name="Image 19" descr="preencoded.png"/>
-          <p:cNvPicPr>
-            <a:picLocks noChangeAspect="1"/>
-          </p:cNvPicPr>
-          <p:nvPr/>
-        </p:nvPicPr>
-        <p:blipFill>
-          <a:blip r:embed="rId18"/>
-          <a:stretch>
-            <a:fillRect/>
-          </a:stretch>
-        </p:blipFill>
-        <p:spPr>
-          <a:xfrm>
-            <a:off x="4597301" y="4229100"/>
-            <a:ext cx="2997250" cy="723900"/>
-          </a:xfrm>
-          <a:prstGeom prst="rect">
-            <a:avLst/>
-          </a:prstGeom>
-        </p:spPr>
-      </p:pic>
-      <p:pic>
-        <p:nvPicPr>
           <p:cNvPr id="22" name="Image 20" descr="preencoded.png"/>
           <p:cNvPicPr>
             <a:picLocks noChangeAspect="1"/>
@@ -7634,7 +7636,7 @@
         </p:blipFill>
         <p:spPr>
           <a:xfrm>
-            <a:off x="5321796" y="4781550"/>
+            <a:off x="5260587" y="4779051"/>
             <a:ext cx="123825" cy="133350"/>
           </a:xfrm>
           <a:prstGeom prst="rect">
@@ -7651,7 +7653,7 @@
           <p:nvPr/>
         </p:nvPicPr>
         <p:blipFill>
-          <a:blip r:embed="rId19"/>
+          <a:blip r:embed="rId18"/>
           <a:stretch>
             <a:fillRect/>
           </a:stretch>
@@ -7675,7 +7677,7 @@
           <p:nvPr/>
         </p:nvPicPr>
         <p:blipFill>
-          <a:blip r:embed="rId20"/>
+          <a:blip r:embed="rId19"/>
           <a:stretch>
             <a:fillRect/>
           </a:stretch>
@@ -7699,7 +7701,7 @@
           <p:nvPr/>
         </p:nvPicPr>
         <p:blipFill>
-          <a:blip r:embed="rId21"/>
+          <a:blip r:embed="rId20"/>
           <a:stretch>
             <a:fillRect/>
           </a:stretch>
@@ -7723,7 +7725,7 @@
           <p:nvPr/>
         </p:nvPicPr>
         <p:blipFill>
-          <a:blip r:embed="rId22"/>
+          <a:blip r:embed="rId21"/>
           <a:stretch>
             <a:fillRect/>
           </a:stretch>
@@ -7747,7 +7749,7 @@
           <p:nvPr/>
         </p:nvPicPr>
         <p:blipFill>
-          <a:blip r:embed="rId22"/>
+          <a:blip r:embed="rId21"/>
           <a:stretch>
             <a:fillRect/>
           </a:stretch>
@@ -7771,7 +7773,7 @@
           <p:nvPr/>
         </p:nvPicPr>
         <p:blipFill>
-          <a:blip r:embed="rId22"/>
+          <a:blip r:embed="rId21"/>
           <a:stretch>
             <a:fillRect/>
           </a:stretch>
@@ -7788,30 +7790,6 @@
       </p:pic>
       <p:pic>
         <p:nvPicPr>
-          <p:cNvPr id="30" name="Image 28" descr="preencoded.png"/>
-          <p:cNvPicPr>
-            <a:picLocks noChangeAspect="1"/>
-          </p:cNvPicPr>
-          <p:nvPr/>
-        </p:nvPicPr>
-        <p:blipFill>
-          <a:blip r:embed="rId11"/>
-          <a:stretch>
-            <a:fillRect/>
-          </a:stretch>
-        </p:blipFill>
-        <p:spPr>
-          <a:xfrm>
-            <a:off x="8356550" y="4229100"/>
-            <a:ext cx="2997101" cy="723900"/>
-          </a:xfrm>
-          <a:prstGeom prst="rect">
-            <a:avLst/>
-          </a:prstGeom>
-        </p:spPr>
-      </p:pic>
-      <p:pic>
-        <p:nvPicPr>
           <p:cNvPr id="31" name="Image 29" descr="preencoded.png"/>
           <p:cNvPicPr>
             <a:picLocks noChangeAspect="1"/>
@@ -7850,7 +7828,7 @@
         </p:blipFill>
         <p:spPr>
           <a:xfrm>
-            <a:off x="9080302" y="4781550"/>
+            <a:off x="10972800" y="4581525"/>
             <a:ext cx="123825" cy="133350"/>
           </a:xfrm>
           <a:prstGeom prst="rect">
@@ -7867,7 +7845,7 @@
           <p:nvPr/>
         </p:nvPicPr>
         <p:blipFill>
-          <a:blip r:embed="rId23"/>
+          <a:blip r:embed="rId22"/>
           <a:stretch>
             <a:fillRect/>
           </a:stretch>
@@ -7891,7 +7869,7 @@
           <p:nvPr/>
         </p:nvPicPr>
         <p:blipFill>
-          <a:blip r:embed="rId24"/>
+          <a:blip r:embed="rId23"/>
           <a:stretch>
             <a:fillRect/>
           </a:stretch>
@@ -7936,7 +7914,7 @@
               <a:buNone/>
             </a:pPr>
             <a:r>
-              <a:rPr lang="ru-RU" sz="3158" b="1" dirty="0">
+              <a:rPr lang="en-US" sz="3158" b="1" dirty="0">
                 <a:solidFill>
                   <a:srgbClr val="FFFFFF"/>
                 </a:solidFill>
@@ -7944,7 +7922,7 @@
                 <a:ea typeface="ui-sans-serif" pitchFamily="34" charset="-122"/>
                 <a:cs typeface="ui-sans-serif" pitchFamily="34" charset="-120"/>
               </a:rPr>
-              <a:t>Реальные приложения</a:t>
+              <a:t>Real-world Applications</a:t>
             </a:r>
             <a:endParaRPr lang="en-US" sz="3158" dirty="0"/>
           </a:p>
@@ -8189,26 +8167,25 @@
         </p:nvSpPr>
         <p:spPr>
           <a:xfrm>
-            <a:off x="1000125" y="4381500"/>
-            <a:ext cx="2997101" cy="571500"/>
-          </a:xfrm>
-          <a:prstGeom prst="rect">
-            <a:avLst/>
-          </a:prstGeom>
-          <a:noFill/>
-          <a:ln/>
-        </p:spPr>
-        <p:txBody>
-          <a:bodyPr wrap="square" lIns="0" tIns="0" rIns="0" bIns="0" rtlCol="0" anchor="t">
-            <a:spAutoFit/>
-          </a:bodyPr>
-          <a:lstStyle/>
-          <a:p>
-            <a:pPr marL="0" indent="0">
+            <a:off x="983046" y="4355083"/>
+            <a:ext cx="2997101" cy="562142"/>
+          </a:xfrm>
+          <a:prstGeom prst="rect">
+            <a:avLst/>
+          </a:prstGeom>
+          <a:noFill/>
+          <a:ln/>
+        </p:spPr>
+        <p:txBody>
+          <a:bodyPr wrap="square" lIns="0" tIns="0" rIns="0" bIns="0" rtlCol="0" anchor="t">
+            <a:spAutoFit/>
+          </a:bodyPr>
+          <a:lstStyle/>
+          <a:p>
+            <a:pPr>
               <a:lnSpc>
                 <a:spcPts val="1500"/>
               </a:lnSpc>
-              <a:buNone/>
             </a:pPr>
             <a:r>
               <a:rPr lang="en-US" sz="980" i="1" dirty="0">
@@ -8219,8 +8196,24 @@
                 <a:ea typeface="ui-sans-serif" pitchFamily="34" charset="-122"/>
                 <a:cs typeface="ui-sans-serif" pitchFamily="34" charset="-120"/>
               </a:rPr>
-              <a:t>Spring Boot est idéal pour créer des applications d'entreprise robustes et évolutives</a:t>
-            </a:r>
+              <a:t>Spring Boot </a:t>
+            </a:r>
+            <a:r>
+              <a:rPr lang="ru-RU" sz="980" i="1" dirty="0">
+                <a:solidFill>
+                  <a:srgbClr val="9CA3AF"/>
+                </a:solidFill>
+                <a:ea typeface="ui-sans-serif" pitchFamily="34" charset="-122"/>
+              </a:rPr>
+              <a:t>идеально подходит для создания надежных и масштабируемых корпоративных приложений</a:t>
+            </a:r>
+          </a:p>
+          <a:p>
+            <a:pPr>
+              <a:lnSpc>
+                <a:spcPts val="1500"/>
+              </a:lnSpc>
+            </a:pPr>
             <a:endParaRPr lang="en-US" sz="980" dirty="0"/>
           </a:p>
         </p:txBody>
@@ -8409,20 +8402,72 @@
         </p:nvSpPr>
         <p:spPr>
           <a:xfrm>
-            <a:off x="4759226" y="4381500"/>
-            <a:ext cx="2997250" cy="571500"/>
-          </a:xfrm>
-          <a:prstGeom prst="rect">
-            <a:avLst/>
-          </a:prstGeom>
-          <a:noFill/>
-          <a:ln/>
-        </p:spPr>
-        <p:txBody>
-          <a:bodyPr wrap="square" lIns="0" tIns="0" rIns="0" bIns="0" rtlCol="0" anchor="t">
-            <a:spAutoFit/>
-          </a:bodyPr>
-          <a:lstStyle/>
+            <a:off x="4742815" y="4363253"/>
+            <a:ext cx="2997250" cy="946862"/>
+          </a:xfrm>
+          <a:prstGeom prst="rect">
+            <a:avLst/>
+          </a:prstGeom>
+          <a:noFill/>
+          <a:ln/>
+        </p:spPr>
+        <p:txBody>
+          <a:bodyPr wrap="square" lIns="0" tIns="0" rIns="0" bIns="0" rtlCol="0" anchor="t">
+            <a:spAutoFit/>
+          </a:bodyPr>
+          <a:lstStyle/>
+          <a:p>
+            <a:pPr>
+              <a:lnSpc>
+                <a:spcPts val="1500"/>
+              </a:lnSpc>
+            </a:pPr>
+            <a:r>
+              <a:rPr lang="en-US" sz="980" i="1" dirty="0">
+                <a:solidFill>
+                  <a:srgbClr val="9CA3AF"/>
+                </a:solidFill>
+                <a:latin typeface="ui-sans-serif" pitchFamily="34" charset="0"/>
+                <a:ea typeface="ui-sans-serif" pitchFamily="34" charset="-122"/>
+                <a:cs typeface="ui-sans-serif" pitchFamily="34" charset="-120"/>
+              </a:rPr>
+              <a:t>Spring Boot </a:t>
+            </a:r>
+            <a:r>
+              <a:rPr lang="ru-RU" sz="980" i="1" dirty="0">
+                <a:solidFill>
+                  <a:srgbClr val="9CA3AF"/>
+                </a:solidFill>
+                <a:latin typeface="ui-sans-serif" pitchFamily="34" charset="0"/>
+                <a:ea typeface="ui-sans-serif" pitchFamily="34" charset="-122"/>
+                <a:cs typeface="ui-sans-serif" pitchFamily="34" charset="-120"/>
+              </a:rPr>
+              <a:t>у</a:t>
+            </a:r>
+            <a:r>
+              <a:rPr lang="ru-RU" sz="980" i="1" dirty="0">
+                <a:solidFill>
+                  <a:srgbClr val="9CA3AF"/>
+                </a:solidFill>
+                <a:ea typeface="ui-sans-serif" pitchFamily="34" charset="-122"/>
+              </a:rPr>
+              <a:t>прощает создания высокопроизводительных, простых в обслуживании REST API</a:t>
+            </a:r>
+          </a:p>
+          <a:p>
+            <a:pPr>
+              <a:lnSpc>
+                <a:spcPts val="1500"/>
+              </a:lnSpc>
+            </a:pPr>
+            <a:endParaRPr lang="en-US" sz="980" i="1" dirty="0">
+              <a:solidFill>
+                <a:srgbClr val="9CA3AF"/>
+              </a:solidFill>
+              <a:latin typeface="ui-sans-serif" pitchFamily="34" charset="0"/>
+              <a:ea typeface="ui-sans-serif" pitchFamily="34" charset="-122"/>
+            </a:endParaRPr>
+          </a:p>
           <a:p>
             <a:pPr marL="0" indent="0">
               <a:lnSpc>
@@ -8430,17 +8475,6 @@
               </a:lnSpc>
               <a:buNone/>
             </a:pPr>
-            <a:r>
-              <a:rPr lang="en-US" sz="980" i="1" dirty="0">
-                <a:solidFill>
-                  <a:srgbClr val="9CA3AF"/>
-                </a:solidFill>
-                <a:latin typeface="ui-sans-serif" pitchFamily="34" charset="0"/>
-                <a:ea typeface="ui-sans-serif" pitchFamily="34" charset="-122"/>
-                <a:cs typeface="ui-sans-serif" pitchFamily="34" charset="-120"/>
-              </a:rPr>
-              <a:t>Spring Boot simplifie la création d'API REST hautement performantes et facile à maintenir</a:t>
-            </a:r>
             <a:endParaRPr lang="en-US" sz="980" dirty="0"/>
           </a:p>
         </p:txBody>
@@ -8615,7 +8649,7 @@
                 <a:ea typeface="ui-sans-serif" pitchFamily="34" charset="-122"/>
                 <a:cs typeface="ui-sans-serif" pitchFamily="34" charset="-120"/>
               </a:rPr>
-              <a:t>Взаимодействие через лёгкие </a:t>
+              <a:t>Взаимодействие через простые </a:t>
             </a:r>
             <a:r>
               <a:rPr lang="en-US" sz="1120" dirty="0">
@@ -8640,27 +8674,21 @@
         </p:nvSpPr>
         <p:spPr>
           <a:xfrm>
-            <a:off x="8518475" y="4381500"/>
-            <a:ext cx="2997101" cy="571500"/>
-          </a:xfrm>
-          <a:prstGeom prst="rect">
-            <a:avLst/>
-          </a:prstGeom>
-          <a:noFill/>
-          <a:ln/>
-        </p:spPr>
-        <p:txBody>
-          <a:bodyPr wrap="square" lIns="0" tIns="0" rIns="0" bIns="0" rtlCol="0" anchor="t">
-            <a:spAutoFit/>
-          </a:bodyPr>
-          <a:lstStyle/>
-          <a:p>
-            <a:pPr marL="0" indent="0">
-              <a:lnSpc>
-                <a:spcPts val="1500"/>
-              </a:lnSpc>
-              <a:buNone/>
-            </a:pPr>
+            <a:off x="8484503" y="4387248"/>
+            <a:ext cx="2997101" cy="458587"/>
+          </a:xfrm>
+          <a:prstGeom prst="rect">
+            <a:avLst/>
+          </a:prstGeom>
+          <a:noFill/>
+          <a:ln/>
+        </p:spPr>
+        <p:txBody>
+          <a:bodyPr wrap="square" lIns="0" tIns="0" rIns="0" bIns="0" rtlCol="0" anchor="t">
+            <a:spAutoFit/>
+          </a:bodyPr>
+          <a:lstStyle/>
+          <a:p>
             <a:r>
               <a:rPr lang="en-US" sz="980" i="1" dirty="0">
                 <a:solidFill>
@@ -8670,9 +8698,54 @@
                 <a:ea typeface="ui-sans-serif" pitchFamily="34" charset="-122"/>
                 <a:cs typeface="ui-sans-serif" pitchFamily="34" charset="-120"/>
               </a:rPr>
-              <a:t>Spring Boot est idéal pour créer des microservices avec une configuration simplifiée</a:t>
-            </a:r>
-            <a:endParaRPr lang="en-US" sz="980" dirty="0"/>
+              <a:t>Spring Boot</a:t>
+            </a:r>
+            <a:r>
+              <a:rPr lang="en-US" sz="980" i="1" dirty="0">
+                <a:solidFill>
+                  <a:srgbClr val="9CA3AF"/>
+                </a:solidFill>
+                <a:latin typeface="ui-sans-serif" pitchFamily="34" charset="0"/>
+                <a:ea typeface="ui-sans-serif" pitchFamily="34" charset="-122"/>
+              </a:rPr>
+              <a:t> </a:t>
+            </a:r>
+            <a:r>
+              <a:rPr lang="ru-RU" sz="980" i="1" dirty="0">
+                <a:solidFill>
+                  <a:srgbClr val="9CA3AF"/>
+                </a:solidFill>
+                <a:ea typeface="ui-sans-serif" pitchFamily="34" charset="-122"/>
+              </a:rPr>
+              <a:t>идеально подходит для построения </a:t>
+            </a:r>
+            <a:r>
+              <a:rPr lang="ru-RU" sz="980" i="1" dirty="0" err="1">
+                <a:solidFill>
+                  <a:srgbClr val="9CA3AF"/>
+                </a:solidFill>
+                <a:ea typeface="ui-sans-serif" pitchFamily="34" charset="-122"/>
+              </a:rPr>
+              <a:t>микросервисов</a:t>
+            </a:r>
+            <a:r>
+              <a:rPr lang="ru-RU" sz="980" i="1" dirty="0">
+                <a:solidFill>
+                  <a:srgbClr val="9CA3AF"/>
+                </a:solidFill>
+                <a:ea typeface="ui-sans-serif" pitchFamily="34" charset="-122"/>
+              </a:rPr>
+              <a:t> с упрощенной конфигурацией</a:t>
+            </a:r>
+          </a:p>
+          <a:p>
+            <a:endParaRPr lang="en-US" sz="980" i="1" dirty="0">
+              <a:solidFill>
+                <a:srgbClr val="9CA3AF"/>
+              </a:solidFill>
+              <a:latin typeface="ui-sans-serif" pitchFamily="34" charset="0"/>
+              <a:ea typeface="ui-sans-serif" pitchFamily="34" charset="-122"/>
+            </a:endParaRPr>
           </a:p>
         </p:txBody>
       </p:sp>
@@ -8706,7 +8779,7 @@
               <a:buNone/>
             </a:pPr>
             <a:r>
-              <a:rPr lang="ru-RU" sz="1260" dirty="0">
+              <a:rPr lang="ru-RU" sz="1260">
                 <a:solidFill>
                   <a:srgbClr val="E5E7EB"/>
                 </a:solidFill>
@@ -8714,29 +8787,7 @@
                 <a:ea typeface="ui-sans-serif" pitchFamily="34" charset="-122"/>
                 <a:cs typeface="ui-sans-serif" pitchFamily="34" charset="-120"/>
               </a:rPr>
-              <a:t>Spring Boot адаптируется к различным архитектурам приложений: от монолитов до </a:t>
-            </a:r>
-            <a:r>
-              <a:rPr lang="ru-RU" sz="1260" dirty="0" err="1">
-                <a:solidFill>
-                  <a:srgbClr val="E5E7EB"/>
-                </a:solidFill>
-                <a:latin typeface="ui-sans-serif" pitchFamily="34" charset="0"/>
-                <a:ea typeface="ui-sans-serif" pitchFamily="34" charset="-122"/>
-                <a:cs typeface="ui-sans-serif" pitchFamily="34" charset="-120"/>
-              </a:rPr>
-              <a:t>микросервисов</a:t>
-            </a:r>
-            <a:r>
-              <a:rPr lang="ru-RU" sz="1260" dirty="0">
-                <a:solidFill>
-                  <a:srgbClr val="E5E7EB"/>
-                </a:solidFill>
-                <a:latin typeface="ui-sans-serif" pitchFamily="34" charset="0"/>
-                <a:ea typeface="ui-sans-serif" pitchFamily="34" charset="-122"/>
-                <a:cs typeface="ui-sans-serif" pitchFamily="34" charset="-120"/>
-              </a:rPr>
-              <a:t>.</a:t>
+              <a:t>Spring Boot адаптируется к различным архитектурам приложений: от монолитов до микросервисов.</a:t>
             </a:r>
             <a:endParaRPr lang="en-US" sz="1260" dirty="0"/>
           </a:p>
@@ -9133,7 +9184,7 @@
               <a:buNone/>
             </a:pPr>
             <a:r>
-              <a:rPr lang="ru-RU" sz="3158" b="1" dirty="0">
+              <a:rPr lang="en-US" sz="3158" b="1">
                 <a:solidFill>
                   <a:srgbClr val="FFFFFF"/>
                 </a:solidFill>
@@ -9141,7 +9192,7 @@
                 <a:ea typeface="ui-sans-serif" pitchFamily="34" charset="-122"/>
                 <a:cs typeface="ui-sans-serif" pitchFamily="34" charset="-120"/>
               </a:rPr>
-              <a:t>Заключение</a:t>
+              <a:t>Conclusion</a:t>
             </a:r>
             <a:endParaRPr lang="en-US" sz="3158" dirty="0"/>
           </a:p>
@@ -9559,7 +9610,7 @@
                 <a:ea typeface="ui-sans-serif" pitchFamily="34" charset="-122"/>
                 <a:cs typeface="ui-sans-serif" pitchFamily="34" charset="-120"/>
               </a:rPr>
-              <a:t>Spring Boot → Идеальный выбор для быстрой и надежной разработки современных приложений</a:t>
+              <a:t>Spring Boot → Идеальный выбор для быстрой и надёжной разработки современных приложений</a:t>
             </a:r>
             <a:endParaRPr lang="en-US" sz="1646" dirty="0"/>
           </a:p>
@@ -10392,7 +10443,7 @@
                 <a:ea typeface="ui-sans-serif" pitchFamily="34" charset="-122"/>
                 <a:cs typeface="ui-sans-serif" pitchFamily="34" charset="-120"/>
               </a:rPr>
-              <a:t>Развертывание на внешних серверах (</a:t>
+              <a:t>Деплой на внешних серверах (</a:t>
             </a:r>
             <a:r>
               <a:rPr lang="ru-RU" sz="1120" dirty="0" err="1">
@@ -10480,7 +10531,7 @@
                 <a:ea typeface="ui-sans-serif" pitchFamily="34" charset="-122"/>
                 <a:cs typeface="ui-sans-serif" pitchFamily="34" charset="-120"/>
               </a:rPr>
-              <a:t>Медленная разработка и развертывание</a:t>
+              <a:t>Медленная разработка и деплой</a:t>
             </a:r>
             <a:endParaRPr lang="en-US" sz="1120" dirty="0"/>
           </a:p>
@@ -10810,7 +10861,18 @@
                 <a:ea typeface="ui-sans-serif" pitchFamily="34" charset="-122"/>
                 <a:cs typeface="ui-sans-serif" pitchFamily="34" charset="-120"/>
               </a:rPr>
-              <a:t>Быстрая разработка и развертывание</a:t>
+              <a:t>Быстрая разработка и </a:t>
+            </a:r>
+            <a:r>
+              <a:rPr lang="ru-RU" sz="1120" dirty="0">
+                <a:solidFill>
+                  <a:srgbClr val="D1D5DB"/>
+                </a:solidFill>
+                <a:latin typeface="ui-sans-serif" pitchFamily="34" charset="0"/>
+                <a:ea typeface="ui-sans-serif" pitchFamily="34" charset="-122"/>
+                <a:cs typeface="ui-sans-serif" pitchFamily="34" charset="-120"/>
+              </a:rPr>
+              <a:t>деплой</a:t>
             </a:r>
             <a:endParaRPr lang="en-US" sz="1120" dirty="0"/>
           </a:p>
@@ -12233,7 +12295,7 @@
               <a:buNone/>
             </a:pPr>
             <a:r>
-              <a:rPr lang="en-US" sz="1120" dirty="0">
+              <a:rPr lang="ru-RU" sz="1120" dirty="0">
                 <a:solidFill>
                   <a:srgbClr val="E5E7EB"/>
                 </a:solidFill>
@@ -12241,7 +12303,7 @@
                 <a:ea typeface="ui-sans-serif" pitchFamily="34" charset="-122"/>
                 <a:cs typeface="ui-sans-serif" pitchFamily="34" charset="-120"/>
               </a:rPr>
-              <a:t>Eliminates the manual addition of individual libraries</a:t>
+              <a:t>Устраняет необходимость ручного добавления отдельных библиотек</a:t>
             </a:r>
             <a:endParaRPr lang="en-US" sz="1120" dirty="0"/>
           </a:p>
@@ -13278,7 +13340,7 @@
         <p:spPr>
           <a:xfrm>
             <a:off x="4597301" y="3124200"/>
-            <a:ext cx="2997250" cy="1365246"/>
+            <a:ext cx="2997250" cy="1134413"/>
           </a:xfrm>
           <a:prstGeom prst="rect">
             <a:avLst/>
@@ -13373,7 +13435,7 @@
                 <a:ea typeface="ui-sans-serif" pitchFamily="34" charset="-122"/>
                 <a:cs typeface="ui-sans-serif" pitchFamily="34" charset="-120"/>
               </a:rPr>
-              <a:t>, непосредственно в исполняемый JAR-файл. Это устраняет необходимость в установке и настройке отдельного сервера, упрощая развертывание.</a:t>
+              <a:t>, непосредственно в исполняемый JAR-файл. Это устраняет необходимость в установке и настройке отдельного сервера, упрощая деплой.</a:t>
             </a:r>
             <a:endParaRPr lang="en-US" sz="1120" dirty="0"/>
           </a:p>
@@ -16256,7 +16318,29 @@
                 <a:ea typeface="ui-sans-serif" pitchFamily="34" charset="-122"/>
                 <a:cs typeface="ui-sans-serif" pitchFamily="34" charset="-120"/>
               </a:rPr>
-              <a:t>Автоматическая генерация реализаций для распространенных операций CRUD</a:t>
+              <a:t>Автоматическая генерация реализаций для обычны</a:t>
+            </a:r>
+            <a:r>
+              <a:rPr lang="en-US" sz="1120" dirty="0">
+                <a:solidFill>
+                  <a:srgbClr val="4ADE80"/>
+                </a:solidFill>
+                <a:latin typeface="ui-sans-serif" pitchFamily="34" charset="0"/>
+                <a:ea typeface="ui-sans-serif" pitchFamily="34" charset="-122"/>
+                <a:cs typeface="ui-sans-serif" pitchFamily="34" charset="-120"/>
+              </a:rPr>
+              <a:t>x </a:t>
+            </a:r>
+            <a:r>
+              <a:rPr lang="ru-RU" sz="1120" dirty="0">
+                <a:solidFill>
+                  <a:srgbClr val="4ADE80"/>
+                </a:solidFill>
+                <a:latin typeface="ui-sans-serif" pitchFamily="34" charset="0"/>
+                <a:ea typeface="ui-sans-serif" pitchFamily="34" charset="-122"/>
+                <a:cs typeface="ui-sans-serif" pitchFamily="34" charset="-120"/>
+              </a:rPr>
+              <a:t>операций CRUD</a:t>
             </a:r>
             <a:endParaRPr lang="en-US" sz="1120" dirty="0"/>
           </a:p>
@@ -17320,7 +17404,7 @@
         <p:spPr>
           <a:xfrm>
             <a:off x="60960" y="990600"/>
-            <a:ext cx="12070080" cy="266700"/>
+            <a:ext cx="12070080" cy="248658"/>
           </a:xfrm>
           <a:prstGeom prst="rect">
             <a:avLst/>
@@ -17341,6 +17425,17 @@
               <a:buNone/>
             </a:pPr>
             <a:r>
+              <a:rPr lang="ru-RU" sz="1380" dirty="0">
+                <a:solidFill>
+                  <a:srgbClr val="D1D5DB"/>
+                </a:solidFill>
+                <a:latin typeface="ui-sans-serif" pitchFamily="34" charset="0"/>
+                <a:ea typeface="ui-sans-serif" pitchFamily="34" charset="-122"/>
+                <a:cs typeface="ui-sans-serif" pitchFamily="34" charset="-120"/>
+              </a:rPr>
+              <a:t>Используется в </a:t>
+            </a:r>
+            <a:r>
               <a:rPr lang="en-US" sz="1380" dirty="0">
                 <a:solidFill>
                   <a:srgbClr val="D1D5DB"/>
@@ -17349,7 +17444,7 @@
                 <a:ea typeface="ui-sans-serif" pitchFamily="34" charset="-122"/>
                 <a:cs typeface="ui-sans-serif" pitchFamily="34" charset="-120"/>
               </a:rPr>
-              <a:t>Utilisés dans Spring Boot</a:t>
+              <a:t>Spring Boot</a:t>
             </a:r>
             <a:endParaRPr lang="en-US" sz="1380" dirty="0"/>
           </a:p>
@@ -17364,7 +17459,7 @@
         <p:spPr>
           <a:xfrm>
             <a:off x="228600" y="1638300"/>
-            <a:ext cx="11734800" cy="228600"/>
+            <a:ext cx="11734800" cy="211083"/>
           </a:xfrm>
           <a:prstGeom prst="rect">
             <a:avLst/>
@@ -17385,7 +17480,7 @@
               <a:buNone/>
             </a:pPr>
             <a:r>
-              <a:rPr lang="en-US" sz="1120" dirty="0">
+              <a:rPr lang="ru-RU" sz="1120" dirty="0">
                 <a:solidFill>
                   <a:srgbClr val="E5E7EB"/>
                 </a:solidFill>
@@ -17393,7 +17488,7 @@
                 <a:ea typeface="ui-sans-serif" pitchFamily="34" charset="-122"/>
                 <a:cs typeface="ui-sans-serif" pitchFamily="34" charset="-120"/>
               </a:rPr>
-              <a:t>Spring Framework utilise lourdement ces patterns de conception pour atteindre sa flexibilité et son pouvoir.</a:t>
+              <a:t>Spring Framework активно использует эти шаблоны проектирования для достижения своей гибкости и мощности.</a:t>
             </a:r>
             <a:endParaRPr lang="en-US" sz="1120" dirty="0"/>
           </a:p>
@@ -18304,7 +18399,7 @@
         <p:spPr>
           <a:xfrm>
             <a:off x="8839200" y="5029200"/>
-            <a:ext cx="1595199" cy="304800"/>
+            <a:ext cx="1595199" cy="286553"/>
           </a:xfrm>
           <a:prstGeom prst="rect">
             <a:avLst/>
@@ -18333,7 +18428,7 @@
                 <a:ea typeface="ui-sans-serif" pitchFamily="34" charset="-122"/>
                 <a:cs typeface="ui-sans-serif" pitchFamily="34" charset="-120"/>
               </a:rPr>
-              <a:t>Intégration</a:t>
+              <a:t>Integration</a:t>
             </a:r>
             <a:endParaRPr lang="en-US" sz="1646" dirty="0"/>
           </a:p>
@@ -19022,7 +19117,7 @@
                 <a:ea typeface="ui-sans-serif" pitchFamily="34" charset="-122"/>
                 <a:cs typeface="ui-sans-serif" pitchFamily="34" charset="-120"/>
               </a:rPr>
-              <a:t>SOA et Microservices</a:t>
+              <a:t>SOA And Microservices</a:t>
             </a:r>
             <a:endParaRPr lang="en-US" sz="3158" dirty="0"/>
           </a:p>
@@ -20358,7 +20453,7 @@
                 <a:ea typeface="ui-sans-serif" pitchFamily="34" charset="-122"/>
                 <a:cs typeface="ui-sans-serif" pitchFamily="34" charset="-120"/>
               </a:rPr>
-              <a:t>Spring Cloud et Eureka</a:t>
+              <a:t>Spring Cloud and Eureka</a:t>
             </a:r>
             <a:endParaRPr lang="en-US" sz="3158" dirty="0"/>
           </a:p>
@@ -21138,7 +21233,29 @@
                 <a:ea typeface="ui-sans-serif" pitchFamily="34" charset="-122"/>
                 <a:cs typeface="ui-sans-serif" pitchFamily="34" charset="-120"/>
               </a:rPr>
-              <a:t>) распределять запросы по этим экземплярам, ​​повышая отказоустойчивость и производительность.</a:t>
+              <a:t>) распределять запросы по этим экземплярам, ​​повышая устойчивость</a:t>
+            </a:r>
+            <a:r>
+              <a:rPr lang="en-US" sz="1120" dirty="0">
+                <a:solidFill>
+                  <a:srgbClr val="D1D5DB"/>
+                </a:solidFill>
+                <a:latin typeface="ui-sans-serif" pitchFamily="34" charset="0"/>
+                <a:ea typeface="ui-sans-serif" pitchFamily="34" charset="-122"/>
+                <a:cs typeface="ui-sans-serif" pitchFamily="34" charset="-120"/>
+              </a:rPr>
+              <a:t> </a:t>
+            </a:r>
+            <a:r>
+              <a:rPr lang="ru-RU" sz="1120" dirty="0">
+                <a:solidFill>
+                  <a:srgbClr val="D1D5DB"/>
+                </a:solidFill>
+                <a:latin typeface="ui-sans-serif" pitchFamily="34" charset="0"/>
+                <a:ea typeface="ui-sans-serif" pitchFamily="34" charset="-122"/>
+                <a:cs typeface="ui-sans-serif" pitchFamily="34" charset="-120"/>
+              </a:rPr>
+              <a:t>к отказам и производительность.</a:t>
             </a:r>
             <a:endParaRPr lang="en-US" sz="1120" dirty="0"/>
           </a:p>

</xml_diff>